<commit_message>
updates to maintenance presentation
</commit_message>
<xml_diff>
--- a/LicenseAssetManager/docs/Maintenance/MaintenancePresentation.pptx
+++ b/LicenseAssetManager/docs/Maintenance/MaintenancePresentation.pptx
@@ -5,7 +5,7 @@
     <p:sldMasterId id="2147483820" r:id="rId1"/>
   </p:sldMasterIdLst>
   <p:notesMasterIdLst>
-    <p:notesMasterId r:id="rId17"/>
+    <p:notesMasterId r:id="rId18"/>
   </p:notesMasterIdLst>
   <p:sldIdLst>
     <p:sldId id="279" r:id="rId2"/>
@@ -14,15 +14,16 @@
     <p:sldId id="258" r:id="rId5"/>
     <p:sldId id="268" r:id="rId6"/>
     <p:sldId id="265" r:id="rId7"/>
-    <p:sldId id="271" r:id="rId8"/>
-    <p:sldId id="272" r:id="rId9"/>
-    <p:sldId id="273" r:id="rId10"/>
-    <p:sldId id="275" r:id="rId11"/>
-    <p:sldId id="276" r:id="rId12"/>
-    <p:sldId id="274" r:id="rId13"/>
-    <p:sldId id="277" r:id="rId14"/>
-    <p:sldId id="278" r:id="rId15"/>
-    <p:sldId id="269" r:id="rId16"/>
+    <p:sldId id="280" r:id="rId8"/>
+    <p:sldId id="271" r:id="rId9"/>
+    <p:sldId id="272" r:id="rId10"/>
+    <p:sldId id="273" r:id="rId11"/>
+    <p:sldId id="275" r:id="rId12"/>
+    <p:sldId id="276" r:id="rId13"/>
+    <p:sldId id="274" r:id="rId14"/>
+    <p:sldId id="277" r:id="rId15"/>
+    <p:sldId id="278" r:id="rId16"/>
+    <p:sldId id="269" r:id="rId17"/>
   </p:sldIdLst>
   <p:sldSz cx="12192000" cy="6858000"/>
   <p:notesSz cx="6858000" cy="9144000"/>
@@ -211,7 +212,7 @@
           <a:p>
             <a:fld id="{E16591F4-662A-4A0A-946C-649A53C15117}" type="datetimeFigureOut">
               <a:rPr lang="en-US" smtClean="0"/>
-              <a:t>3/3/2025</a:t>
+              <a:t>3/9/2025</a:t>
             </a:fld>
             <a:endParaRPr lang="en-US"/>
           </a:p>
@@ -1352,7 +1353,7 @@
             <a:fld id="{A5B0A250-5CC0-1746-B209-08E8B0DAE6AF}" type="datetimeFigureOut">
               <a:rPr lang="en-US" smtClean="0"/>
               <a:pPr/>
-              <a:t>3/3/2025</a:t>
+              <a:t>3/9/2025</a:t>
             </a:fld>
             <a:endParaRPr lang="en-US" dirty="0"/>
           </a:p>
@@ -3655,7 +3656,7 @@
             <a:fld id="{A549ADDE-98E8-4149-84E6-9A28F99CE161}" type="datetimeFigureOut">
               <a:rPr lang="en-US" smtClean="0"/>
               <a:pPr/>
-              <a:t>3/3/2025</a:t>
+              <a:t>3/9/2025</a:t>
             </a:fld>
             <a:endParaRPr lang="en-US"/>
           </a:p>
@@ -4289,7 +4290,7 @@
           <p:cNvPr id="2" name="Title 1">
             <a:extLst>
               <a:ext uri="{FF2B5EF4-FFF2-40B4-BE49-F238E27FC236}">
-                <a16:creationId xmlns:a16="http://schemas.microsoft.com/office/drawing/2014/main" id="{C1785F3D-A7CC-3679-1128-40C6AC72D2DA}"/>
+                <a16:creationId xmlns:a16="http://schemas.microsoft.com/office/drawing/2014/main" id="{A8151F95-4E93-A1C6-C63C-EB0EAEB284EF}"/>
               </a:ext>
             </a:extLst>
           </p:cNvPr>
@@ -4307,7 +4308,7 @@
           <a:p>
             <a:r>
               <a:rPr lang="en-US" dirty="0"/>
-              <a:t>Phase 3: Gaps will be identified</a:t>
+              <a:t>Phase2: Tool Testing &amp; Evaluation</a:t>
             </a:r>
           </a:p>
         </p:txBody>
@@ -4317,7 +4318,7 @@
           <p:cNvPr id="3" name="Content Placeholder 2">
             <a:extLst>
               <a:ext uri="{FF2B5EF4-FFF2-40B4-BE49-F238E27FC236}">
-                <a16:creationId xmlns:a16="http://schemas.microsoft.com/office/drawing/2014/main" id="{E4A415A5-311C-B079-37F1-5CAEF123C44F}"/>
+                <a16:creationId xmlns:a16="http://schemas.microsoft.com/office/drawing/2014/main" id="{9C2A44D3-CF3C-F506-0198-F73EC543B947}"/>
               </a:ext>
             </a:extLst>
           </p:cNvPr>
@@ -4335,7 +4336,7 @@
           <a:p>
             <a:r>
               <a:rPr lang="en-US" dirty="0"/>
-              <a:t>Gaps in tool capabilities will be identified and documented.</a:t>
+              <a:t>Tools will be tested and evaluated for efficiency and correctness.</a:t>
             </a:r>
           </a:p>
         </p:txBody>
@@ -4343,7 +4344,7 @@
     </p:spTree>
     <p:extLst>
       <p:ext uri="{BB962C8B-B14F-4D97-AF65-F5344CB8AC3E}">
-        <p14:creationId xmlns:p14="http://schemas.microsoft.com/office/powerpoint/2010/main" val="2667106007"/>
+        <p14:creationId xmlns:p14="http://schemas.microsoft.com/office/powerpoint/2010/main" val="3586345122"/>
       </p:ext>
     </p:extLst>
   </p:cSld>
@@ -4375,7 +4376,7 @@
           <p:cNvPr id="2" name="Title 1">
             <a:extLst>
               <a:ext uri="{FF2B5EF4-FFF2-40B4-BE49-F238E27FC236}">
-                <a16:creationId xmlns:a16="http://schemas.microsoft.com/office/drawing/2014/main" id="{700D3EF9-2D5D-CF6A-C657-99AA380D92D6}"/>
+                <a16:creationId xmlns:a16="http://schemas.microsoft.com/office/drawing/2014/main" id="{C1785F3D-A7CC-3679-1128-40C6AC72D2DA}"/>
               </a:ext>
             </a:extLst>
           </p:cNvPr>
@@ -4393,7 +4394,7 @@
           <a:p>
             <a:r>
               <a:rPr lang="en-US" dirty="0"/>
-              <a:t>Phase 4: Proposals for Solutions to gaps</a:t>
+              <a:t>Phase 3: Gaps will be identified</a:t>
             </a:r>
           </a:p>
         </p:txBody>
@@ -4403,7 +4404,7 @@
           <p:cNvPr id="3" name="Content Placeholder 2">
             <a:extLst>
               <a:ext uri="{FF2B5EF4-FFF2-40B4-BE49-F238E27FC236}">
-                <a16:creationId xmlns:a16="http://schemas.microsoft.com/office/drawing/2014/main" id="{33524BA1-61C5-77B8-73BD-01B7FFD96497}"/>
+                <a16:creationId xmlns:a16="http://schemas.microsoft.com/office/drawing/2014/main" id="{E4A415A5-311C-B079-37F1-5CAEF123C44F}"/>
               </a:ext>
             </a:extLst>
           </p:cNvPr>
@@ -4421,7 +4422,7 @@
           <a:p>
             <a:r>
               <a:rPr lang="en-US" dirty="0"/>
-              <a:t>Novel solutions to fill the gaps identified during testing and evaluation will be proposed.</a:t>
+              <a:t>Gaps in tool capabilities will be identified and documented.</a:t>
             </a:r>
           </a:p>
         </p:txBody>
@@ -4429,7 +4430,7 @@
     </p:spTree>
     <p:extLst>
       <p:ext uri="{BB962C8B-B14F-4D97-AF65-F5344CB8AC3E}">
-        <p14:creationId xmlns:p14="http://schemas.microsoft.com/office/powerpoint/2010/main" val="2077392551"/>
+        <p14:creationId xmlns:p14="http://schemas.microsoft.com/office/powerpoint/2010/main" val="2667106007"/>
       </p:ext>
     </p:extLst>
   </p:cSld>
@@ -4461,7 +4462,7 @@
           <p:cNvPr id="2" name="Title 1">
             <a:extLst>
               <a:ext uri="{FF2B5EF4-FFF2-40B4-BE49-F238E27FC236}">
-                <a16:creationId xmlns:a16="http://schemas.microsoft.com/office/drawing/2014/main" id="{814BF124-40CB-1DEC-45A9-7420B63203C2}"/>
+                <a16:creationId xmlns:a16="http://schemas.microsoft.com/office/drawing/2014/main" id="{700D3EF9-2D5D-CF6A-C657-99AA380D92D6}"/>
               </a:ext>
             </a:extLst>
           </p:cNvPr>
@@ -4479,7 +4480,7 @@
           <a:p>
             <a:r>
               <a:rPr lang="en-US" dirty="0"/>
-              <a:t>Phase 5: Summary</a:t>
+              <a:t>Phase 4: Proposals for Solutions to gaps</a:t>
             </a:r>
           </a:p>
         </p:txBody>
@@ -4489,7 +4490,7 @@
           <p:cNvPr id="3" name="Content Placeholder 2">
             <a:extLst>
               <a:ext uri="{FF2B5EF4-FFF2-40B4-BE49-F238E27FC236}">
-                <a16:creationId xmlns:a16="http://schemas.microsoft.com/office/drawing/2014/main" id="{F4B01782-F4A4-2385-91BE-8D545833B73F}"/>
+                <a16:creationId xmlns:a16="http://schemas.microsoft.com/office/drawing/2014/main" id="{33524BA1-61C5-77B8-73BD-01B7FFD96497}"/>
               </a:ext>
             </a:extLst>
           </p:cNvPr>
@@ -4507,7 +4508,7 @@
           <a:p>
             <a:r>
               <a:rPr lang="en-US" dirty="0"/>
-              <a:t>The results of the tool testing, evaluation, and gap analysis will be summarized.</a:t>
+              <a:t>Novel solutions to fill the gaps identified during testing and evaluation will be proposed.</a:t>
             </a:r>
           </a:p>
         </p:txBody>
@@ -4515,7 +4516,7 @@
     </p:spTree>
     <p:extLst>
       <p:ext uri="{BB962C8B-B14F-4D97-AF65-F5344CB8AC3E}">
-        <p14:creationId xmlns:p14="http://schemas.microsoft.com/office/powerpoint/2010/main" val="3027190851"/>
+        <p14:creationId xmlns:p14="http://schemas.microsoft.com/office/powerpoint/2010/main" val="2077392551"/>
       </p:ext>
     </p:extLst>
   </p:cSld>
@@ -4547,7 +4548,7 @@
           <p:cNvPr id="2" name="Title 1">
             <a:extLst>
               <a:ext uri="{FF2B5EF4-FFF2-40B4-BE49-F238E27FC236}">
-                <a16:creationId xmlns:a16="http://schemas.microsoft.com/office/drawing/2014/main" id="{1DFEC991-DA45-28EE-4BB4-237E5B9CD014}"/>
+                <a16:creationId xmlns:a16="http://schemas.microsoft.com/office/drawing/2014/main" id="{814BF124-40CB-1DEC-45A9-7420B63203C2}"/>
               </a:ext>
             </a:extLst>
           </p:cNvPr>
@@ -4565,7 +4566,35 @@
           <a:p>
             <a:r>
               <a:rPr lang="en-US" dirty="0"/>
-              <a:t>Questions and Answers</a:t>
+              <a:t>Phase 5: Summary</a:t>
+            </a:r>
+          </a:p>
+        </p:txBody>
+      </p:sp>
+      <p:sp>
+        <p:nvSpPr>
+          <p:cNvPr id="3" name="Content Placeholder 2">
+            <a:extLst>
+              <a:ext uri="{FF2B5EF4-FFF2-40B4-BE49-F238E27FC236}">
+                <a16:creationId xmlns:a16="http://schemas.microsoft.com/office/drawing/2014/main" id="{F4B01782-F4A4-2385-91BE-8D545833B73F}"/>
+              </a:ext>
+            </a:extLst>
+          </p:cNvPr>
+          <p:cNvSpPr>
+            <a:spLocks noGrp="1"/>
+          </p:cNvSpPr>
+          <p:nvPr>
+            <p:ph sz="quarter" idx="13"/>
+          </p:nvPr>
+        </p:nvSpPr>
+        <p:spPr/>
+        <p:txBody>
+          <a:bodyPr/>
+          <a:lstStyle/>
+          <a:p>
+            <a:r>
+              <a:rPr lang="en-US" dirty="0"/>
+              <a:t>The results of the tool testing, evaluation, and gap analysis will be summarized.</a:t>
             </a:r>
           </a:p>
         </p:txBody>
@@ -4573,7 +4602,7 @@
     </p:spTree>
     <p:extLst>
       <p:ext uri="{BB962C8B-B14F-4D97-AF65-F5344CB8AC3E}">
-        <p14:creationId xmlns:p14="http://schemas.microsoft.com/office/powerpoint/2010/main" val="1254702851"/>
+        <p14:creationId xmlns:p14="http://schemas.microsoft.com/office/powerpoint/2010/main" val="3027190851"/>
       </p:ext>
     </p:extLst>
   </p:cSld>
@@ -4605,6 +4634,64 @@
           <p:cNvPr id="2" name="Title 1">
             <a:extLst>
               <a:ext uri="{FF2B5EF4-FFF2-40B4-BE49-F238E27FC236}">
+                <a16:creationId xmlns:a16="http://schemas.microsoft.com/office/drawing/2014/main" id="{1DFEC991-DA45-28EE-4BB4-237E5B9CD014}"/>
+              </a:ext>
+            </a:extLst>
+          </p:cNvPr>
+          <p:cNvSpPr>
+            <a:spLocks noGrp="1"/>
+          </p:cNvSpPr>
+          <p:nvPr>
+            <p:ph type="title"/>
+          </p:nvPr>
+        </p:nvSpPr>
+        <p:spPr/>
+        <p:txBody>
+          <a:bodyPr/>
+          <a:lstStyle/>
+          <a:p>
+            <a:r>
+              <a:rPr lang="en-US" dirty="0"/>
+              <a:t>Questions and Answers</a:t>
+            </a:r>
+          </a:p>
+        </p:txBody>
+      </p:sp>
+    </p:spTree>
+    <p:extLst>
+      <p:ext uri="{BB962C8B-B14F-4D97-AF65-F5344CB8AC3E}">
+        <p14:creationId xmlns:p14="http://schemas.microsoft.com/office/powerpoint/2010/main" val="1254702851"/>
+      </p:ext>
+    </p:extLst>
+  </p:cSld>
+  <p:clrMapOvr>
+    <a:masterClrMapping/>
+  </p:clrMapOvr>
+</p:sld>
+</file>
+
+<file path=ppt/slides/slide15.xml><?xml version="1.0" encoding="utf-8"?>
+<p:sld xmlns:a="http://schemas.openxmlformats.org/drawingml/2006/main" xmlns:r="http://schemas.openxmlformats.org/officeDocument/2006/relationships" xmlns:p="http://schemas.openxmlformats.org/presentationml/2006/main">
+  <p:cSld>
+    <p:spTree>
+      <p:nvGrpSpPr>
+        <p:cNvPr id="1" name=""/>
+        <p:cNvGrpSpPr/>
+        <p:nvPr/>
+      </p:nvGrpSpPr>
+      <p:grpSpPr>
+        <a:xfrm>
+          <a:off x="0" y="0"/>
+          <a:ext cx="0" cy="0"/>
+          <a:chOff x="0" y="0"/>
+          <a:chExt cx="0" cy="0"/>
+        </a:xfrm>
+      </p:grpSpPr>
+      <p:sp>
+        <p:nvSpPr>
+          <p:cNvPr id="2" name="Title 1">
+            <a:extLst>
+              <a:ext uri="{FF2B5EF4-FFF2-40B4-BE49-F238E27FC236}">
                 <a16:creationId xmlns:a16="http://schemas.microsoft.com/office/drawing/2014/main" id="{2BCE957B-44B1-EC3A-B89B-D1D1854F4F93}"/>
               </a:ext>
             </a:extLst>
@@ -4669,7 +4756,7 @@
 </p:sld>
 </file>
 
-<file path=ppt/slides/slide15.xml><?xml version="1.0" encoding="utf-8"?>
+<file path=ppt/slides/slide16.xml><?xml version="1.0" encoding="utf-8"?>
 <p:sld xmlns:a="http://schemas.openxmlformats.org/drawingml/2006/main" xmlns:r="http://schemas.openxmlformats.org/officeDocument/2006/relationships" xmlns:p="http://schemas.openxmlformats.org/presentationml/2006/main">
   <p:cSld>
     <p:spTree>
@@ -5902,14 +5989,14 @@
           <p:nvPr>
             <p:extLst>
               <p:ext uri="{D42A27DB-BD31-4B8C-83A1-F6EECF244321}">
-                <p14:modId xmlns:p14="http://schemas.microsoft.com/office/powerpoint/2010/main" val="3092748252"/>
+                <p14:modId xmlns:p14="http://schemas.microsoft.com/office/powerpoint/2010/main" val="1848589861"/>
               </p:ext>
             </p:extLst>
           </p:nvPr>
         </p:nvGraphicFramePr>
         <p:xfrm>
-          <a:off x="1373843" y="904675"/>
-          <a:ext cx="9529509" cy="2145085"/>
+          <a:off x="1001428" y="1595338"/>
+          <a:ext cx="9529509" cy="1924860"/>
         </p:xfrm>
         <a:graphic>
           <a:graphicData uri="http://schemas.openxmlformats.org/drawingml/2006/table">
@@ -5954,7 +6041,7 @@
                   </a:extLst>
                 </a:gridCol>
               </a:tblGrid>
-              <a:tr h="543391">
+              <a:tr h="556910">
                 <a:tc>
                   <a:txBody>
                     <a:bodyPr/>
@@ -6027,12 +6114,12 @@
                         </a:spcAft>
                       </a:pPr>
                       <a:r>
-                        <a:rPr lang="en-US" sz="1100" kern="100">
+                        <a:rPr lang="en-US" sz="1100" kern="100" dirty="0">
                           <a:effectLst/>
                         </a:rPr>
                         <a:t>Status</a:t>
                       </a:r>
-                      <a:endParaRPr lang="en-US" sz="1100" kern="100">
+                      <a:endParaRPr lang="en-US" sz="1100" kern="100" dirty="0">
                         <a:effectLst/>
                         <a:latin typeface="Aptos" panose="020B0004020202020204" pitchFamily="34" charset="0"/>
                         <a:ea typeface="Aptos" panose="020B0004020202020204" pitchFamily="34" charset="0"/>
@@ -6100,7 +6187,7 @@
                   </a:ext>
                 </a:extLst>
               </a:tr>
-              <a:tr h="266949">
+              <a:tr h="273590">
                 <a:tc>
                   <a:txBody>
                     <a:bodyPr/>
@@ -6240,7 +6327,7 @@
                   </a:ext>
                 </a:extLst>
               </a:tr>
-              <a:tr h="266949">
+              <a:tr h="273590">
                 <a:tc>
                   <a:txBody>
                     <a:bodyPr/>
@@ -6319,7 +6406,7 @@
                           <a:ea typeface="Aptos" panose="020B0004020202020204" pitchFamily="34" charset="0"/>
                           <a:cs typeface="Times New Roman" panose="02020603050405020304" pitchFamily="18" charset="0"/>
                         </a:rPr>
-                        <a:t>Not started</a:t>
+                        <a:t>In Progress</a:t>
                       </a:r>
                     </a:p>
                   </a:txBody>
@@ -6383,7 +6470,7 @@
                   </a:ext>
                 </a:extLst>
               </a:tr>
-              <a:tr h="266949">
+              <a:tr h="273590">
                 <a:tc>
                   <a:txBody>
                     <a:bodyPr/>
@@ -6535,7 +6622,7 @@
                   </a:ext>
                 </a:extLst>
               </a:tr>
-              <a:tr h="266949">
+              <a:tr h="273590">
                 <a:tc>
                   <a:txBody>
                     <a:bodyPr/>
@@ -6687,7 +6774,7 @@
                   </a:ext>
                 </a:extLst>
               </a:tr>
-              <a:tr h="266949">
+              <a:tr h="273590">
                 <a:tc>
                   <a:txBody>
                     <a:bodyPr/>
@@ -6839,146 +6926,6 @@
                   </a:ext>
                 </a:extLst>
               </a:tr>
-              <a:tr h="266949">
-                <a:tc>
-                  <a:txBody>
-                    <a:bodyPr/>
-                    <a:lstStyle/>
-                    <a:p>
-                      <a:pPr marL="0" marR="0">
-                        <a:lnSpc>
-                          <a:spcPct val="107000"/>
-                        </a:lnSpc>
-                        <a:spcAft>
-                          <a:spcPts val="800"/>
-                        </a:spcAft>
-                      </a:pPr>
-                      <a:r>
-                        <a:rPr lang="en-US" sz="1100" kern="100" dirty="0">
-                          <a:effectLst/>
-                        </a:rPr>
-                        <a:t>M-6</a:t>
-                      </a:r>
-                      <a:endParaRPr lang="en-US" sz="1100" kern="100" dirty="0">
-                        <a:effectLst/>
-                        <a:latin typeface="Aptos" panose="020B0004020202020204" pitchFamily="34" charset="0"/>
-                        <a:ea typeface="Aptos" panose="020B0004020202020204" pitchFamily="34" charset="0"/>
-                        <a:cs typeface="Times New Roman" panose="02020603050405020304" pitchFamily="18" charset="0"/>
-                      </a:endParaRPr>
-                    </a:p>
-                  </a:txBody>
-                  <a:tcPr marL="68580" marR="68580" marT="0" marB="0"/>
-                </a:tc>
-                <a:tc>
-                  <a:txBody>
-                    <a:bodyPr/>
-                    <a:lstStyle/>
-                    <a:p>
-                      <a:pPr marL="0" marR="0">
-                        <a:lnSpc>
-                          <a:spcPct val="107000"/>
-                        </a:lnSpc>
-                        <a:spcAft>
-                          <a:spcPts val="800"/>
-                        </a:spcAft>
-                      </a:pPr>
-                      <a:r>
-                        <a:rPr lang="en-US" sz="1100" kern="100" dirty="0">
-                          <a:effectLst/>
-                          <a:latin typeface="Aptos" panose="020B0004020202020204" pitchFamily="34" charset="0"/>
-                          <a:ea typeface="Aptos" panose="020B0004020202020204" pitchFamily="34" charset="0"/>
-                          <a:cs typeface="Times New Roman" panose="02020603050405020304" pitchFamily="18" charset="0"/>
-                        </a:rPr>
-                        <a:t>Review and close other tickets as time permits</a:t>
-                      </a:r>
-                    </a:p>
-                  </a:txBody>
-                  <a:tcPr marL="68580" marR="68580" marT="0" marB="0"/>
-                </a:tc>
-                <a:tc>
-                  <a:txBody>
-                    <a:bodyPr/>
-                    <a:lstStyle/>
-                    <a:p>
-                      <a:pPr marL="0" marR="0">
-                        <a:lnSpc>
-                          <a:spcPct val="107000"/>
-                        </a:lnSpc>
-                        <a:spcAft>
-                          <a:spcPts val="800"/>
-                        </a:spcAft>
-                      </a:pPr>
-                      <a:r>
-                        <a:rPr lang="en-US" sz="1100" kern="100" dirty="0">
-                          <a:effectLst/>
-                          <a:latin typeface="Aptos" panose="020B0004020202020204" pitchFamily="34" charset="0"/>
-                          <a:ea typeface="Aptos" panose="020B0004020202020204" pitchFamily="34" charset="0"/>
-                          <a:cs typeface="Times New Roman" panose="02020603050405020304" pitchFamily="18" charset="0"/>
-                        </a:rPr>
-                        <a:t>Not started</a:t>
-                      </a:r>
-                    </a:p>
-                  </a:txBody>
-                  <a:tcPr marL="68580" marR="68580" marT="0" marB="0"/>
-                </a:tc>
-                <a:tc>
-                  <a:txBody>
-                    <a:bodyPr/>
-                    <a:lstStyle/>
-                    <a:p>
-                      <a:pPr marL="0" marR="0">
-                        <a:lnSpc>
-                          <a:spcPct val="107000"/>
-                        </a:lnSpc>
-                        <a:spcAft>
-                          <a:spcPts val="800"/>
-                        </a:spcAft>
-                      </a:pPr>
-                      <a:r>
-                        <a:rPr lang="en-US" sz="1100" kern="100" dirty="0">
-                          <a:effectLst/>
-                          <a:latin typeface="Aptos" panose="020B0004020202020204" pitchFamily="34" charset="0"/>
-                          <a:ea typeface="Aptos" panose="020B0004020202020204" pitchFamily="34" charset="0"/>
-                          <a:cs typeface="Times New Roman" panose="02020603050405020304" pitchFamily="18" charset="0"/>
-                        </a:rPr>
-                        <a:t>John</a:t>
-                      </a:r>
-                    </a:p>
-                  </a:txBody>
-                  <a:tcPr marL="68580" marR="68580" marT="0" marB="0"/>
-                </a:tc>
-                <a:tc>
-                  <a:txBody>
-                    <a:bodyPr/>
-                    <a:lstStyle/>
-                    <a:p>
-                      <a:pPr marL="0" marR="0">
-                        <a:lnSpc>
-                          <a:spcPct val="107000"/>
-                        </a:lnSpc>
-                        <a:spcAft>
-                          <a:spcPts val="800"/>
-                        </a:spcAft>
-                      </a:pPr>
-                      <a:r>
-                        <a:rPr lang="en-US" sz="1100" kern="100" dirty="0">
-                          <a:effectLst/>
-                          <a:latin typeface="Aptos" panose="020B0004020202020204" pitchFamily="34" charset="0"/>
-                          <a:ea typeface="Aptos" panose="020B0004020202020204" pitchFamily="34" charset="0"/>
-                          <a:cs typeface="Times New Roman" panose="02020603050405020304" pitchFamily="18" charset="0"/>
-                        </a:rPr>
-                        <a:t>5/7/25</a:t>
-                      </a:r>
-                    </a:p>
-                  </a:txBody>
-                  <a:tcPr marL="68580" marR="68580" marT="0" marB="0"/>
-                </a:tc>
-                <a:extLst>
-                  <a:ext uri="{0D108BD9-81ED-4DB2-BD59-A6C34878D82A}">
-                    <a16:rowId xmlns:a16="http://schemas.microsoft.com/office/drawing/2014/main" val="3091205658"/>
-                  </a:ext>
-                </a:extLst>
-              </a:tr>
             </a:tbl>
           </a:graphicData>
         </a:graphic>
@@ -7117,7 +7064,7 @@
           <p:cNvPr id="2" name="Title 1">
             <a:extLst>
               <a:ext uri="{FF2B5EF4-FFF2-40B4-BE49-F238E27FC236}">
-                <a16:creationId xmlns:a16="http://schemas.microsoft.com/office/drawing/2014/main" id="{F9C866DC-BD86-061B-9D2C-A7F5E57F918D}"/>
+                <a16:creationId xmlns:a16="http://schemas.microsoft.com/office/drawing/2014/main" id="{BB845A7C-7CE3-9A85-8828-6313C940935C}"/>
               </a:ext>
             </a:extLst>
           </p:cNvPr>
@@ -7125,7 +7072,7 @@
             <a:spLocks noGrp="1"/>
           </p:cNvSpPr>
           <p:nvPr>
-            <p:ph type="ctrTitle"/>
+            <p:ph type="title"/>
           </p:nvPr>
         </p:nvSpPr>
         <p:spPr/>
@@ -7135,17 +7082,17 @@
           <a:p>
             <a:r>
               <a:rPr lang="en-US" dirty="0"/>
-              <a:t>Research</a:t>
-            </a:r>
-          </a:p>
-        </p:txBody>
-      </p:sp>
-      <p:sp>
-        <p:nvSpPr>
-          <p:cNvPr id="3" name="Subtitle 2">
+              <a:t>Types of Work</a:t>
+            </a:r>
+          </a:p>
+        </p:txBody>
+      </p:sp>
+      <p:sp>
+        <p:nvSpPr>
+          <p:cNvPr id="3" name="Content Placeholder 2">
             <a:extLst>
               <a:ext uri="{FF2B5EF4-FFF2-40B4-BE49-F238E27FC236}">
-                <a16:creationId xmlns:a16="http://schemas.microsoft.com/office/drawing/2014/main" id="{9186E197-0B72-490E-0960-FB18FB6745BB}"/>
+                <a16:creationId xmlns:a16="http://schemas.microsoft.com/office/drawing/2014/main" id="{1C4CB6FF-AA13-B639-5135-83D64C434BBE}"/>
               </a:ext>
             </a:extLst>
           </p:cNvPr>
@@ -7153,7 +7100,7 @@
             <a:spLocks noGrp="1"/>
           </p:cNvSpPr>
           <p:nvPr>
-            <p:ph type="subTitle" idx="1"/>
+            <p:ph idx="1"/>
           </p:nvPr>
         </p:nvSpPr>
         <p:spPr/>
@@ -7163,7 +7110,42 @@
           <a:p>
             <a:r>
               <a:rPr lang="en-US" dirty="0"/>
-              <a:t>Using tools for model discovery and maintenance</a:t>
+              <a:t>Enhancements</a:t>
+            </a:r>
+          </a:p>
+          <a:p>
+            <a:pPr lvl="1"/>
+            <a:r>
+              <a:rPr lang="en-US" dirty="0"/>
+              <a:t>Refactor </a:t>
+            </a:r>
+            <a:r>
+              <a:rPr lang="en-US" dirty="0" err="1"/>
+              <a:t>Blazor</a:t>
+            </a:r>
+            <a:r>
+              <a:rPr lang="en-US" dirty="0"/>
+              <a:t> implementation</a:t>
+            </a:r>
+          </a:p>
+          <a:p>
+            <a:r>
+              <a:rPr lang="en-US" dirty="0"/>
+              <a:t>Preventative</a:t>
+            </a:r>
+          </a:p>
+          <a:p>
+            <a:pPr lvl="1"/>
+            <a:r>
+              <a:rPr lang="en-US" dirty="0"/>
+              <a:t>Add Unit Test</a:t>
+            </a:r>
+          </a:p>
+          <a:p>
+            <a:pPr lvl="1"/>
+            <a:r>
+              <a:rPr lang="en-US" dirty="0"/>
+              <a:t>Add UML Diagrams</a:t>
             </a:r>
           </a:p>
         </p:txBody>
@@ -7171,7 +7153,7 @@
     </p:spTree>
     <p:extLst>
       <p:ext uri="{BB962C8B-B14F-4D97-AF65-F5344CB8AC3E}">
-        <p14:creationId xmlns:p14="http://schemas.microsoft.com/office/powerpoint/2010/main" val="2038501767"/>
+        <p14:creationId xmlns:p14="http://schemas.microsoft.com/office/powerpoint/2010/main" val="1587089751"/>
       </p:ext>
     </p:extLst>
   </p:cSld>
@@ -7203,7 +7185,7 @@
           <p:cNvPr id="2" name="Title 1">
             <a:extLst>
               <a:ext uri="{FF2B5EF4-FFF2-40B4-BE49-F238E27FC236}">
-                <a16:creationId xmlns:a16="http://schemas.microsoft.com/office/drawing/2014/main" id="{8B7BB926-BAF9-C987-BD55-792ABF9FD5D3}"/>
+                <a16:creationId xmlns:a16="http://schemas.microsoft.com/office/drawing/2014/main" id="{F9C866DC-BD86-061B-9D2C-A7F5E57F918D}"/>
               </a:ext>
             </a:extLst>
           </p:cNvPr>
@@ -7211,7 +7193,7 @@
             <a:spLocks noGrp="1"/>
           </p:cNvSpPr>
           <p:nvPr>
-            <p:ph type="title"/>
+            <p:ph type="ctrTitle"/>
           </p:nvPr>
         </p:nvSpPr>
         <p:spPr/>
@@ -7221,17 +7203,17 @@
           <a:p>
             <a:r>
               <a:rPr lang="en-US" dirty="0"/>
-              <a:t>Phase1: Tool Identification</a:t>
-            </a:r>
-          </a:p>
-        </p:txBody>
-      </p:sp>
-      <p:sp>
-        <p:nvSpPr>
-          <p:cNvPr id="3" name="Content Placeholder 2">
+              <a:t>Research</a:t>
+            </a:r>
+          </a:p>
+        </p:txBody>
+      </p:sp>
+      <p:sp>
+        <p:nvSpPr>
+          <p:cNvPr id="3" name="Subtitle 2">
             <a:extLst>
               <a:ext uri="{FF2B5EF4-FFF2-40B4-BE49-F238E27FC236}">
-                <a16:creationId xmlns:a16="http://schemas.microsoft.com/office/drawing/2014/main" id="{D7CE732D-B116-5C66-0BC4-76B6BD58E379}"/>
+                <a16:creationId xmlns:a16="http://schemas.microsoft.com/office/drawing/2014/main" id="{9186E197-0B72-490E-0960-FB18FB6745BB}"/>
               </a:ext>
             </a:extLst>
           </p:cNvPr>
@@ -7239,7 +7221,7 @@
             <a:spLocks noGrp="1"/>
           </p:cNvSpPr>
           <p:nvPr>
-            <p:ph sz="quarter" idx="13"/>
+            <p:ph type="subTitle" idx="1"/>
           </p:nvPr>
         </p:nvSpPr>
         <p:spPr/>
@@ -7249,13 +7231,7 @@
           <a:p>
             <a:r>
               <a:rPr lang="en-US" dirty="0"/>
-              <a:t>Tools that are capable of extracting models from existing source code will be identified.</a:t>
-            </a:r>
-          </a:p>
-          <a:p>
-            <a:r>
-              <a:rPr lang="en-US" dirty="0"/>
-              <a:t>Some time will be spent learning tool capabilities and limitations. </a:t>
+              <a:t>Using tools for model discovery and maintenance</a:t>
             </a:r>
           </a:p>
         </p:txBody>
@@ -7263,7 +7239,7 @@
     </p:spTree>
     <p:extLst>
       <p:ext uri="{BB962C8B-B14F-4D97-AF65-F5344CB8AC3E}">
-        <p14:creationId xmlns:p14="http://schemas.microsoft.com/office/powerpoint/2010/main" val="2831720925"/>
+        <p14:creationId xmlns:p14="http://schemas.microsoft.com/office/powerpoint/2010/main" val="2038501767"/>
       </p:ext>
     </p:extLst>
   </p:cSld>
@@ -7295,7 +7271,7 @@
           <p:cNvPr id="2" name="Title 1">
             <a:extLst>
               <a:ext uri="{FF2B5EF4-FFF2-40B4-BE49-F238E27FC236}">
-                <a16:creationId xmlns:a16="http://schemas.microsoft.com/office/drawing/2014/main" id="{A8151F95-4E93-A1C6-C63C-EB0EAEB284EF}"/>
+                <a16:creationId xmlns:a16="http://schemas.microsoft.com/office/drawing/2014/main" id="{8B7BB926-BAF9-C987-BD55-792ABF9FD5D3}"/>
               </a:ext>
             </a:extLst>
           </p:cNvPr>
@@ -7313,7 +7289,7 @@
           <a:p>
             <a:r>
               <a:rPr lang="en-US" dirty="0"/>
-              <a:t>Phase2: Tool Testing &amp; Evaluation</a:t>
+              <a:t>Phase1: Tool Identification</a:t>
             </a:r>
           </a:p>
         </p:txBody>
@@ -7323,7 +7299,7 @@
           <p:cNvPr id="3" name="Content Placeholder 2">
             <a:extLst>
               <a:ext uri="{FF2B5EF4-FFF2-40B4-BE49-F238E27FC236}">
-                <a16:creationId xmlns:a16="http://schemas.microsoft.com/office/drawing/2014/main" id="{9C2A44D3-CF3C-F506-0198-F73EC543B947}"/>
+                <a16:creationId xmlns:a16="http://schemas.microsoft.com/office/drawing/2014/main" id="{D7CE732D-B116-5C66-0BC4-76B6BD58E379}"/>
               </a:ext>
             </a:extLst>
           </p:cNvPr>
@@ -7341,7 +7317,13 @@
           <a:p>
             <a:r>
               <a:rPr lang="en-US" dirty="0"/>
-              <a:t>Tools will be tested and evaluated for efficiency and correctness.</a:t>
+              <a:t>Tools that are capable of extracting models from existing source code will be identified.</a:t>
+            </a:r>
+          </a:p>
+          <a:p>
+            <a:r>
+              <a:rPr lang="en-US" dirty="0"/>
+              <a:t>Some time will be spent learning tool capabilities and limitations. </a:t>
             </a:r>
           </a:p>
         </p:txBody>
@@ -7349,7 +7331,7 @@
     </p:spTree>
     <p:extLst>
       <p:ext uri="{BB962C8B-B14F-4D97-AF65-F5344CB8AC3E}">
-        <p14:creationId xmlns:p14="http://schemas.microsoft.com/office/powerpoint/2010/main" val="3586345122"/>
+        <p14:creationId xmlns:p14="http://schemas.microsoft.com/office/powerpoint/2010/main" val="2831720925"/>
       </p:ext>
     </p:extLst>
   </p:cSld>

</xml_diff>

<commit_message>
Added test case for Generate Category Specific Product Count. Updated context diagram.
</commit_message>
<xml_diff>
--- a/LicenseAssetManager/docs/Maintenance/MaintenancePresentation.pptx
+++ b/LicenseAssetManager/docs/Maintenance/MaintenancePresentation.pptx
@@ -5,25 +5,26 @@
     <p:sldMasterId id="2147483820" r:id="rId1"/>
   </p:sldMasterIdLst>
   <p:notesMasterIdLst>
-    <p:notesMasterId r:id="rId18"/>
+    <p:notesMasterId r:id="rId19"/>
   </p:notesMasterIdLst>
   <p:sldIdLst>
     <p:sldId id="279" r:id="rId2"/>
     <p:sldId id="270" r:id="rId3"/>
     <p:sldId id="257" r:id="rId4"/>
-    <p:sldId id="258" r:id="rId5"/>
-    <p:sldId id="268" r:id="rId6"/>
-    <p:sldId id="265" r:id="rId7"/>
-    <p:sldId id="280" r:id="rId8"/>
-    <p:sldId id="271" r:id="rId9"/>
-    <p:sldId id="272" r:id="rId10"/>
-    <p:sldId id="273" r:id="rId11"/>
-    <p:sldId id="275" r:id="rId12"/>
-    <p:sldId id="276" r:id="rId13"/>
-    <p:sldId id="274" r:id="rId14"/>
-    <p:sldId id="277" r:id="rId15"/>
-    <p:sldId id="278" r:id="rId16"/>
-    <p:sldId id="269" r:id="rId17"/>
+    <p:sldId id="281" r:id="rId5"/>
+    <p:sldId id="258" r:id="rId6"/>
+    <p:sldId id="268" r:id="rId7"/>
+    <p:sldId id="265" r:id="rId8"/>
+    <p:sldId id="280" r:id="rId9"/>
+    <p:sldId id="271" r:id="rId10"/>
+    <p:sldId id="272" r:id="rId11"/>
+    <p:sldId id="273" r:id="rId12"/>
+    <p:sldId id="275" r:id="rId13"/>
+    <p:sldId id="276" r:id="rId14"/>
+    <p:sldId id="274" r:id="rId15"/>
+    <p:sldId id="277" r:id="rId16"/>
+    <p:sldId id="278" r:id="rId17"/>
+    <p:sldId id="269" r:id="rId18"/>
   </p:sldIdLst>
   <p:sldSz cx="12192000" cy="6858000"/>
   <p:notesSz cx="6858000" cy="9144000"/>
@@ -212,7 +213,7 @@
           <a:p>
             <a:fld id="{E16591F4-662A-4A0A-946C-649A53C15117}" type="datetimeFigureOut">
               <a:rPr lang="en-US" smtClean="0"/>
-              <a:t>3/9/2025</a:t>
+              <a:t>3/10/2025</a:t>
             </a:fld>
             <a:endParaRPr lang="en-US"/>
           </a:p>
@@ -1353,7 +1354,7 @@
             <a:fld id="{A5B0A250-5CC0-1746-B209-08E8B0DAE6AF}" type="datetimeFigureOut">
               <a:rPr lang="en-US" smtClean="0"/>
               <a:pPr/>
-              <a:t>3/9/2025</a:t>
+              <a:t>3/10/2025</a:t>
             </a:fld>
             <a:endParaRPr lang="en-US" dirty="0"/>
           </a:p>
@@ -3656,7 +3657,7 @@
             <a:fld id="{A549ADDE-98E8-4149-84E6-9A28F99CE161}" type="datetimeFigureOut">
               <a:rPr lang="en-US" smtClean="0"/>
               <a:pPr/>
-              <a:t>3/9/2025</a:t>
+              <a:t>3/10/2025</a:t>
             </a:fld>
             <a:endParaRPr lang="en-US"/>
           </a:p>
@@ -4290,7 +4291,7 @@
           <p:cNvPr id="2" name="Title 1">
             <a:extLst>
               <a:ext uri="{FF2B5EF4-FFF2-40B4-BE49-F238E27FC236}">
-                <a16:creationId xmlns:a16="http://schemas.microsoft.com/office/drawing/2014/main" id="{A8151F95-4E93-A1C6-C63C-EB0EAEB284EF}"/>
+                <a16:creationId xmlns:a16="http://schemas.microsoft.com/office/drawing/2014/main" id="{8B7BB926-BAF9-C987-BD55-792ABF9FD5D3}"/>
               </a:ext>
             </a:extLst>
           </p:cNvPr>
@@ -4308,7 +4309,7 @@
           <a:p>
             <a:r>
               <a:rPr lang="en-US" dirty="0"/>
-              <a:t>Phase2: Tool Testing &amp; Evaluation</a:t>
+              <a:t>Phase1: Tool Identification</a:t>
             </a:r>
           </a:p>
         </p:txBody>
@@ -4318,7 +4319,7 @@
           <p:cNvPr id="3" name="Content Placeholder 2">
             <a:extLst>
               <a:ext uri="{FF2B5EF4-FFF2-40B4-BE49-F238E27FC236}">
-                <a16:creationId xmlns:a16="http://schemas.microsoft.com/office/drawing/2014/main" id="{9C2A44D3-CF3C-F506-0198-F73EC543B947}"/>
+                <a16:creationId xmlns:a16="http://schemas.microsoft.com/office/drawing/2014/main" id="{D7CE732D-B116-5C66-0BC4-76B6BD58E379}"/>
               </a:ext>
             </a:extLst>
           </p:cNvPr>
@@ -4336,7 +4337,13 @@
           <a:p>
             <a:r>
               <a:rPr lang="en-US" dirty="0"/>
-              <a:t>Tools will be tested and evaluated for efficiency and correctness.</a:t>
+              <a:t>Tools that are capable of extracting models from existing source code will be identified.</a:t>
+            </a:r>
+          </a:p>
+          <a:p>
+            <a:r>
+              <a:rPr lang="en-US" dirty="0"/>
+              <a:t>Some time will be spent learning tool capabilities and limitations. </a:t>
             </a:r>
           </a:p>
         </p:txBody>
@@ -4344,7 +4351,7 @@
     </p:spTree>
     <p:extLst>
       <p:ext uri="{BB962C8B-B14F-4D97-AF65-F5344CB8AC3E}">
-        <p14:creationId xmlns:p14="http://schemas.microsoft.com/office/powerpoint/2010/main" val="3586345122"/>
+        <p14:creationId xmlns:p14="http://schemas.microsoft.com/office/powerpoint/2010/main" val="2831720925"/>
       </p:ext>
     </p:extLst>
   </p:cSld>
@@ -4376,7 +4383,7 @@
           <p:cNvPr id="2" name="Title 1">
             <a:extLst>
               <a:ext uri="{FF2B5EF4-FFF2-40B4-BE49-F238E27FC236}">
-                <a16:creationId xmlns:a16="http://schemas.microsoft.com/office/drawing/2014/main" id="{C1785F3D-A7CC-3679-1128-40C6AC72D2DA}"/>
+                <a16:creationId xmlns:a16="http://schemas.microsoft.com/office/drawing/2014/main" id="{A8151F95-4E93-A1C6-C63C-EB0EAEB284EF}"/>
               </a:ext>
             </a:extLst>
           </p:cNvPr>
@@ -4394,7 +4401,7 @@
           <a:p>
             <a:r>
               <a:rPr lang="en-US" dirty="0"/>
-              <a:t>Phase 3: Gaps will be identified</a:t>
+              <a:t>Phase2: Tool Testing &amp; Evaluation</a:t>
             </a:r>
           </a:p>
         </p:txBody>
@@ -4404,7 +4411,7 @@
           <p:cNvPr id="3" name="Content Placeholder 2">
             <a:extLst>
               <a:ext uri="{FF2B5EF4-FFF2-40B4-BE49-F238E27FC236}">
-                <a16:creationId xmlns:a16="http://schemas.microsoft.com/office/drawing/2014/main" id="{E4A415A5-311C-B079-37F1-5CAEF123C44F}"/>
+                <a16:creationId xmlns:a16="http://schemas.microsoft.com/office/drawing/2014/main" id="{9C2A44D3-CF3C-F506-0198-F73EC543B947}"/>
               </a:ext>
             </a:extLst>
           </p:cNvPr>
@@ -4422,7 +4429,7 @@
           <a:p>
             <a:r>
               <a:rPr lang="en-US" dirty="0"/>
-              <a:t>Gaps in tool capabilities will be identified and documented.</a:t>
+              <a:t>Tools will be tested and evaluated for efficiency and correctness.</a:t>
             </a:r>
           </a:p>
         </p:txBody>
@@ -4430,7 +4437,7 @@
     </p:spTree>
     <p:extLst>
       <p:ext uri="{BB962C8B-B14F-4D97-AF65-F5344CB8AC3E}">
-        <p14:creationId xmlns:p14="http://schemas.microsoft.com/office/powerpoint/2010/main" val="2667106007"/>
+        <p14:creationId xmlns:p14="http://schemas.microsoft.com/office/powerpoint/2010/main" val="3586345122"/>
       </p:ext>
     </p:extLst>
   </p:cSld>
@@ -4462,7 +4469,7 @@
           <p:cNvPr id="2" name="Title 1">
             <a:extLst>
               <a:ext uri="{FF2B5EF4-FFF2-40B4-BE49-F238E27FC236}">
-                <a16:creationId xmlns:a16="http://schemas.microsoft.com/office/drawing/2014/main" id="{700D3EF9-2D5D-CF6A-C657-99AA380D92D6}"/>
+                <a16:creationId xmlns:a16="http://schemas.microsoft.com/office/drawing/2014/main" id="{C1785F3D-A7CC-3679-1128-40C6AC72D2DA}"/>
               </a:ext>
             </a:extLst>
           </p:cNvPr>
@@ -4480,7 +4487,7 @@
           <a:p>
             <a:r>
               <a:rPr lang="en-US" dirty="0"/>
-              <a:t>Phase 4: Proposals for Solutions to gaps</a:t>
+              <a:t>Phase 3: Gaps will be identified</a:t>
             </a:r>
           </a:p>
         </p:txBody>
@@ -4490,7 +4497,7 @@
           <p:cNvPr id="3" name="Content Placeholder 2">
             <a:extLst>
               <a:ext uri="{FF2B5EF4-FFF2-40B4-BE49-F238E27FC236}">
-                <a16:creationId xmlns:a16="http://schemas.microsoft.com/office/drawing/2014/main" id="{33524BA1-61C5-77B8-73BD-01B7FFD96497}"/>
+                <a16:creationId xmlns:a16="http://schemas.microsoft.com/office/drawing/2014/main" id="{E4A415A5-311C-B079-37F1-5CAEF123C44F}"/>
               </a:ext>
             </a:extLst>
           </p:cNvPr>
@@ -4508,7 +4515,7 @@
           <a:p>
             <a:r>
               <a:rPr lang="en-US" dirty="0"/>
-              <a:t>Novel solutions to fill the gaps identified during testing and evaluation will be proposed.</a:t>
+              <a:t>Gaps in tool capabilities will be identified and documented.</a:t>
             </a:r>
           </a:p>
         </p:txBody>
@@ -4516,7 +4523,7 @@
     </p:spTree>
     <p:extLst>
       <p:ext uri="{BB962C8B-B14F-4D97-AF65-F5344CB8AC3E}">
-        <p14:creationId xmlns:p14="http://schemas.microsoft.com/office/powerpoint/2010/main" val="2077392551"/>
+        <p14:creationId xmlns:p14="http://schemas.microsoft.com/office/powerpoint/2010/main" val="2667106007"/>
       </p:ext>
     </p:extLst>
   </p:cSld>
@@ -4548,7 +4555,7 @@
           <p:cNvPr id="2" name="Title 1">
             <a:extLst>
               <a:ext uri="{FF2B5EF4-FFF2-40B4-BE49-F238E27FC236}">
-                <a16:creationId xmlns:a16="http://schemas.microsoft.com/office/drawing/2014/main" id="{814BF124-40CB-1DEC-45A9-7420B63203C2}"/>
+                <a16:creationId xmlns:a16="http://schemas.microsoft.com/office/drawing/2014/main" id="{700D3EF9-2D5D-CF6A-C657-99AA380D92D6}"/>
               </a:ext>
             </a:extLst>
           </p:cNvPr>
@@ -4566,7 +4573,7 @@
           <a:p>
             <a:r>
               <a:rPr lang="en-US" dirty="0"/>
-              <a:t>Phase 5: Summary</a:t>
+              <a:t>Phase 4: Proposals for Solutions to gaps</a:t>
             </a:r>
           </a:p>
         </p:txBody>
@@ -4576,7 +4583,7 @@
           <p:cNvPr id="3" name="Content Placeholder 2">
             <a:extLst>
               <a:ext uri="{FF2B5EF4-FFF2-40B4-BE49-F238E27FC236}">
-                <a16:creationId xmlns:a16="http://schemas.microsoft.com/office/drawing/2014/main" id="{F4B01782-F4A4-2385-91BE-8D545833B73F}"/>
+                <a16:creationId xmlns:a16="http://schemas.microsoft.com/office/drawing/2014/main" id="{33524BA1-61C5-77B8-73BD-01B7FFD96497}"/>
               </a:ext>
             </a:extLst>
           </p:cNvPr>
@@ -4594,7 +4601,7 @@
           <a:p>
             <a:r>
               <a:rPr lang="en-US" dirty="0"/>
-              <a:t>The results of the tool testing, evaluation, and gap analysis will be summarized.</a:t>
+              <a:t>Novel solutions to fill the gaps identified during testing and evaluation will be proposed.</a:t>
             </a:r>
           </a:p>
         </p:txBody>
@@ -4602,7 +4609,7 @@
     </p:spTree>
     <p:extLst>
       <p:ext uri="{BB962C8B-B14F-4D97-AF65-F5344CB8AC3E}">
-        <p14:creationId xmlns:p14="http://schemas.microsoft.com/office/powerpoint/2010/main" val="3027190851"/>
+        <p14:creationId xmlns:p14="http://schemas.microsoft.com/office/powerpoint/2010/main" val="2077392551"/>
       </p:ext>
     </p:extLst>
   </p:cSld>
@@ -4634,7 +4641,7 @@
           <p:cNvPr id="2" name="Title 1">
             <a:extLst>
               <a:ext uri="{FF2B5EF4-FFF2-40B4-BE49-F238E27FC236}">
-                <a16:creationId xmlns:a16="http://schemas.microsoft.com/office/drawing/2014/main" id="{1DFEC991-DA45-28EE-4BB4-237E5B9CD014}"/>
+                <a16:creationId xmlns:a16="http://schemas.microsoft.com/office/drawing/2014/main" id="{814BF124-40CB-1DEC-45A9-7420B63203C2}"/>
               </a:ext>
             </a:extLst>
           </p:cNvPr>
@@ -4652,7 +4659,35 @@
           <a:p>
             <a:r>
               <a:rPr lang="en-US" dirty="0"/>
-              <a:t>Questions and Answers</a:t>
+              <a:t>Phase 5: Summary</a:t>
+            </a:r>
+          </a:p>
+        </p:txBody>
+      </p:sp>
+      <p:sp>
+        <p:nvSpPr>
+          <p:cNvPr id="3" name="Content Placeholder 2">
+            <a:extLst>
+              <a:ext uri="{FF2B5EF4-FFF2-40B4-BE49-F238E27FC236}">
+                <a16:creationId xmlns:a16="http://schemas.microsoft.com/office/drawing/2014/main" id="{F4B01782-F4A4-2385-91BE-8D545833B73F}"/>
+              </a:ext>
+            </a:extLst>
+          </p:cNvPr>
+          <p:cNvSpPr>
+            <a:spLocks noGrp="1"/>
+          </p:cNvSpPr>
+          <p:nvPr>
+            <p:ph sz="quarter" idx="13"/>
+          </p:nvPr>
+        </p:nvSpPr>
+        <p:spPr/>
+        <p:txBody>
+          <a:bodyPr/>
+          <a:lstStyle/>
+          <a:p>
+            <a:r>
+              <a:rPr lang="en-US" dirty="0"/>
+              <a:t>The results of the tool testing, evaluation, and gap analysis will be summarized.</a:t>
             </a:r>
           </a:p>
         </p:txBody>
@@ -4660,7 +4695,7 @@
     </p:spTree>
     <p:extLst>
       <p:ext uri="{BB962C8B-B14F-4D97-AF65-F5344CB8AC3E}">
-        <p14:creationId xmlns:p14="http://schemas.microsoft.com/office/powerpoint/2010/main" val="1254702851"/>
+        <p14:creationId xmlns:p14="http://schemas.microsoft.com/office/powerpoint/2010/main" val="3027190851"/>
       </p:ext>
     </p:extLst>
   </p:cSld>
@@ -4692,6 +4727,64 @@
           <p:cNvPr id="2" name="Title 1">
             <a:extLst>
               <a:ext uri="{FF2B5EF4-FFF2-40B4-BE49-F238E27FC236}">
+                <a16:creationId xmlns:a16="http://schemas.microsoft.com/office/drawing/2014/main" id="{1DFEC991-DA45-28EE-4BB4-237E5B9CD014}"/>
+              </a:ext>
+            </a:extLst>
+          </p:cNvPr>
+          <p:cNvSpPr>
+            <a:spLocks noGrp="1"/>
+          </p:cNvSpPr>
+          <p:nvPr>
+            <p:ph type="title"/>
+          </p:nvPr>
+        </p:nvSpPr>
+        <p:spPr/>
+        <p:txBody>
+          <a:bodyPr/>
+          <a:lstStyle/>
+          <a:p>
+            <a:r>
+              <a:rPr lang="en-US" dirty="0"/>
+              <a:t>Questions and Answers</a:t>
+            </a:r>
+          </a:p>
+        </p:txBody>
+      </p:sp>
+    </p:spTree>
+    <p:extLst>
+      <p:ext uri="{BB962C8B-B14F-4D97-AF65-F5344CB8AC3E}">
+        <p14:creationId xmlns:p14="http://schemas.microsoft.com/office/powerpoint/2010/main" val="1254702851"/>
+      </p:ext>
+    </p:extLst>
+  </p:cSld>
+  <p:clrMapOvr>
+    <a:masterClrMapping/>
+  </p:clrMapOvr>
+</p:sld>
+</file>
+
+<file path=ppt/slides/slide16.xml><?xml version="1.0" encoding="utf-8"?>
+<p:sld xmlns:a="http://schemas.openxmlformats.org/drawingml/2006/main" xmlns:r="http://schemas.openxmlformats.org/officeDocument/2006/relationships" xmlns:p="http://schemas.openxmlformats.org/presentationml/2006/main">
+  <p:cSld>
+    <p:spTree>
+      <p:nvGrpSpPr>
+        <p:cNvPr id="1" name=""/>
+        <p:cNvGrpSpPr/>
+        <p:nvPr/>
+      </p:nvGrpSpPr>
+      <p:grpSpPr>
+        <a:xfrm>
+          <a:off x="0" y="0"/>
+          <a:ext cx="0" cy="0"/>
+          <a:chOff x="0" y="0"/>
+          <a:chExt cx="0" cy="0"/>
+        </a:xfrm>
+      </p:grpSpPr>
+      <p:sp>
+        <p:nvSpPr>
+          <p:cNvPr id="2" name="Title 1">
+            <a:extLst>
+              <a:ext uri="{FF2B5EF4-FFF2-40B4-BE49-F238E27FC236}">
                 <a16:creationId xmlns:a16="http://schemas.microsoft.com/office/drawing/2014/main" id="{2BCE957B-44B1-EC3A-B89B-D1D1854F4F93}"/>
               </a:ext>
             </a:extLst>
@@ -4756,7 +4849,7 @@
 </p:sld>
 </file>
 
-<file path=ppt/slides/slide16.xml><?xml version="1.0" encoding="utf-8"?>
+<file path=ppt/slides/slide17.xml><?xml version="1.0" encoding="utf-8"?>
 <p:sld xmlns:a="http://schemas.openxmlformats.org/drawingml/2006/main" xmlns:r="http://schemas.openxmlformats.org/officeDocument/2006/relationships" xmlns:p="http://schemas.openxmlformats.org/presentationml/2006/main">
   <p:cSld>
     <p:spTree>
@@ -5298,6 +5391,16 @@
             </a:r>
           </a:p>
           <a:p>
+            <a:pPr lvl="1">
+              <a:buFont typeface="Wingdings" pitchFamily="2" charset="2"/>
+              <a:buChar char="è"/>
+            </a:pPr>
+            <a:r>
+              <a:rPr lang="en-US" dirty="0"/>
+              <a:t>This is accomplished thru an online software subscription service</a:t>
+            </a:r>
+          </a:p>
+          <a:p>
             <a:pPr marL="457200" lvl="1" indent="0">
               <a:buNone/>
             </a:pPr>
@@ -5377,314 +5480,42 @@
           <a:chExt cx="0" cy="0"/>
         </a:xfrm>
       </p:grpSpPr>
-      <p:sp>
-        <p:nvSpPr>
-          <p:cNvPr id="2" name="Title 1">
+      <p:pic>
+        <p:nvPicPr>
+          <p:cNvPr id="5" name="Picture 4">
             <a:extLst>
               <a:ext uri="{FF2B5EF4-FFF2-40B4-BE49-F238E27FC236}">
-                <a16:creationId xmlns:a16="http://schemas.microsoft.com/office/drawing/2014/main" id="{1B97FB8D-77EC-10ED-DF38-0F27922C9925}"/>
+                <a16:creationId xmlns:a16="http://schemas.microsoft.com/office/drawing/2014/main" id="{75D08E5E-0B32-19A5-8DE1-691760410004}"/>
               </a:ext>
             </a:extLst>
           </p:cNvPr>
-          <p:cNvSpPr>
-            <a:spLocks noGrp="1"/>
-          </p:cNvSpPr>
-          <p:nvPr>
-            <p:ph type="title"/>
-          </p:nvPr>
-        </p:nvSpPr>
-        <p:spPr>
-          <a:xfrm>
-            <a:off x="786454" y="178679"/>
-            <a:ext cx="10364451" cy="944065"/>
-          </a:xfrm>
-        </p:spPr>
-        <p:txBody>
-          <a:bodyPr>
-            <a:normAutofit/>
-          </a:bodyPr>
-          <a:lstStyle/>
-          <a:p>
-            <a:r>
-              <a:rPr lang="en-US" dirty="0"/>
-              <a:t>Open-source Software License</a:t>
-            </a:r>
-          </a:p>
-        </p:txBody>
-      </p:sp>
-      <p:sp>
-        <p:nvSpPr>
-          <p:cNvPr id="3" name="Content Placeholder 2">
+          <p:cNvPicPr>
+            <a:picLocks noChangeAspect="1"/>
+          </p:cNvPicPr>
+          <p:nvPr/>
+        </p:nvPicPr>
+        <p:blipFill>
+          <a:blip r:embed="rId2"/>
+          <a:stretch>
+            <a:fillRect/>
+          </a:stretch>
+        </p:blipFill>
+        <p:spPr>
+          <a:xfrm>
+            <a:off x="1493195" y="212590"/>
+            <a:ext cx="9205609" cy="5973493"/>
+          </a:xfrm>
+          <a:prstGeom prst="rect">
+            <a:avLst/>
+          </a:prstGeom>
+        </p:spPr>
+      </p:pic>
+      <p:sp>
+        <p:nvSpPr>
+          <p:cNvPr id="6" name="TextBox 5">
             <a:extLst>
               <a:ext uri="{FF2B5EF4-FFF2-40B4-BE49-F238E27FC236}">
-                <a16:creationId xmlns:a16="http://schemas.microsoft.com/office/drawing/2014/main" id="{62FCB5B8-2560-885B-CAE0-DB5AD9D2632C}"/>
-              </a:ext>
-            </a:extLst>
-          </p:cNvPr>
-          <p:cNvSpPr>
-            <a:spLocks noGrp="1"/>
-          </p:cNvSpPr>
-          <p:nvPr>
-            <p:ph idx="1"/>
-          </p:nvPr>
-        </p:nvSpPr>
-        <p:spPr>
-          <a:xfrm>
-            <a:off x="589684" y="972273"/>
-            <a:ext cx="10364452" cy="5405377"/>
-          </a:xfrm>
-        </p:spPr>
-        <p:txBody>
-          <a:bodyPr>
-            <a:normAutofit fontScale="77500" lnSpcReduction="20000"/>
-          </a:bodyPr>
-          <a:lstStyle/>
-          <a:p>
-            <a:pPr marL="0" marR="0">
-              <a:lnSpc>
-                <a:spcPct val="107000"/>
-              </a:lnSpc>
-              <a:spcAft>
-                <a:spcPts val="800"/>
-              </a:spcAft>
-            </a:pPr>
-            <a:r>
-              <a:rPr lang="en-US" sz="1800" kern="100" dirty="0">
-                <a:effectLst/>
-                <a:latin typeface="Aptos" panose="020B0004020202020204" pitchFamily="34" charset="0"/>
-                <a:ea typeface="Aptos" panose="020B0004020202020204" pitchFamily="34" charset="0"/>
-                <a:cs typeface="Times New Roman" panose="02020603050405020304" pitchFamily="18" charset="0"/>
-              </a:rPr>
-              <a:t>The GitHub repository contains a </a:t>
-            </a:r>
-            <a:r>
-              <a:rPr lang="en-US" sz="1800" kern="100" dirty="0" err="1">
-                <a:effectLst/>
-                <a:latin typeface="Aptos" panose="020B0004020202020204" pitchFamily="34" charset="0"/>
-                <a:ea typeface="Aptos" panose="020B0004020202020204" pitchFamily="34" charset="0"/>
-                <a:cs typeface="Times New Roman" panose="02020603050405020304" pitchFamily="18" charset="0"/>
-              </a:rPr>
-              <a:t>README.md</a:t>
-            </a:r>
-            <a:r>
-              <a:rPr lang="en-US" sz="1800" kern="100" dirty="0">
-                <a:effectLst/>
-                <a:latin typeface="Aptos" panose="020B0004020202020204" pitchFamily="34" charset="0"/>
-                <a:ea typeface="Aptos" panose="020B0004020202020204" pitchFamily="34" charset="0"/>
-                <a:cs typeface="Times New Roman" panose="02020603050405020304" pitchFamily="18" charset="0"/>
-              </a:rPr>
-              <a:t> file with important project information.</a:t>
-            </a:r>
-          </a:p>
-          <a:p>
-            <a:pPr marL="0" marR="0">
-              <a:lnSpc>
-                <a:spcPct val="107000"/>
-              </a:lnSpc>
-              <a:spcAft>
-                <a:spcPts val="800"/>
-              </a:spcAft>
-            </a:pPr>
-            <a:r>
-              <a:rPr lang="en-US" sz="1800" u="sng" kern="100" dirty="0">
-                <a:solidFill>
-                  <a:srgbClr val="467886"/>
-                </a:solidFill>
-                <a:effectLst/>
-                <a:latin typeface="Aptos" panose="020B0004020202020204" pitchFamily="34" charset="0"/>
-                <a:ea typeface="Aptos" panose="020B0004020202020204" pitchFamily="34" charset="0"/>
-                <a:cs typeface="Times New Roman" panose="02020603050405020304" pitchFamily="18" charset="0"/>
-                <a:hlinkClick r:id="rId2"/>
-              </a:rPr>
-              <a:t>https://github.com/colby13king/cs5320-code/blob/master/README.md</a:t>
-            </a:r>
-            <a:endParaRPr lang="en-US" sz="1800" kern="100" dirty="0">
-              <a:effectLst/>
-              <a:latin typeface="Aptos" panose="020B0004020202020204" pitchFamily="34" charset="0"/>
-              <a:ea typeface="Aptos" panose="020B0004020202020204" pitchFamily="34" charset="0"/>
-              <a:cs typeface="Times New Roman" panose="02020603050405020304" pitchFamily="18" charset="0"/>
-            </a:endParaRPr>
-          </a:p>
-          <a:p>
-            <a:pPr marL="0" marR="0">
-              <a:lnSpc>
-                <a:spcPct val="107000"/>
-              </a:lnSpc>
-              <a:spcAft>
-                <a:spcPts val="800"/>
-              </a:spcAft>
-            </a:pPr>
-            <a:r>
-              <a:rPr lang="en-US" sz="1800" kern="100" dirty="0">
-                <a:effectLst/>
-                <a:latin typeface="Aptos" panose="020B0004020202020204" pitchFamily="34" charset="0"/>
-                <a:ea typeface="Aptos" panose="020B0004020202020204" pitchFamily="34" charset="0"/>
-                <a:cs typeface="Times New Roman" panose="02020603050405020304" pitchFamily="18" charset="0"/>
-              </a:rPr>
-              <a:t>It is also included as part of this package.</a:t>
-            </a:r>
-          </a:p>
-          <a:p>
-            <a:pPr marL="0" marR="0" indent="0">
-              <a:spcAft>
-                <a:spcPts val="1800"/>
-              </a:spcAft>
-              <a:buNone/>
-            </a:pPr>
-            <a:r>
-              <a:rPr lang="en-US" sz="1800" dirty="0">
-                <a:solidFill>
-                  <a:srgbClr val="000000"/>
-                </a:solidFill>
-                <a:effectLst/>
-                <a:latin typeface="Arial" panose="020B0604020202020204" pitchFamily="34" charset="0"/>
-                <a:ea typeface="Times New Roman" panose="02020603050405020304" pitchFamily="18" charset="0"/>
-              </a:rPr>
-              <a:t>Copyright 2024-2025 Johnny C. King and John L Williams Jr</a:t>
-            </a:r>
-          </a:p>
-          <a:p>
-            <a:pPr marL="0" marR="0" indent="0">
-              <a:spcAft>
-                <a:spcPts val="1800"/>
-              </a:spcAft>
-              <a:buNone/>
-            </a:pPr>
-            <a:r>
-              <a:rPr lang="en-US" sz="1800" dirty="0">
-                <a:solidFill>
-                  <a:srgbClr val="000000"/>
-                </a:solidFill>
-                <a:effectLst/>
-                <a:latin typeface="Libre Franklin" pitchFamily="2" charset="77"/>
-                <a:ea typeface="Times New Roman" panose="02020603050405020304" pitchFamily="18" charset="0"/>
-              </a:rPr>
-              <a:t>Permission is hereby granted, free of charge, to any person obtaining a copy of this software and associated documentation files (the “Software”), to deal in the Software without restriction, including without limitation the rights to use, copy, modify, merge, publish, distribute, sublicense, and/or sell copies of the Software, and to permit persons to whom the Software is furnished to do so, subject to the following conditions:</a:t>
-            </a:r>
-            <a:endParaRPr lang="en-US" sz="1800" dirty="0">
-              <a:effectLst/>
-              <a:latin typeface="Times New Roman" panose="02020603050405020304" pitchFamily="18" charset="0"/>
-              <a:ea typeface="Times New Roman" panose="02020603050405020304" pitchFamily="18" charset="0"/>
-            </a:endParaRPr>
-          </a:p>
-          <a:p>
-            <a:pPr marL="0" marR="0" indent="0">
-              <a:spcAft>
-                <a:spcPts val="1800"/>
-              </a:spcAft>
-              <a:buNone/>
-            </a:pPr>
-            <a:r>
-              <a:rPr lang="en-US" sz="1800" dirty="0">
-                <a:solidFill>
-                  <a:srgbClr val="000000"/>
-                </a:solidFill>
-                <a:effectLst/>
-                <a:latin typeface="Libre Franklin" pitchFamily="2" charset="77"/>
-                <a:ea typeface="Times New Roman" panose="02020603050405020304" pitchFamily="18" charset="0"/>
-              </a:rPr>
-              <a:t>The above copyright notice and this permission notice shall be included in all copies or substantial portions of the Software.</a:t>
-            </a:r>
-            <a:endParaRPr lang="en-US" sz="1800" dirty="0">
-              <a:effectLst/>
-              <a:latin typeface="Times New Roman" panose="02020603050405020304" pitchFamily="18" charset="0"/>
-              <a:ea typeface="Times New Roman" panose="02020603050405020304" pitchFamily="18" charset="0"/>
-            </a:endParaRPr>
-          </a:p>
-          <a:p>
-            <a:pPr marL="0" marR="0" indent="0">
-              <a:spcAft>
-                <a:spcPts val="1800"/>
-              </a:spcAft>
-              <a:buNone/>
-            </a:pPr>
-            <a:r>
-              <a:rPr lang="en-US" sz="1800" dirty="0">
-                <a:solidFill>
-                  <a:srgbClr val="000000"/>
-                </a:solidFill>
-                <a:latin typeface="Libre Franklin" pitchFamily="2" charset="77"/>
-                <a:ea typeface="Times New Roman" panose="02020603050405020304" pitchFamily="18" charset="0"/>
-              </a:rPr>
-              <a:t>T</a:t>
-            </a:r>
-            <a:r>
-              <a:rPr lang="en-US" sz="1800" dirty="0">
-                <a:solidFill>
-                  <a:srgbClr val="000000"/>
-                </a:solidFill>
-                <a:effectLst/>
-                <a:latin typeface="Libre Franklin" pitchFamily="2" charset="77"/>
-                <a:ea typeface="Times New Roman" panose="02020603050405020304" pitchFamily="18" charset="0"/>
-              </a:rPr>
-              <a:t>HE SOFTWARE IS PROVIDED “AS IS”, WITHOUT WARRANTY OF ANY KIND, EXPRESS OR IMPLIED, INCLUDING BUT NOT LIMITED TO THE WARRANTIES OF MERCHANTABILITY, FITNESS FOR A PARTICULAR PURPOSE AND NONINFRINGEMENT. IN NO EVENT SHALL THE AUTHORS OR COPYRIGHT HOLDERS BE LIABLE FOR ANY CLAIM, DAMAGES OR OTHER LIABILITY, WHETHER IN AN ACTION OF CONTRACT, TORT OR OTHERWISE, ARISING FROM, OUT OF OR IN CONNECTION WITH THE SOFTWARE OR THE USE OR OTHER DEALINGS IN THE SOFTWARE.</a:t>
-            </a:r>
-            <a:endParaRPr lang="en-US" sz="1800" dirty="0">
-              <a:effectLst/>
-              <a:latin typeface="Times New Roman" panose="02020603050405020304" pitchFamily="18" charset="0"/>
-              <a:ea typeface="Times New Roman" panose="02020603050405020304" pitchFamily="18" charset="0"/>
-            </a:endParaRPr>
-          </a:p>
-          <a:p>
-            <a:pPr marL="0" marR="0" indent="0">
-              <a:spcAft>
-                <a:spcPts val="1800"/>
-              </a:spcAft>
-              <a:buNone/>
-            </a:pPr>
-            <a:r>
-              <a:rPr lang="en-US" sz="1800" dirty="0">
-                <a:solidFill>
-                  <a:srgbClr val="000000"/>
-                </a:solidFill>
-                <a:effectLst/>
-                <a:latin typeface="Libre Franklin" pitchFamily="2" charset="77"/>
-                <a:ea typeface="Times New Roman" panose="02020603050405020304" pitchFamily="18" charset="0"/>
-              </a:rPr>
-              <a:t>This license is also controlled by the Manning Publisher License, who provided a great deal of guidance and source material in the creation of the application. Please read the details in the link provided below.</a:t>
-            </a:r>
-            <a:endParaRPr lang="en-US" sz="1800" dirty="0">
-              <a:effectLst/>
-              <a:latin typeface="Times New Roman" panose="02020603050405020304" pitchFamily="18" charset="0"/>
-              <a:ea typeface="Times New Roman" panose="02020603050405020304" pitchFamily="18" charset="0"/>
-            </a:endParaRPr>
-          </a:p>
-          <a:p>
-            <a:pPr marL="0" marR="0" indent="0">
-              <a:spcAft>
-                <a:spcPts val="1800"/>
-              </a:spcAft>
-              <a:buNone/>
-            </a:pPr>
-            <a:r>
-              <a:rPr lang="en-US" sz="1800" u="sng" dirty="0">
-                <a:solidFill>
-                  <a:srgbClr val="000000"/>
-                </a:solidFill>
-                <a:effectLst/>
-                <a:latin typeface="Libre Franklin" pitchFamily="2" charset="77"/>
-                <a:ea typeface="Times New Roman" panose="02020603050405020304" pitchFamily="18" charset="0"/>
-                <a:hlinkClick r:id="rId3"/>
-              </a:rPr>
-              <a:t>https://www.manning.com/ebook-license</a:t>
-            </a:r>
-            <a:endParaRPr lang="en-US" sz="1800" dirty="0">
-              <a:effectLst/>
-              <a:latin typeface="Times New Roman" panose="02020603050405020304" pitchFamily="18" charset="0"/>
-              <a:ea typeface="Times New Roman" panose="02020603050405020304" pitchFamily="18" charset="0"/>
-            </a:endParaRPr>
-          </a:p>
-          <a:p>
-            <a:endParaRPr lang="en-US" dirty="0"/>
-          </a:p>
-        </p:txBody>
-      </p:sp>
-      <p:sp>
-        <p:nvSpPr>
-          <p:cNvPr id="4" name="TextBox 3">
-            <a:extLst>
-              <a:ext uri="{FF2B5EF4-FFF2-40B4-BE49-F238E27FC236}">
-                <a16:creationId xmlns:a16="http://schemas.microsoft.com/office/drawing/2014/main" id="{C466BEC3-D302-F2B7-F8E3-B51714C4B227}"/>
+                <a16:creationId xmlns:a16="http://schemas.microsoft.com/office/drawing/2014/main" id="{5374EDF9-B0FF-D535-A89B-11CF2BAB178C}"/>
               </a:ext>
             </a:extLst>
           </p:cNvPr>
@@ -5693,8 +5524,8 @@
         </p:nvSpPr>
         <p:spPr>
           <a:xfrm>
-            <a:off x="11359376" y="297366"/>
-            <a:ext cx="300082" cy="646331"/>
+            <a:off x="4202348" y="3531140"/>
+            <a:ext cx="1233030" cy="276999"/>
           </a:xfrm>
           <a:prstGeom prst="rect">
             <a:avLst/>
@@ -5708,23 +5539,16 @@
           <a:lstStyle/>
           <a:p>
             <a:r>
-              <a:rPr lang="en-US" dirty="0">
-                <a:highlight>
-                  <a:srgbClr val="00FF00"/>
-                </a:highlight>
-              </a:rPr>
-              <a:t>_</a:t>
-            </a:r>
-          </a:p>
-          <a:p>
-            <a:endParaRPr lang="en-US" dirty="0"/>
+              <a:rPr lang="en-US" sz="1200" dirty="0"/>
+              <a:t>Future Release</a:t>
+            </a:r>
           </a:p>
         </p:txBody>
       </p:sp>
     </p:spTree>
     <p:extLst>
       <p:ext uri="{BB962C8B-B14F-4D97-AF65-F5344CB8AC3E}">
-        <p14:creationId xmlns:p14="http://schemas.microsoft.com/office/powerpoint/2010/main" val="3073130659"/>
+        <p14:creationId xmlns:p14="http://schemas.microsoft.com/office/powerpoint/2010/main" val="239245858"/>
       </p:ext>
     </p:extLst>
   </p:cSld>
@@ -5756,7 +5580,7 @@
           <p:cNvPr id="2" name="Title 1">
             <a:extLst>
               <a:ext uri="{FF2B5EF4-FFF2-40B4-BE49-F238E27FC236}">
-                <a16:creationId xmlns:a16="http://schemas.microsoft.com/office/drawing/2014/main" id="{D3D0CF5B-E8F3-EFFA-F511-41713F7FD617}"/>
+                <a16:creationId xmlns:a16="http://schemas.microsoft.com/office/drawing/2014/main" id="{1B97FB8D-77EC-10ED-DF38-0F27922C9925}"/>
               </a:ext>
             </a:extLst>
           </p:cNvPr>
@@ -5767,14 +5591,21 @@
             <p:ph type="title"/>
           </p:nvPr>
         </p:nvSpPr>
-        <p:spPr/>
-        <p:txBody>
-          <a:bodyPr/>
+        <p:spPr>
+          <a:xfrm>
+            <a:off x="786454" y="178679"/>
+            <a:ext cx="10364451" cy="944065"/>
+          </a:xfrm>
+        </p:spPr>
+        <p:txBody>
+          <a:bodyPr>
+            <a:normAutofit/>
+          </a:bodyPr>
           <a:lstStyle/>
           <a:p>
             <a:r>
               <a:rPr lang="en-US" dirty="0"/>
-              <a:t>Multi-tier Client Server Architectural Pattern</a:t>
+              <a:t>Open-source Software License</a:t>
             </a:r>
           </a:p>
         </p:txBody>
@@ -5784,7 +5615,7 @@
           <p:cNvPr id="3" name="Content Placeholder 2">
             <a:extLst>
               <a:ext uri="{FF2B5EF4-FFF2-40B4-BE49-F238E27FC236}">
-                <a16:creationId xmlns:a16="http://schemas.microsoft.com/office/drawing/2014/main" id="{C0DEA48A-4AC0-B1CA-FB0C-EA3594D40239}"/>
+                <a16:creationId xmlns:a16="http://schemas.microsoft.com/office/drawing/2014/main" id="{62FCB5B8-2560-885B-CAE0-DB5AD9D2632C}"/>
               </a:ext>
             </a:extLst>
           </p:cNvPr>
@@ -5797,87 +5628,261 @@
         </p:nvSpPr>
         <p:spPr>
           <a:xfrm>
-            <a:off x="913775" y="2367093"/>
-            <a:ext cx="4257665" cy="4125147"/>
+            <a:off x="589684" y="972273"/>
+            <a:ext cx="10364452" cy="5405377"/>
           </a:xfrm>
         </p:spPr>
         <p:txBody>
           <a:bodyPr>
-            <a:normAutofit fontScale="92500" lnSpcReduction="20000"/>
+            <a:normAutofit fontScale="77500" lnSpcReduction="20000"/>
           </a:bodyPr>
           <a:lstStyle/>
           <a:p>
-            <a:pPr marL="342900" indent="-342900">
-              <a:buFontTx/>
-              <a:buChar char="-"/>
+            <a:pPr marL="0" marR="0">
+              <a:lnSpc>
+                <a:spcPct val="107000"/>
+              </a:lnSpc>
+              <a:spcAft>
+                <a:spcPts val="800"/>
+              </a:spcAft>
             </a:pPr>
             <a:r>
-              <a:rPr lang="en-US" dirty="0"/>
-              <a:t>Good for large volume of transactions</a:t>
-            </a:r>
-          </a:p>
-          <a:p>
-            <a:pPr marL="342900" indent="-342900">
-              <a:buFontTx/>
-              <a:buChar char="-"/>
+              <a:rPr lang="en-US" sz="1800" kern="100" dirty="0">
+                <a:effectLst/>
+                <a:latin typeface="Aptos" panose="020B0004020202020204" pitchFamily="34" charset="0"/>
+                <a:ea typeface="Aptos" panose="020B0004020202020204" pitchFamily="34" charset="0"/>
+                <a:cs typeface="Times New Roman" panose="02020603050405020304" pitchFamily="18" charset="0"/>
+              </a:rPr>
+              <a:t>The GitHub repository contains a </a:t>
+            </a:r>
+            <a:r>
+              <a:rPr lang="en-US" sz="1800" kern="100" dirty="0" err="1">
+                <a:effectLst/>
+                <a:latin typeface="Aptos" panose="020B0004020202020204" pitchFamily="34" charset="0"/>
+                <a:ea typeface="Aptos" panose="020B0004020202020204" pitchFamily="34" charset="0"/>
+                <a:cs typeface="Times New Roman" panose="02020603050405020304" pitchFamily="18" charset="0"/>
+              </a:rPr>
+              <a:t>README.md</a:t>
+            </a:r>
+            <a:r>
+              <a:rPr lang="en-US" sz="1800" kern="100" dirty="0">
+                <a:effectLst/>
+                <a:latin typeface="Aptos" panose="020B0004020202020204" pitchFamily="34" charset="0"/>
+                <a:ea typeface="Aptos" panose="020B0004020202020204" pitchFamily="34" charset="0"/>
+                <a:cs typeface="Times New Roman" panose="02020603050405020304" pitchFamily="18" charset="0"/>
+              </a:rPr>
+              <a:t> file with important project information.</a:t>
+            </a:r>
+          </a:p>
+          <a:p>
+            <a:pPr marL="0" marR="0">
+              <a:lnSpc>
+                <a:spcPct val="107000"/>
+              </a:lnSpc>
+              <a:spcAft>
+                <a:spcPts val="800"/>
+              </a:spcAft>
             </a:pPr>
             <a:r>
-              <a:rPr lang="en-US" dirty="0"/>
-              <a:t>Able to scale as more clients sign up for the service it will be better for larger scale</a:t>
-            </a:r>
-          </a:p>
-          <a:p>
-            <a:pPr marL="342900" indent="-342900">
-              <a:buFontTx/>
-              <a:buChar char="-"/>
+              <a:rPr lang="en-US" sz="1800" u="sng" kern="100" dirty="0">
+                <a:solidFill>
+                  <a:srgbClr val="467886"/>
+                </a:solidFill>
+                <a:effectLst/>
+                <a:latin typeface="Aptos" panose="020B0004020202020204" pitchFamily="34" charset="0"/>
+                <a:ea typeface="Aptos" panose="020B0004020202020204" pitchFamily="34" charset="0"/>
+                <a:cs typeface="Times New Roman" panose="02020603050405020304" pitchFamily="18" charset="0"/>
+                <a:hlinkClick r:id="rId2"/>
+              </a:rPr>
+              <a:t>https://github.com/colby13king/cs5320-code/blob/master/README.md</a:t>
+            </a:r>
+            <a:endParaRPr lang="en-US" sz="1800" kern="100" dirty="0">
+              <a:effectLst/>
+              <a:latin typeface="Aptos" panose="020B0004020202020204" pitchFamily="34" charset="0"/>
+              <a:ea typeface="Aptos" panose="020B0004020202020204" pitchFamily="34" charset="0"/>
+              <a:cs typeface="Times New Roman" panose="02020603050405020304" pitchFamily="18" charset="0"/>
+            </a:endParaRPr>
+          </a:p>
+          <a:p>
+            <a:pPr marL="0" marR="0">
+              <a:lnSpc>
+                <a:spcPct val="107000"/>
+              </a:lnSpc>
+              <a:spcAft>
+                <a:spcPts val="800"/>
+              </a:spcAft>
             </a:pPr>
             <a:r>
-              <a:rPr lang="en-US" dirty="0"/>
-              <a:t>Good for applications where data is volatile</a:t>
-            </a:r>
+              <a:rPr lang="en-US" sz="1800" kern="100" dirty="0">
+                <a:effectLst/>
+                <a:latin typeface="Aptos" panose="020B0004020202020204" pitchFamily="34" charset="0"/>
+                <a:ea typeface="Aptos" panose="020B0004020202020204" pitchFamily="34" charset="0"/>
+                <a:cs typeface="Times New Roman" panose="02020603050405020304" pitchFamily="18" charset="0"/>
+              </a:rPr>
+              <a:t>It is also included as part of this package.</a:t>
+            </a:r>
+          </a:p>
+          <a:p>
+            <a:pPr marL="0" marR="0" indent="0">
+              <a:spcAft>
+                <a:spcPts val="1800"/>
+              </a:spcAft>
+              <a:buNone/>
+            </a:pPr>
+            <a:r>
+              <a:rPr lang="en-US" sz="1800" dirty="0">
+                <a:solidFill>
+                  <a:srgbClr val="000000"/>
+                </a:solidFill>
+                <a:effectLst/>
+                <a:latin typeface="Arial" panose="020B0604020202020204" pitchFamily="34" charset="0"/>
+                <a:ea typeface="Times New Roman" panose="02020603050405020304" pitchFamily="18" charset="0"/>
+              </a:rPr>
+              <a:t>Copyright 2024-2025 Johnny C. King and John L Williams Jr</a:t>
+            </a:r>
+          </a:p>
+          <a:p>
+            <a:pPr marL="0" marR="0" indent="0">
+              <a:spcAft>
+                <a:spcPts val="1800"/>
+              </a:spcAft>
+              <a:buNone/>
+            </a:pPr>
+            <a:r>
+              <a:rPr lang="en-US" sz="1800" dirty="0">
+                <a:solidFill>
+                  <a:srgbClr val="000000"/>
+                </a:solidFill>
+                <a:effectLst/>
+                <a:latin typeface="Libre Franklin" pitchFamily="2" charset="77"/>
+                <a:ea typeface="Times New Roman" panose="02020603050405020304" pitchFamily="18" charset="0"/>
+              </a:rPr>
+              <a:t>Permission is hereby granted, free of charge, to any person obtaining a copy of this software and associated documentation files (the “Software”), to deal in the Software without restriction, including without limitation the rights to use, copy, modify, merge, publish, distribute, sublicense, and/or sell copies of the Software, and to permit persons to whom the Software is furnished to do so, subject to the following conditions:</a:t>
+            </a:r>
+            <a:endParaRPr lang="en-US" sz="1800" dirty="0">
+              <a:effectLst/>
+              <a:latin typeface="Times New Roman" panose="02020603050405020304" pitchFamily="18" charset="0"/>
+              <a:ea typeface="Times New Roman" panose="02020603050405020304" pitchFamily="18" charset="0"/>
+            </a:endParaRPr>
+          </a:p>
+          <a:p>
+            <a:pPr marL="0" marR="0" indent="0">
+              <a:spcAft>
+                <a:spcPts val="1800"/>
+              </a:spcAft>
+              <a:buNone/>
+            </a:pPr>
+            <a:r>
+              <a:rPr lang="en-US" sz="1800" dirty="0">
+                <a:solidFill>
+                  <a:srgbClr val="000000"/>
+                </a:solidFill>
+                <a:effectLst/>
+                <a:latin typeface="Libre Franklin" pitchFamily="2" charset="77"/>
+                <a:ea typeface="Times New Roman" panose="02020603050405020304" pitchFamily="18" charset="0"/>
+              </a:rPr>
+              <a:t>The above copyright notice and this permission notice shall be included in all copies or substantial portions of the Software.</a:t>
+            </a:r>
+            <a:endParaRPr lang="en-US" sz="1800" dirty="0">
+              <a:effectLst/>
+              <a:latin typeface="Times New Roman" panose="02020603050405020304" pitchFamily="18" charset="0"/>
+              <a:ea typeface="Times New Roman" panose="02020603050405020304" pitchFamily="18" charset="0"/>
+            </a:endParaRPr>
+          </a:p>
+          <a:p>
+            <a:pPr marL="0" marR="0" indent="0">
+              <a:spcAft>
+                <a:spcPts val="1800"/>
+              </a:spcAft>
+              <a:buNone/>
+            </a:pPr>
+            <a:r>
+              <a:rPr lang="en-US" sz="1800" dirty="0">
+                <a:solidFill>
+                  <a:srgbClr val="000000"/>
+                </a:solidFill>
+                <a:latin typeface="Libre Franklin" pitchFamily="2" charset="77"/>
+                <a:ea typeface="Times New Roman" panose="02020603050405020304" pitchFamily="18" charset="0"/>
+              </a:rPr>
+              <a:t>T</a:t>
+            </a:r>
+            <a:r>
+              <a:rPr lang="en-US" sz="1800" dirty="0">
+                <a:solidFill>
+                  <a:srgbClr val="000000"/>
+                </a:solidFill>
+                <a:effectLst/>
+                <a:latin typeface="Libre Franklin" pitchFamily="2" charset="77"/>
+                <a:ea typeface="Times New Roman" panose="02020603050405020304" pitchFamily="18" charset="0"/>
+              </a:rPr>
+              <a:t>HE SOFTWARE IS PROVIDED “AS IS”, WITHOUT WARRANTY OF ANY KIND, EXPRESS OR IMPLIED, INCLUDING BUT NOT LIMITED TO THE WARRANTIES OF MERCHANTABILITY, FITNESS FOR A PARTICULAR PURPOSE AND NONINFRINGEMENT. IN NO EVENT SHALL THE AUTHORS OR COPYRIGHT HOLDERS BE LIABLE FOR ANY CLAIM, DAMAGES OR OTHER LIABILITY, WHETHER IN AN ACTION OF CONTRACT, TORT OR OTHERWISE, ARISING FROM, OUT OF OR IN CONNECTION WITH THE SOFTWARE OR THE USE OR OTHER DEALINGS IN THE SOFTWARE.</a:t>
+            </a:r>
+            <a:endParaRPr lang="en-US" sz="1800" dirty="0">
+              <a:effectLst/>
+              <a:latin typeface="Times New Roman" panose="02020603050405020304" pitchFamily="18" charset="0"/>
+              <a:ea typeface="Times New Roman" panose="02020603050405020304" pitchFamily="18" charset="0"/>
+            </a:endParaRPr>
+          </a:p>
+          <a:p>
+            <a:pPr marL="0" marR="0" indent="0">
+              <a:spcAft>
+                <a:spcPts val="1800"/>
+              </a:spcAft>
+              <a:buNone/>
+            </a:pPr>
+            <a:r>
+              <a:rPr lang="en-US" sz="1800" dirty="0">
+                <a:solidFill>
+                  <a:srgbClr val="000000"/>
+                </a:solidFill>
+                <a:effectLst/>
+                <a:latin typeface="Libre Franklin" pitchFamily="2" charset="77"/>
+                <a:ea typeface="Times New Roman" panose="02020603050405020304" pitchFamily="18" charset="0"/>
+              </a:rPr>
+              <a:t>This license is also controlled by the Manning Publisher License, who provided a great deal of guidance and source material in the creation of the application. Please read the details in the link provided below.</a:t>
+            </a:r>
+            <a:endParaRPr lang="en-US" sz="1800" dirty="0">
+              <a:effectLst/>
+              <a:latin typeface="Times New Roman" panose="02020603050405020304" pitchFamily="18" charset="0"/>
+              <a:ea typeface="Times New Roman" panose="02020603050405020304" pitchFamily="18" charset="0"/>
+            </a:endParaRPr>
+          </a:p>
+          <a:p>
+            <a:pPr marL="0" marR="0" indent="0">
+              <a:spcAft>
+                <a:spcPts val="1800"/>
+              </a:spcAft>
+              <a:buNone/>
+            </a:pPr>
+            <a:r>
+              <a:rPr lang="en-US" sz="1800" u="sng" dirty="0">
+                <a:solidFill>
+                  <a:srgbClr val="000000"/>
+                </a:solidFill>
+                <a:effectLst/>
+                <a:latin typeface="Libre Franklin" pitchFamily="2" charset="77"/>
+                <a:ea typeface="Times New Roman" panose="02020603050405020304" pitchFamily="18" charset="0"/>
+                <a:hlinkClick r:id="rId3"/>
+              </a:rPr>
+              <a:t>https://www.manning.com/ebook-license</a:t>
+            </a:r>
+            <a:endParaRPr lang="en-US" sz="1800" dirty="0">
+              <a:effectLst/>
+              <a:latin typeface="Times New Roman" panose="02020603050405020304" pitchFamily="18" charset="0"/>
+              <a:ea typeface="Times New Roman" panose="02020603050405020304" pitchFamily="18" charset="0"/>
+            </a:endParaRPr>
           </a:p>
           <a:p>
             <a:endParaRPr lang="en-US" dirty="0"/>
           </a:p>
         </p:txBody>
       </p:sp>
-      <p:pic>
-        <p:nvPicPr>
-          <p:cNvPr id="5" name="Content Placeholder 7" descr="A diagram of a web server&#10;&#10;Description automatically generated">
+      <p:sp>
+        <p:nvSpPr>
+          <p:cNvPr id="4" name="TextBox 3">
             <a:extLst>
               <a:ext uri="{FF2B5EF4-FFF2-40B4-BE49-F238E27FC236}">
-                <a16:creationId xmlns:a16="http://schemas.microsoft.com/office/drawing/2014/main" id="{96CAF9FE-622A-FBEF-CA61-20147D31D129}"/>
-              </a:ext>
-            </a:extLst>
-          </p:cNvPr>
-          <p:cNvPicPr>
-            <a:picLocks noChangeAspect="1"/>
-          </p:cNvPicPr>
-          <p:nvPr/>
-        </p:nvPicPr>
-        <p:blipFill>
-          <a:blip r:embed="rId2"/>
-          <a:stretch>
-            <a:fillRect/>
-          </a:stretch>
-        </p:blipFill>
-        <p:spPr>
-          <a:xfrm>
-            <a:off x="5335710" y="1943476"/>
-            <a:ext cx="6449711" cy="3902075"/>
-          </a:xfrm>
-          <a:prstGeom prst="rect">
-            <a:avLst/>
-          </a:prstGeom>
-          <a:noFill/>
-        </p:spPr>
-      </p:pic>
-      <p:sp>
-        <p:nvSpPr>
-          <p:cNvPr id="6" name="TextBox 5">
-            <a:extLst>
-              <a:ext uri="{FF2B5EF4-FFF2-40B4-BE49-F238E27FC236}">
-                <a16:creationId xmlns:a16="http://schemas.microsoft.com/office/drawing/2014/main" id="{E2770FA6-0920-360A-A878-20A46697C656}"/>
+                <a16:creationId xmlns:a16="http://schemas.microsoft.com/office/drawing/2014/main" id="{C466BEC3-D302-F2B7-F8E3-B51714C4B227}"/>
               </a:ext>
             </a:extLst>
           </p:cNvPr>
@@ -5886,8 +5891,8 @@
         </p:nvSpPr>
         <p:spPr>
           <a:xfrm>
-            <a:off x="11693055" y="185352"/>
-            <a:ext cx="300082" cy="369332"/>
+            <a:off x="11359376" y="297366"/>
+            <a:ext cx="300082" cy="646331"/>
           </a:xfrm>
           <a:prstGeom prst="rect">
             <a:avLst/>
@@ -5909,12 +5914,15 @@
               <a:t>_</a:t>
             </a:r>
           </a:p>
+          <a:p>
+            <a:endParaRPr lang="en-US" dirty="0"/>
+          </a:p>
         </p:txBody>
       </p:sp>
     </p:spTree>
     <p:extLst>
       <p:ext uri="{BB962C8B-B14F-4D97-AF65-F5344CB8AC3E}">
-        <p14:creationId xmlns:p14="http://schemas.microsoft.com/office/powerpoint/2010/main" val="3757137156"/>
+        <p14:creationId xmlns:p14="http://schemas.microsoft.com/office/powerpoint/2010/main" val="3073130659"/>
       </p:ext>
     </p:extLst>
   </p:cSld>
@@ -5946,6 +5954,196 @@
           <p:cNvPr id="2" name="Title 1">
             <a:extLst>
               <a:ext uri="{FF2B5EF4-FFF2-40B4-BE49-F238E27FC236}">
+                <a16:creationId xmlns:a16="http://schemas.microsoft.com/office/drawing/2014/main" id="{D3D0CF5B-E8F3-EFFA-F511-41713F7FD617}"/>
+              </a:ext>
+            </a:extLst>
+          </p:cNvPr>
+          <p:cNvSpPr>
+            <a:spLocks noGrp="1"/>
+          </p:cNvSpPr>
+          <p:nvPr>
+            <p:ph type="title"/>
+          </p:nvPr>
+        </p:nvSpPr>
+        <p:spPr/>
+        <p:txBody>
+          <a:bodyPr/>
+          <a:lstStyle/>
+          <a:p>
+            <a:r>
+              <a:rPr lang="en-US" dirty="0"/>
+              <a:t>Multi-tier Client Server Architectural Pattern</a:t>
+            </a:r>
+          </a:p>
+        </p:txBody>
+      </p:sp>
+      <p:sp>
+        <p:nvSpPr>
+          <p:cNvPr id="3" name="Content Placeholder 2">
+            <a:extLst>
+              <a:ext uri="{FF2B5EF4-FFF2-40B4-BE49-F238E27FC236}">
+                <a16:creationId xmlns:a16="http://schemas.microsoft.com/office/drawing/2014/main" id="{C0DEA48A-4AC0-B1CA-FB0C-EA3594D40239}"/>
+              </a:ext>
+            </a:extLst>
+          </p:cNvPr>
+          <p:cNvSpPr>
+            <a:spLocks noGrp="1"/>
+          </p:cNvSpPr>
+          <p:nvPr>
+            <p:ph idx="1"/>
+          </p:nvPr>
+        </p:nvSpPr>
+        <p:spPr>
+          <a:xfrm>
+            <a:off x="865136" y="1831939"/>
+            <a:ext cx="4257665" cy="4125147"/>
+          </a:xfrm>
+        </p:spPr>
+        <p:txBody>
+          <a:bodyPr>
+            <a:normAutofit fontScale="92500" lnSpcReduction="20000"/>
+          </a:bodyPr>
+          <a:lstStyle/>
+          <a:p>
+            <a:pPr marL="342900" indent="-342900">
+              <a:buFontTx/>
+              <a:buChar char="-"/>
+            </a:pPr>
+            <a:r>
+              <a:rPr lang="en-US" dirty="0"/>
+              <a:t>Good for large volume of transactions</a:t>
+            </a:r>
+          </a:p>
+          <a:p>
+            <a:pPr marL="342900" indent="-342900">
+              <a:buFontTx/>
+              <a:buChar char="-"/>
+            </a:pPr>
+            <a:r>
+              <a:rPr lang="en-US" dirty="0"/>
+              <a:t>Able to scale as more clients sign up for the service it will be better for larger scale</a:t>
+            </a:r>
+          </a:p>
+          <a:p>
+            <a:pPr marL="342900" indent="-342900">
+              <a:buFontTx/>
+              <a:buChar char="-"/>
+            </a:pPr>
+            <a:r>
+              <a:rPr lang="en-US" dirty="0"/>
+              <a:t>Good for applications where data is volatile</a:t>
+            </a:r>
+          </a:p>
+          <a:p>
+            <a:endParaRPr lang="en-US" dirty="0"/>
+          </a:p>
+        </p:txBody>
+      </p:sp>
+      <p:pic>
+        <p:nvPicPr>
+          <p:cNvPr id="5" name="Content Placeholder 7" descr="A diagram of a web server&#10;&#10;Description automatically generated">
+            <a:extLst>
+              <a:ext uri="{FF2B5EF4-FFF2-40B4-BE49-F238E27FC236}">
+                <a16:creationId xmlns:a16="http://schemas.microsoft.com/office/drawing/2014/main" id="{96CAF9FE-622A-FBEF-CA61-20147D31D129}"/>
+              </a:ext>
+            </a:extLst>
+          </p:cNvPr>
+          <p:cNvPicPr>
+            <a:picLocks noChangeAspect="1"/>
+          </p:cNvPicPr>
+          <p:nvPr/>
+        </p:nvPicPr>
+        <p:blipFill>
+          <a:blip r:embed="rId2"/>
+          <a:stretch>
+            <a:fillRect/>
+          </a:stretch>
+        </p:blipFill>
+        <p:spPr>
+          <a:xfrm>
+            <a:off x="5132689" y="1593280"/>
+            <a:ext cx="6449711" cy="3902075"/>
+          </a:xfrm>
+          <a:prstGeom prst="rect">
+            <a:avLst/>
+          </a:prstGeom>
+          <a:noFill/>
+        </p:spPr>
+      </p:pic>
+      <p:sp>
+        <p:nvSpPr>
+          <p:cNvPr id="6" name="TextBox 5">
+            <a:extLst>
+              <a:ext uri="{FF2B5EF4-FFF2-40B4-BE49-F238E27FC236}">
+                <a16:creationId xmlns:a16="http://schemas.microsoft.com/office/drawing/2014/main" id="{E2770FA6-0920-360A-A878-20A46697C656}"/>
+              </a:ext>
+            </a:extLst>
+          </p:cNvPr>
+          <p:cNvSpPr txBox="1"/>
+          <p:nvPr/>
+        </p:nvSpPr>
+        <p:spPr>
+          <a:xfrm>
+            <a:off x="11693055" y="185352"/>
+            <a:ext cx="300082" cy="369332"/>
+          </a:xfrm>
+          <a:prstGeom prst="rect">
+            <a:avLst/>
+          </a:prstGeom>
+          <a:noFill/>
+        </p:spPr>
+        <p:txBody>
+          <a:bodyPr wrap="none" rtlCol="0">
+            <a:spAutoFit/>
+          </a:bodyPr>
+          <a:lstStyle/>
+          <a:p>
+            <a:r>
+              <a:rPr lang="en-US" dirty="0">
+                <a:highlight>
+                  <a:srgbClr val="00FF00"/>
+                </a:highlight>
+              </a:rPr>
+              <a:t>_</a:t>
+            </a:r>
+          </a:p>
+        </p:txBody>
+      </p:sp>
+    </p:spTree>
+    <p:extLst>
+      <p:ext uri="{BB962C8B-B14F-4D97-AF65-F5344CB8AC3E}">
+        <p14:creationId xmlns:p14="http://schemas.microsoft.com/office/powerpoint/2010/main" val="3757137156"/>
+      </p:ext>
+    </p:extLst>
+  </p:cSld>
+  <p:clrMapOvr>
+    <a:masterClrMapping/>
+  </p:clrMapOvr>
+</p:sld>
+</file>
+
+<file path=ppt/slides/slide7.xml><?xml version="1.0" encoding="utf-8"?>
+<p:sld xmlns:a="http://schemas.openxmlformats.org/drawingml/2006/main" xmlns:r="http://schemas.openxmlformats.org/officeDocument/2006/relationships" xmlns:p="http://schemas.openxmlformats.org/presentationml/2006/main">
+  <p:cSld>
+    <p:spTree>
+      <p:nvGrpSpPr>
+        <p:cNvPr id="1" name=""/>
+        <p:cNvGrpSpPr/>
+        <p:nvPr/>
+      </p:nvGrpSpPr>
+      <p:grpSpPr>
+        <a:xfrm>
+          <a:off x="0" y="0"/>
+          <a:ext cx="0" cy="0"/>
+          <a:chOff x="0" y="0"/>
+          <a:chExt cx="0" cy="0"/>
+        </a:xfrm>
+      </p:grpSpPr>
+      <p:sp>
+        <p:nvSpPr>
+          <p:cNvPr id="2" name="Title 1">
+            <a:extLst>
+              <a:ext uri="{FF2B5EF4-FFF2-40B4-BE49-F238E27FC236}">
                 <a16:creationId xmlns:a16="http://schemas.microsoft.com/office/drawing/2014/main" id="{683AB63A-BE03-CBA4-0D5E-4A0DD7B0CFD2}"/>
               </a:ext>
             </a:extLst>
@@ -5989,7 +6187,7 @@
           <p:nvPr>
             <p:extLst>
               <p:ext uri="{D42A27DB-BD31-4B8C-83A1-F6EECF244321}">
-                <p14:modId xmlns:p14="http://schemas.microsoft.com/office/powerpoint/2010/main" val="1848589861"/>
+                <p14:modId xmlns:p14="http://schemas.microsoft.com/office/powerpoint/2010/main" val="4154495460"/>
               </p:ext>
             </p:extLst>
           </p:nvPr>
@@ -6517,7 +6715,7 @@
                         <a:rPr lang="en-US" sz="1100" kern="100" dirty="0">
                           <a:effectLst/>
                         </a:rPr>
-                        <a:t>Unit test and document the Cart</a:t>
+                        <a:t>Unit test and document the Cart. Refactor Blazor implementation.</a:t>
                       </a:r>
                       <a:endParaRPr lang="en-US" sz="1100" kern="100" dirty="0">
                         <a:effectLst/>
@@ -7042,127 +7240,6 @@
 </p:sld>
 </file>
 
-<file path=ppt/slides/slide7.xml><?xml version="1.0" encoding="utf-8"?>
-<p:sld xmlns:a="http://schemas.openxmlformats.org/drawingml/2006/main" xmlns:r="http://schemas.openxmlformats.org/officeDocument/2006/relationships" xmlns:p="http://schemas.openxmlformats.org/presentationml/2006/main">
-  <p:cSld>
-    <p:spTree>
-      <p:nvGrpSpPr>
-        <p:cNvPr id="1" name=""/>
-        <p:cNvGrpSpPr/>
-        <p:nvPr/>
-      </p:nvGrpSpPr>
-      <p:grpSpPr>
-        <a:xfrm>
-          <a:off x="0" y="0"/>
-          <a:ext cx="0" cy="0"/>
-          <a:chOff x="0" y="0"/>
-          <a:chExt cx="0" cy="0"/>
-        </a:xfrm>
-      </p:grpSpPr>
-      <p:sp>
-        <p:nvSpPr>
-          <p:cNvPr id="2" name="Title 1">
-            <a:extLst>
-              <a:ext uri="{FF2B5EF4-FFF2-40B4-BE49-F238E27FC236}">
-                <a16:creationId xmlns:a16="http://schemas.microsoft.com/office/drawing/2014/main" id="{BB845A7C-7CE3-9A85-8828-6313C940935C}"/>
-              </a:ext>
-            </a:extLst>
-          </p:cNvPr>
-          <p:cNvSpPr>
-            <a:spLocks noGrp="1"/>
-          </p:cNvSpPr>
-          <p:nvPr>
-            <p:ph type="title"/>
-          </p:nvPr>
-        </p:nvSpPr>
-        <p:spPr/>
-        <p:txBody>
-          <a:bodyPr/>
-          <a:lstStyle/>
-          <a:p>
-            <a:r>
-              <a:rPr lang="en-US" dirty="0"/>
-              <a:t>Types of Work</a:t>
-            </a:r>
-          </a:p>
-        </p:txBody>
-      </p:sp>
-      <p:sp>
-        <p:nvSpPr>
-          <p:cNvPr id="3" name="Content Placeholder 2">
-            <a:extLst>
-              <a:ext uri="{FF2B5EF4-FFF2-40B4-BE49-F238E27FC236}">
-                <a16:creationId xmlns:a16="http://schemas.microsoft.com/office/drawing/2014/main" id="{1C4CB6FF-AA13-B639-5135-83D64C434BBE}"/>
-              </a:ext>
-            </a:extLst>
-          </p:cNvPr>
-          <p:cNvSpPr>
-            <a:spLocks noGrp="1"/>
-          </p:cNvSpPr>
-          <p:nvPr>
-            <p:ph idx="1"/>
-          </p:nvPr>
-        </p:nvSpPr>
-        <p:spPr/>
-        <p:txBody>
-          <a:bodyPr/>
-          <a:lstStyle/>
-          <a:p>
-            <a:r>
-              <a:rPr lang="en-US" dirty="0"/>
-              <a:t>Enhancements</a:t>
-            </a:r>
-          </a:p>
-          <a:p>
-            <a:pPr lvl="1"/>
-            <a:r>
-              <a:rPr lang="en-US" dirty="0"/>
-              <a:t>Refactor </a:t>
-            </a:r>
-            <a:r>
-              <a:rPr lang="en-US" dirty="0" err="1"/>
-              <a:t>Blazor</a:t>
-            </a:r>
-            <a:r>
-              <a:rPr lang="en-US" dirty="0"/>
-              <a:t> implementation</a:t>
-            </a:r>
-          </a:p>
-          <a:p>
-            <a:r>
-              <a:rPr lang="en-US" dirty="0"/>
-              <a:t>Preventative</a:t>
-            </a:r>
-          </a:p>
-          <a:p>
-            <a:pPr lvl="1"/>
-            <a:r>
-              <a:rPr lang="en-US" dirty="0"/>
-              <a:t>Add Unit Test</a:t>
-            </a:r>
-          </a:p>
-          <a:p>
-            <a:pPr lvl="1"/>
-            <a:r>
-              <a:rPr lang="en-US" dirty="0"/>
-              <a:t>Add UML Diagrams</a:t>
-            </a:r>
-          </a:p>
-        </p:txBody>
-      </p:sp>
-    </p:spTree>
-    <p:extLst>
-      <p:ext uri="{BB962C8B-B14F-4D97-AF65-F5344CB8AC3E}">
-        <p14:creationId xmlns:p14="http://schemas.microsoft.com/office/powerpoint/2010/main" val="1587089751"/>
-      </p:ext>
-    </p:extLst>
-  </p:cSld>
-  <p:clrMapOvr>
-    <a:masterClrMapping/>
-  </p:clrMapOvr>
-</p:sld>
-</file>
-
 <file path=ppt/slides/slide8.xml><?xml version="1.0" encoding="utf-8"?>
 <p:sld xmlns:a="http://schemas.openxmlformats.org/drawingml/2006/main" xmlns:r="http://schemas.openxmlformats.org/officeDocument/2006/relationships" xmlns:p="http://schemas.openxmlformats.org/presentationml/2006/main">
   <p:cSld>
@@ -7185,7 +7262,7 @@
           <p:cNvPr id="2" name="Title 1">
             <a:extLst>
               <a:ext uri="{FF2B5EF4-FFF2-40B4-BE49-F238E27FC236}">
-                <a16:creationId xmlns:a16="http://schemas.microsoft.com/office/drawing/2014/main" id="{F9C866DC-BD86-061B-9D2C-A7F5E57F918D}"/>
+                <a16:creationId xmlns:a16="http://schemas.microsoft.com/office/drawing/2014/main" id="{BB845A7C-7CE3-9A85-8828-6313C940935C}"/>
               </a:ext>
             </a:extLst>
           </p:cNvPr>
@@ -7193,7 +7270,7 @@
             <a:spLocks noGrp="1"/>
           </p:cNvSpPr>
           <p:nvPr>
-            <p:ph type="ctrTitle"/>
+            <p:ph type="title"/>
           </p:nvPr>
         </p:nvSpPr>
         <p:spPr/>
@@ -7203,17 +7280,17 @@
           <a:p>
             <a:r>
               <a:rPr lang="en-US" dirty="0"/>
-              <a:t>Research</a:t>
-            </a:r>
-          </a:p>
-        </p:txBody>
-      </p:sp>
-      <p:sp>
-        <p:nvSpPr>
-          <p:cNvPr id="3" name="Subtitle 2">
+              <a:t>Types of Work</a:t>
+            </a:r>
+          </a:p>
+        </p:txBody>
+      </p:sp>
+      <p:sp>
+        <p:nvSpPr>
+          <p:cNvPr id="3" name="Content Placeholder 2">
             <a:extLst>
               <a:ext uri="{FF2B5EF4-FFF2-40B4-BE49-F238E27FC236}">
-                <a16:creationId xmlns:a16="http://schemas.microsoft.com/office/drawing/2014/main" id="{9186E197-0B72-490E-0960-FB18FB6745BB}"/>
+                <a16:creationId xmlns:a16="http://schemas.microsoft.com/office/drawing/2014/main" id="{1C4CB6FF-AA13-B639-5135-83D64C434BBE}"/>
               </a:ext>
             </a:extLst>
           </p:cNvPr>
@@ -7221,7 +7298,7 @@
             <a:spLocks noGrp="1"/>
           </p:cNvSpPr>
           <p:nvPr>
-            <p:ph type="subTitle" idx="1"/>
+            <p:ph idx="1"/>
           </p:nvPr>
         </p:nvSpPr>
         <p:spPr/>
@@ -7231,7 +7308,42 @@
           <a:p>
             <a:r>
               <a:rPr lang="en-US" dirty="0"/>
-              <a:t>Using tools for model discovery and maintenance</a:t>
+              <a:t>Enhancements</a:t>
+            </a:r>
+          </a:p>
+          <a:p>
+            <a:pPr lvl="1"/>
+            <a:r>
+              <a:rPr lang="en-US" dirty="0"/>
+              <a:t>Refactor </a:t>
+            </a:r>
+            <a:r>
+              <a:rPr lang="en-US" dirty="0" err="1"/>
+              <a:t>Blazor</a:t>
+            </a:r>
+            <a:r>
+              <a:rPr lang="en-US" dirty="0"/>
+              <a:t> implementation</a:t>
+            </a:r>
+          </a:p>
+          <a:p>
+            <a:r>
+              <a:rPr lang="en-US" dirty="0"/>
+              <a:t>Preventative</a:t>
+            </a:r>
+          </a:p>
+          <a:p>
+            <a:pPr lvl="1"/>
+            <a:r>
+              <a:rPr lang="en-US" dirty="0"/>
+              <a:t>Add Unit Test</a:t>
+            </a:r>
+          </a:p>
+          <a:p>
+            <a:pPr lvl="1"/>
+            <a:r>
+              <a:rPr lang="en-US" dirty="0"/>
+              <a:t>Add UML Diagrams</a:t>
             </a:r>
           </a:p>
         </p:txBody>
@@ -7239,7 +7351,7 @@
     </p:spTree>
     <p:extLst>
       <p:ext uri="{BB962C8B-B14F-4D97-AF65-F5344CB8AC3E}">
-        <p14:creationId xmlns:p14="http://schemas.microsoft.com/office/powerpoint/2010/main" val="2038501767"/>
+        <p14:creationId xmlns:p14="http://schemas.microsoft.com/office/powerpoint/2010/main" val="1587089751"/>
       </p:ext>
     </p:extLst>
   </p:cSld>
@@ -7271,7 +7383,7 @@
           <p:cNvPr id="2" name="Title 1">
             <a:extLst>
               <a:ext uri="{FF2B5EF4-FFF2-40B4-BE49-F238E27FC236}">
-                <a16:creationId xmlns:a16="http://schemas.microsoft.com/office/drawing/2014/main" id="{8B7BB926-BAF9-C987-BD55-792ABF9FD5D3}"/>
+                <a16:creationId xmlns:a16="http://schemas.microsoft.com/office/drawing/2014/main" id="{F9C866DC-BD86-061B-9D2C-A7F5E57F918D}"/>
               </a:ext>
             </a:extLst>
           </p:cNvPr>
@@ -7279,7 +7391,7 @@
             <a:spLocks noGrp="1"/>
           </p:cNvSpPr>
           <p:nvPr>
-            <p:ph type="title"/>
+            <p:ph type="ctrTitle"/>
           </p:nvPr>
         </p:nvSpPr>
         <p:spPr/>
@@ -7289,17 +7401,17 @@
           <a:p>
             <a:r>
               <a:rPr lang="en-US" dirty="0"/>
-              <a:t>Phase1: Tool Identification</a:t>
-            </a:r>
-          </a:p>
-        </p:txBody>
-      </p:sp>
-      <p:sp>
-        <p:nvSpPr>
-          <p:cNvPr id="3" name="Content Placeholder 2">
+              <a:t>Research</a:t>
+            </a:r>
+          </a:p>
+        </p:txBody>
+      </p:sp>
+      <p:sp>
+        <p:nvSpPr>
+          <p:cNvPr id="3" name="Subtitle 2">
             <a:extLst>
               <a:ext uri="{FF2B5EF4-FFF2-40B4-BE49-F238E27FC236}">
-                <a16:creationId xmlns:a16="http://schemas.microsoft.com/office/drawing/2014/main" id="{D7CE732D-B116-5C66-0BC4-76B6BD58E379}"/>
+                <a16:creationId xmlns:a16="http://schemas.microsoft.com/office/drawing/2014/main" id="{9186E197-0B72-490E-0960-FB18FB6745BB}"/>
               </a:ext>
             </a:extLst>
           </p:cNvPr>
@@ -7307,7 +7419,7 @@
             <a:spLocks noGrp="1"/>
           </p:cNvSpPr>
           <p:nvPr>
-            <p:ph sz="quarter" idx="13"/>
+            <p:ph type="subTitle" idx="1"/>
           </p:nvPr>
         </p:nvSpPr>
         <p:spPr/>
@@ -7317,13 +7429,7 @@
           <a:p>
             <a:r>
               <a:rPr lang="en-US" dirty="0"/>
-              <a:t>Tools that are capable of extracting models from existing source code will be identified.</a:t>
-            </a:r>
-          </a:p>
-          <a:p>
-            <a:r>
-              <a:rPr lang="en-US" dirty="0"/>
-              <a:t>Some time will be spent learning tool capabilities and limitations. </a:t>
+              <a:t>Using tools for model discovery and maintenance</a:t>
             </a:r>
           </a:p>
         </p:txBody>
@@ -7331,7 +7437,7 @@
     </p:spTree>
     <p:extLst>
       <p:ext uri="{BB962C8B-B14F-4D97-AF65-F5344CB8AC3E}">
-        <p14:creationId xmlns:p14="http://schemas.microsoft.com/office/powerpoint/2010/main" val="2831720925"/>
+        <p14:creationId xmlns:p14="http://schemas.microsoft.com/office/powerpoint/2010/main" val="2038501767"/>
       </p:ext>
     </p:extLst>
   </p:cSld>

</xml_diff>

<commit_message>
Updated SW Maintenance Presentation
Updated final presentation
</commit_message>
<xml_diff>
--- a/LicenseAssetManager/docs/Maintenance/MaintenancePresentation.pptx
+++ b/LicenseAssetManager/docs/Maintenance/MaintenancePresentation.pptx
@@ -5,26 +5,32 @@
     <p:sldMasterId id="2147483820" r:id="rId1"/>
   </p:sldMasterIdLst>
   <p:notesMasterIdLst>
-    <p:notesMasterId r:id="rId19"/>
+    <p:notesMasterId r:id="rId25"/>
   </p:notesMasterIdLst>
   <p:sldIdLst>
     <p:sldId id="279" r:id="rId2"/>
     <p:sldId id="270" r:id="rId3"/>
     <p:sldId id="257" r:id="rId4"/>
-    <p:sldId id="281" r:id="rId5"/>
+    <p:sldId id="265" r:id="rId5"/>
     <p:sldId id="258" r:id="rId6"/>
-    <p:sldId id="268" r:id="rId7"/>
-    <p:sldId id="265" r:id="rId8"/>
-    <p:sldId id="280" r:id="rId9"/>
-    <p:sldId id="271" r:id="rId10"/>
-    <p:sldId id="272" r:id="rId11"/>
-    <p:sldId id="273" r:id="rId12"/>
-    <p:sldId id="275" r:id="rId13"/>
-    <p:sldId id="276" r:id="rId14"/>
-    <p:sldId id="274" r:id="rId15"/>
-    <p:sldId id="277" r:id="rId16"/>
-    <p:sldId id="278" r:id="rId17"/>
-    <p:sldId id="269" r:id="rId18"/>
+    <p:sldId id="283" r:id="rId7"/>
+    <p:sldId id="281" r:id="rId8"/>
+    <p:sldId id="268" r:id="rId9"/>
+    <p:sldId id="280" r:id="rId10"/>
+    <p:sldId id="285" r:id="rId11"/>
+    <p:sldId id="286" r:id="rId12"/>
+    <p:sldId id="287" r:id="rId13"/>
+    <p:sldId id="271" r:id="rId14"/>
+    <p:sldId id="272" r:id="rId15"/>
+    <p:sldId id="273" r:id="rId16"/>
+    <p:sldId id="288" r:id="rId17"/>
+    <p:sldId id="276" r:id="rId18"/>
+    <p:sldId id="274" r:id="rId19"/>
+    <p:sldId id="289" r:id="rId20"/>
+    <p:sldId id="277" r:id="rId21"/>
+    <p:sldId id="284" r:id="rId22"/>
+    <p:sldId id="278" r:id="rId23"/>
+    <p:sldId id="269" r:id="rId24"/>
   </p:sldIdLst>
   <p:sldSz cx="12192000" cy="6858000"/>
   <p:notesSz cx="6858000" cy="9144000"/>
@@ -213,7 +219,7 @@
           <a:p>
             <a:fld id="{E16591F4-662A-4A0A-946C-649A53C15117}" type="datetimeFigureOut">
               <a:rPr lang="en-US" smtClean="0"/>
-              <a:t>3/10/2025</a:t>
+              <a:t>4/14/2025</a:t>
             </a:fld>
             <a:endParaRPr lang="en-US"/>
           </a:p>
@@ -1354,7 +1360,7 @@
             <a:fld id="{A5B0A250-5CC0-1746-B209-08E8B0DAE6AF}" type="datetimeFigureOut">
               <a:rPr lang="en-US" smtClean="0"/>
               <a:pPr/>
-              <a:t>3/10/2025</a:t>
+              <a:t>4/14/2025</a:t>
             </a:fld>
             <a:endParaRPr lang="en-US" dirty="0"/>
           </a:p>
@@ -3657,7 +3663,7 @@
             <a:fld id="{A549ADDE-98E8-4149-84E6-9A28F99CE161}" type="datetimeFigureOut">
               <a:rPr lang="en-US" smtClean="0"/>
               <a:pPr/>
-              <a:t>3/10/2025</a:t>
+              <a:t>4/14/2025</a:t>
             </a:fld>
             <a:endParaRPr lang="en-US"/>
           </a:p>
@@ -4171,7 +4177,14 @@
           <a:p>
             <a:r>
               <a:rPr lang="en-US" dirty="0"/>
-              <a:t>Graduate Team 3’s semester project: Model Discovery</a:t>
+              <a:t>Graduate Team 3 </a:t>
+            </a:r>
+            <a:br>
+              <a:rPr lang="en-US" dirty="0"/>
+            </a:br>
+            <a:r>
+              <a:rPr lang="en-US" sz="1800" dirty="0"/>
+              <a:t>Project Title: Using Model Discovery on an ASP.NET application to provide understanding of the systems structure to the Maintenance Team</a:t>
             </a:r>
           </a:p>
         </p:txBody>
@@ -4212,7 +4225,7 @@
           <a:p>
             <a:r>
               <a:rPr lang="en-US" dirty="0"/>
-              <a:t>Mid-term Presentation</a:t>
+              <a:t>Semester Project Final Presentation</a:t>
             </a:r>
           </a:p>
           <a:p>
@@ -4274,7 +4287,13 @@
   <p:cSld>
     <p:spTree>
       <p:nvGrpSpPr>
-        <p:cNvPr id="1" name=""/>
+        <p:cNvPr id="1" name="">
+          <a:extLst>
+            <a:ext uri="{FF2B5EF4-FFF2-40B4-BE49-F238E27FC236}">
+              <a16:creationId xmlns:a16="http://schemas.microsoft.com/office/drawing/2014/main" id="{A169BB85-8C04-26CA-BBD6-570AEA49E9D7}"/>
+            </a:ext>
+          </a:extLst>
+        </p:cNvPr>
         <p:cNvGrpSpPr/>
         <p:nvPr/>
       </p:nvGrpSpPr>
@@ -4291,7 +4310,7 @@
           <p:cNvPr id="2" name="Title 1">
             <a:extLst>
               <a:ext uri="{FF2B5EF4-FFF2-40B4-BE49-F238E27FC236}">
-                <a16:creationId xmlns:a16="http://schemas.microsoft.com/office/drawing/2014/main" id="{8B7BB926-BAF9-C987-BD55-792ABF9FD5D3}"/>
+                <a16:creationId xmlns:a16="http://schemas.microsoft.com/office/drawing/2014/main" id="{3D138CCE-9FF4-D98F-73E7-7516FF670653}"/>
               </a:ext>
             </a:extLst>
           </p:cNvPr>
@@ -4309,7 +4328,7 @@
           <a:p>
             <a:r>
               <a:rPr lang="en-US" dirty="0"/>
-              <a:t>Phase1: Tool Identification</a:t>
+              <a:t>Relevance to Classroom Instruction</a:t>
             </a:r>
           </a:p>
         </p:txBody>
@@ -4319,7 +4338,7 @@
           <p:cNvPr id="3" name="Content Placeholder 2">
             <a:extLst>
               <a:ext uri="{FF2B5EF4-FFF2-40B4-BE49-F238E27FC236}">
-                <a16:creationId xmlns:a16="http://schemas.microsoft.com/office/drawing/2014/main" id="{D7CE732D-B116-5C66-0BC4-76B6BD58E379}"/>
+                <a16:creationId xmlns:a16="http://schemas.microsoft.com/office/drawing/2014/main" id="{4913F3A0-DA87-9C72-9C5C-FBBCA93803BF}"/>
               </a:ext>
             </a:extLst>
           </p:cNvPr>
@@ -4327,23 +4346,65 @@
             <a:spLocks noGrp="1"/>
           </p:cNvSpPr>
           <p:nvPr>
-            <p:ph sz="quarter" idx="13"/>
+            <p:ph idx="1"/>
           </p:nvPr>
         </p:nvSpPr>
         <p:spPr/>
         <p:txBody>
-          <a:bodyPr/>
-          <a:lstStyle/>
-          <a:p>
-            <a:r>
-              <a:rPr lang="en-US" dirty="0"/>
-              <a:t>Tools that are capable of extracting models from existing source code will be identified.</a:t>
-            </a:r>
-          </a:p>
-          <a:p>
-            <a:r>
-              <a:rPr lang="en-US" dirty="0"/>
-              <a:t>Some time will be spent learning tool capabilities and limitations. </a:t>
+          <a:bodyPr>
+            <a:normAutofit fontScale="92500" lnSpcReduction="10000"/>
+          </a:bodyPr>
+          <a:lstStyle/>
+          <a:p>
+            <a:r>
+              <a:rPr lang="en-US" dirty="0"/>
+              <a:t>Context Diagram</a:t>
+            </a:r>
+          </a:p>
+          <a:p>
+            <a:r>
+              <a:rPr lang="en-US" dirty="0"/>
+              <a:t>UML Use Case Diagrams</a:t>
+            </a:r>
+          </a:p>
+          <a:p>
+            <a:pPr lvl="1"/>
+            <a:r>
+              <a:rPr lang="en-US" dirty="0"/>
+              <a:t>Updated to show the systems required features.</a:t>
+            </a:r>
+          </a:p>
+          <a:p>
+            <a:pPr lvl="1"/>
+            <a:r>
+              <a:rPr lang="en-US" dirty="0"/>
+              <a:t>Helped create a mental model of the system to increase program comprehension.</a:t>
+            </a:r>
+          </a:p>
+          <a:p>
+            <a:r>
+              <a:rPr lang="en-US" dirty="0"/>
+              <a:t>UML Class Diagrams</a:t>
+            </a:r>
+          </a:p>
+          <a:p>
+            <a:pPr lvl="1"/>
+            <a:r>
+              <a:rPr lang="en-US" dirty="0"/>
+              <a:t>Generated using Enterprise Architect</a:t>
+            </a:r>
+          </a:p>
+          <a:p>
+            <a:r>
+              <a:rPr lang="en-US" dirty="0"/>
+              <a:t>Unit Test</a:t>
+            </a:r>
+          </a:p>
+          <a:p>
+            <a:pPr lvl="1"/>
+            <a:r>
+              <a:rPr lang="en-US" dirty="0"/>
+              <a:t>Added unit test to demonstrate that the system meets the requirements.</a:t>
             </a:r>
           </a:p>
         </p:txBody>
@@ -4351,7 +4412,7 @@
     </p:spTree>
     <p:extLst>
       <p:ext uri="{BB962C8B-B14F-4D97-AF65-F5344CB8AC3E}">
-        <p14:creationId xmlns:p14="http://schemas.microsoft.com/office/powerpoint/2010/main" val="2831720925"/>
+        <p14:creationId xmlns:p14="http://schemas.microsoft.com/office/powerpoint/2010/main" val="2597371130"/>
       </p:ext>
     </p:extLst>
   </p:cSld>
@@ -4366,7 +4427,13 @@
   <p:cSld>
     <p:spTree>
       <p:nvGrpSpPr>
-        <p:cNvPr id="1" name=""/>
+        <p:cNvPr id="1" name="">
+          <a:extLst>
+            <a:ext uri="{FF2B5EF4-FFF2-40B4-BE49-F238E27FC236}">
+              <a16:creationId xmlns:a16="http://schemas.microsoft.com/office/drawing/2014/main" id="{5D17E8BA-89EF-ED3F-7D6C-61B095E4C318}"/>
+            </a:ext>
+          </a:extLst>
+        </p:cNvPr>
         <p:cNvGrpSpPr/>
         <p:nvPr/>
       </p:nvGrpSpPr>
@@ -4383,7 +4450,7 @@
           <p:cNvPr id="2" name="Title 1">
             <a:extLst>
               <a:ext uri="{FF2B5EF4-FFF2-40B4-BE49-F238E27FC236}">
-                <a16:creationId xmlns:a16="http://schemas.microsoft.com/office/drawing/2014/main" id="{A8151F95-4E93-A1C6-C63C-EB0EAEB284EF}"/>
+                <a16:creationId xmlns:a16="http://schemas.microsoft.com/office/drawing/2014/main" id="{6957CF8D-612B-45B0-6402-ABDB885EB662}"/>
               </a:ext>
             </a:extLst>
           </p:cNvPr>
@@ -4401,7 +4468,7 @@
           <a:p>
             <a:r>
               <a:rPr lang="en-US" dirty="0"/>
-              <a:t>Phase2: Tool Testing &amp; Evaluation</a:t>
+              <a:t>Relevance to Classroom Instruction</a:t>
             </a:r>
           </a:p>
         </p:txBody>
@@ -4411,7 +4478,7 @@
           <p:cNvPr id="3" name="Content Placeholder 2">
             <a:extLst>
               <a:ext uri="{FF2B5EF4-FFF2-40B4-BE49-F238E27FC236}">
-                <a16:creationId xmlns:a16="http://schemas.microsoft.com/office/drawing/2014/main" id="{9C2A44D3-CF3C-F506-0198-F73EC543B947}"/>
+                <a16:creationId xmlns:a16="http://schemas.microsoft.com/office/drawing/2014/main" id="{A4B8E6A6-6F39-1CCD-DB26-D91E3D2B447D}"/>
               </a:ext>
             </a:extLst>
           </p:cNvPr>
@@ -4419,17 +4486,65 @@
             <a:spLocks noGrp="1"/>
           </p:cNvSpPr>
           <p:nvPr>
-            <p:ph sz="quarter" idx="13"/>
+            <p:ph idx="1"/>
           </p:nvPr>
         </p:nvSpPr>
         <p:spPr/>
         <p:txBody>
-          <a:bodyPr/>
-          <a:lstStyle/>
-          <a:p>
-            <a:r>
-              <a:rPr lang="en-US" dirty="0"/>
-              <a:t>Tools will be tested and evaluated for efficiency and correctness.</a:t>
+          <a:bodyPr>
+            <a:normAutofit lnSpcReduction="10000"/>
+          </a:bodyPr>
+          <a:lstStyle/>
+          <a:p>
+            <a:r>
+              <a:rPr lang="en-US" dirty="0"/>
+              <a:t>Component Test (System Test – Unit Test)</a:t>
+            </a:r>
+          </a:p>
+          <a:p>
+            <a:pPr lvl="1"/>
+            <a:r>
+              <a:rPr lang="en-US" dirty="0"/>
+              <a:t>Example: Test Viewing the Stores Products</a:t>
+            </a:r>
+          </a:p>
+          <a:p>
+            <a:r>
+              <a:rPr lang="en-US" dirty="0"/>
+              <a:t>System Testing</a:t>
+            </a:r>
+          </a:p>
+          <a:p>
+            <a:r>
+              <a:rPr lang="en-US" dirty="0"/>
+              <a:t>Automated Testing</a:t>
+            </a:r>
+          </a:p>
+          <a:p>
+            <a:pPr lvl="1"/>
+            <a:r>
+              <a:rPr lang="en-US" dirty="0"/>
+              <a:t>Used Visual Studio Test Explorer to automate testing</a:t>
+            </a:r>
+          </a:p>
+          <a:p>
+            <a:pPr lvl="1"/>
+            <a:r>
+              <a:rPr lang="en-US" dirty="0"/>
+              <a:t>Helped ensure that updates did not break the system</a:t>
+            </a:r>
+          </a:p>
+          <a:p>
+            <a:r>
+              <a:rPr lang="en-US" dirty="0"/>
+              <a:t>Activity based Software Maintenance</a:t>
+            </a:r>
+          </a:p>
+          <a:p>
+            <a:pPr lvl="1"/>
+            <a:r>
+              <a:rPr lang="en-US" dirty="0"/>
+              <a:t>Enhancement to refactor Blazor implementation without changing the requirements</a:t>
             </a:r>
           </a:p>
         </p:txBody>
@@ -4437,7 +4552,7 @@
     </p:spTree>
     <p:extLst>
       <p:ext uri="{BB962C8B-B14F-4D97-AF65-F5344CB8AC3E}">
-        <p14:creationId xmlns:p14="http://schemas.microsoft.com/office/powerpoint/2010/main" val="3586345122"/>
+        <p14:creationId xmlns:p14="http://schemas.microsoft.com/office/powerpoint/2010/main" val="2754382633"/>
       </p:ext>
     </p:extLst>
   </p:cSld>
@@ -4452,7 +4567,13 @@
   <p:cSld>
     <p:spTree>
       <p:nvGrpSpPr>
-        <p:cNvPr id="1" name=""/>
+        <p:cNvPr id="1" name="">
+          <a:extLst>
+            <a:ext uri="{FF2B5EF4-FFF2-40B4-BE49-F238E27FC236}">
+              <a16:creationId xmlns:a16="http://schemas.microsoft.com/office/drawing/2014/main" id="{AD378217-10DB-89C9-BE0B-95BD9D55F073}"/>
+            </a:ext>
+          </a:extLst>
+        </p:cNvPr>
         <p:cNvGrpSpPr/>
         <p:nvPr/>
       </p:nvGrpSpPr>
@@ -4469,7 +4590,7 @@
           <p:cNvPr id="2" name="Title 1">
             <a:extLst>
               <a:ext uri="{FF2B5EF4-FFF2-40B4-BE49-F238E27FC236}">
-                <a16:creationId xmlns:a16="http://schemas.microsoft.com/office/drawing/2014/main" id="{C1785F3D-A7CC-3679-1128-40C6AC72D2DA}"/>
+                <a16:creationId xmlns:a16="http://schemas.microsoft.com/office/drawing/2014/main" id="{125BA8CB-CED1-1344-E133-85D49755CACC}"/>
               </a:ext>
             </a:extLst>
           </p:cNvPr>
@@ -4487,7 +4608,7 @@
           <a:p>
             <a:r>
               <a:rPr lang="en-US" dirty="0"/>
-              <a:t>Phase 3: Gaps will be identified</a:t>
+              <a:t>Relevance to Classroom Instruction</a:t>
             </a:r>
           </a:p>
         </p:txBody>
@@ -4497,7 +4618,7 @@
           <p:cNvPr id="3" name="Content Placeholder 2">
             <a:extLst>
               <a:ext uri="{FF2B5EF4-FFF2-40B4-BE49-F238E27FC236}">
-                <a16:creationId xmlns:a16="http://schemas.microsoft.com/office/drawing/2014/main" id="{E4A415A5-311C-B079-37F1-5CAEF123C44F}"/>
+                <a16:creationId xmlns:a16="http://schemas.microsoft.com/office/drawing/2014/main" id="{4CCB74E8-7120-BDEB-B2F7-D356AB378ED2}"/>
               </a:ext>
             </a:extLst>
           </p:cNvPr>
@@ -4505,17 +4626,48 @@
             <a:spLocks noGrp="1"/>
           </p:cNvSpPr>
           <p:nvPr>
-            <p:ph sz="quarter" idx="13"/>
+            <p:ph idx="1"/>
           </p:nvPr>
         </p:nvSpPr>
         <p:spPr/>
         <p:txBody>
-          <a:bodyPr/>
-          <a:lstStyle/>
-          <a:p>
-            <a:r>
-              <a:rPr lang="en-US" dirty="0"/>
-              <a:t>Gaps in tool capabilities will be identified and documented.</a:t>
+          <a:bodyPr>
+            <a:normAutofit/>
+          </a:bodyPr>
+          <a:lstStyle/>
+          <a:p>
+            <a:r>
+              <a:rPr lang="en-US" dirty="0"/>
+              <a:t>Evidence Based Software Maintenance</a:t>
+            </a:r>
+          </a:p>
+          <a:p>
+            <a:pPr lvl="1"/>
+            <a:r>
+              <a:rPr lang="en-US" dirty="0"/>
+              <a:t>Documentation (</a:t>
+            </a:r>
+            <a:r>
+              <a:rPr lang="en-US" dirty="0" err="1"/>
+              <a:t>Updative</a:t>
+            </a:r>
+            <a:r>
+              <a:rPr lang="en-US" dirty="0"/>
+              <a:t>)</a:t>
+            </a:r>
+          </a:p>
+          <a:p>
+            <a:pPr lvl="2"/>
+            <a:r>
+              <a:rPr lang="en-US" dirty="0"/>
+              <a:t>UML Class Diagram Generation using Enterprise Architect</a:t>
+            </a:r>
+          </a:p>
+          <a:p>
+            <a:pPr lvl="1"/>
+            <a:r>
+              <a:rPr lang="en-US" dirty="0"/>
+              <a:t>Automated Testing (Preventative and Perfective)</a:t>
             </a:r>
           </a:p>
         </p:txBody>
@@ -4523,7 +4675,7 @@
     </p:spTree>
     <p:extLst>
       <p:ext uri="{BB962C8B-B14F-4D97-AF65-F5344CB8AC3E}">
-        <p14:creationId xmlns:p14="http://schemas.microsoft.com/office/powerpoint/2010/main" val="2667106007"/>
+        <p14:creationId xmlns:p14="http://schemas.microsoft.com/office/powerpoint/2010/main" val="1035944413"/>
       </p:ext>
     </p:extLst>
   </p:cSld>
@@ -4555,7 +4707,7 @@
           <p:cNvPr id="2" name="Title 1">
             <a:extLst>
               <a:ext uri="{FF2B5EF4-FFF2-40B4-BE49-F238E27FC236}">
-                <a16:creationId xmlns:a16="http://schemas.microsoft.com/office/drawing/2014/main" id="{700D3EF9-2D5D-CF6A-C657-99AA380D92D6}"/>
+                <a16:creationId xmlns:a16="http://schemas.microsoft.com/office/drawing/2014/main" id="{F9C866DC-BD86-061B-9D2C-A7F5E57F918D}"/>
               </a:ext>
             </a:extLst>
           </p:cNvPr>
@@ -4563,7 +4715,7 @@
             <a:spLocks noGrp="1"/>
           </p:cNvSpPr>
           <p:nvPr>
-            <p:ph type="title"/>
+            <p:ph type="ctrTitle"/>
           </p:nvPr>
         </p:nvSpPr>
         <p:spPr/>
@@ -4573,17 +4725,17 @@
           <a:p>
             <a:r>
               <a:rPr lang="en-US" dirty="0"/>
-              <a:t>Phase 4: Proposals for Solutions to gaps</a:t>
-            </a:r>
-          </a:p>
-        </p:txBody>
-      </p:sp>
-      <p:sp>
-        <p:nvSpPr>
-          <p:cNvPr id="3" name="Content Placeholder 2">
+              <a:t>Research</a:t>
+            </a:r>
+          </a:p>
+        </p:txBody>
+      </p:sp>
+      <p:sp>
+        <p:nvSpPr>
+          <p:cNvPr id="3" name="Subtitle 2">
             <a:extLst>
               <a:ext uri="{FF2B5EF4-FFF2-40B4-BE49-F238E27FC236}">
-                <a16:creationId xmlns:a16="http://schemas.microsoft.com/office/drawing/2014/main" id="{33524BA1-61C5-77B8-73BD-01B7FFD96497}"/>
+                <a16:creationId xmlns:a16="http://schemas.microsoft.com/office/drawing/2014/main" id="{9186E197-0B72-490E-0960-FB18FB6745BB}"/>
               </a:ext>
             </a:extLst>
           </p:cNvPr>
@@ -4591,7 +4743,7 @@
             <a:spLocks noGrp="1"/>
           </p:cNvSpPr>
           <p:nvPr>
-            <p:ph sz="quarter" idx="13"/>
+            <p:ph type="subTitle" idx="1"/>
           </p:nvPr>
         </p:nvSpPr>
         <p:spPr/>
@@ -4601,7 +4753,7 @@
           <a:p>
             <a:r>
               <a:rPr lang="en-US" dirty="0"/>
-              <a:t>Novel solutions to fill the gaps identified during testing and evaluation will be proposed.</a:t>
+              <a:t>Using tools for model discovery and maintenance</a:t>
             </a:r>
           </a:p>
         </p:txBody>
@@ -4609,7 +4761,7 @@
     </p:spTree>
     <p:extLst>
       <p:ext uri="{BB962C8B-B14F-4D97-AF65-F5344CB8AC3E}">
-        <p14:creationId xmlns:p14="http://schemas.microsoft.com/office/powerpoint/2010/main" val="2077392551"/>
+        <p14:creationId xmlns:p14="http://schemas.microsoft.com/office/powerpoint/2010/main" val="2038501767"/>
       </p:ext>
     </p:extLst>
   </p:cSld>
@@ -4641,7 +4793,7 @@
           <p:cNvPr id="2" name="Title 1">
             <a:extLst>
               <a:ext uri="{FF2B5EF4-FFF2-40B4-BE49-F238E27FC236}">
-                <a16:creationId xmlns:a16="http://schemas.microsoft.com/office/drawing/2014/main" id="{814BF124-40CB-1DEC-45A9-7420B63203C2}"/>
+                <a16:creationId xmlns:a16="http://schemas.microsoft.com/office/drawing/2014/main" id="{8B7BB926-BAF9-C987-BD55-792ABF9FD5D3}"/>
               </a:ext>
             </a:extLst>
           </p:cNvPr>
@@ -4659,7 +4811,7 @@
           <a:p>
             <a:r>
               <a:rPr lang="en-US" dirty="0"/>
-              <a:t>Phase 5: Summary</a:t>
+              <a:t>Background</a:t>
             </a:r>
           </a:p>
         </p:txBody>
@@ -4669,7 +4821,7 @@
           <p:cNvPr id="3" name="Content Placeholder 2">
             <a:extLst>
               <a:ext uri="{FF2B5EF4-FFF2-40B4-BE49-F238E27FC236}">
-                <a16:creationId xmlns:a16="http://schemas.microsoft.com/office/drawing/2014/main" id="{F4B01782-F4A4-2385-91BE-8D545833B73F}"/>
+                <a16:creationId xmlns:a16="http://schemas.microsoft.com/office/drawing/2014/main" id="{D7CE732D-B116-5C66-0BC4-76B6BD58E379}"/>
               </a:ext>
             </a:extLst>
           </p:cNvPr>
@@ -4680,14 +4832,31 @@
             <p:ph sz="quarter" idx="13"/>
           </p:nvPr>
         </p:nvSpPr>
-        <p:spPr/>
+        <p:spPr>
+          <a:xfrm>
+            <a:off x="820468" y="1417638"/>
+            <a:ext cx="10363826" cy="4320689"/>
+          </a:xfrm>
+        </p:spPr>
         <p:txBody>
           <a:bodyPr/>
           <a:lstStyle/>
           <a:p>
             <a:r>
               <a:rPr lang="en-US" dirty="0"/>
-              <a:t>The results of the tool testing, evaluation, and gap analysis will be summarized.</a:t>
+              <a:t>Legacy systems without UML class diagrams are common.</a:t>
+            </a:r>
+          </a:p>
+          <a:p>
+            <a:r>
+              <a:rPr lang="en-US" dirty="0"/>
+              <a:t>Software Maintenance Engineers have struggled to understand these complex legacy systems.</a:t>
+            </a:r>
+          </a:p>
+          <a:p>
+            <a:r>
+              <a:rPr lang="en-US" dirty="0"/>
+              <a:t>Vendors have been working on providing tools that allow the discovery of models within these legacy systems for decades to help engineers understand the structure and behavior of these systems.</a:t>
             </a:r>
           </a:p>
         </p:txBody>
@@ -4695,7 +4864,7 @@
     </p:spTree>
     <p:extLst>
       <p:ext uri="{BB962C8B-B14F-4D97-AF65-F5344CB8AC3E}">
-        <p14:creationId xmlns:p14="http://schemas.microsoft.com/office/powerpoint/2010/main" val="3027190851"/>
+        <p14:creationId xmlns:p14="http://schemas.microsoft.com/office/powerpoint/2010/main" val="2831720925"/>
       </p:ext>
     </p:extLst>
   </p:cSld>
@@ -4727,7 +4896,7 @@
           <p:cNvPr id="2" name="Title 1">
             <a:extLst>
               <a:ext uri="{FF2B5EF4-FFF2-40B4-BE49-F238E27FC236}">
-                <a16:creationId xmlns:a16="http://schemas.microsoft.com/office/drawing/2014/main" id="{1DFEC991-DA45-28EE-4BB4-237E5B9CD014}"/>
+                <a16:creationId xmlns:a16="http://schemas.microsoft.com/office/drawing/2014/main" id="{A8151F95-4E93-A1C6-C63C-EB0EAEB284EF}"/>
               </a:ext>
             </a:extLst>
           </p:cNvPr>
@@ -4745,7 +4914,54 @@
           <a:p>
             <a:r>
               <a:rPr lang="en-US" dirty="0"/>
-              <a:t>Questions and Answers</a:t>
+              <a:t>Some Existing Tools for Model Discovery</a:t>
+            </a:r>
+          </a:p>
+        </p:txBody>
+      </p:sp>
+      <p:sp>
+        <p:nvSpPr>
+          <p:cNvPr id="3" name="Content Placeholder 2">
+            <a:extLst>
+              <a:ext uri="{FF2B5EF4-FFF2-40B4-BE49-F238E27FC236}">
+                <a16:creationId xmlns:a16="http://schemas.microsoft.com/office/drawing/2014/main" id="{9C2A44D3-CF3C-F506-0198-F73EC543B947}"/>
+              </a:ext>
+            </a:extLst>
+          </p:cNvPr>
+          <p:cNvSpPr>
+            <a:spLocks noGrp="1"/>
+          </p:cNvSpPr>
+          <p:nvPr>
+            <p:ph sz="quarter" idx="13"/>
+          </p:nvPr>
+        </p:nvSpPr>
+        <p:spPr>
+          <a:xfrm>
+            <a:off x="609600" y="1545998"/>
+            <a:ext cx="10363826" cy="3424107"/>
+          </a:xfrm>
+        </p:spPr>
+        <p:txBody>
+          <a:bodyPr>
+            <a:normAutofit/>
+          </a:bodyPr>
+          <a:lstStyle/>
+          <a:p>
+            <a:r>
+              <a:rPr lang="en-US" dirty="0"/>
+              <a:t>Visual Studio 2022</a:t>
+            </a:r>
+          </a:p>
+          <a:p>
+            <a:r>
+              <a:rPr lang="en-US" dirty="0"/>
+              <a:t>Enterprise Architect</a:t>
+            </a:r>
+          </a:p>
+          <a:p>
+            <a:r>
+              <a:rPr lang="en-US" dirty="0"/>
+              <a:t>MoDisco</a:t>
             </a:r>
           </a:p>
         </p:txBody>
@@ -4753,7 +4969,7 @@
     </p:spTree>
     <p:extLst>
       <p:ext uri="{BB962C8B-B14F-4D97-AF65-F5344CB8AC3E}">
-        <p14:creationId xmlns:p14="http://schemas.microsoft.com/office/powerpoint/2010/main" val="1254702851"/>
+        <p14:creationId xmlns:p14="http://schemas.microsoft.com/office/powerpoint/2010/main" val="3586345122"/>
       </p:ext>
     </p:extLst>
   </p:cSld>
@@ -4768,7 +4984,13 @@
   <p:cSld>
     <p:spTree>
       <p:nvGrpSpPr>
-        <p:cNvPr id="1" name=""/>
+        <p:cNvPr id="1" name="">
+          <a:extLst>
+            <a:ext uri="{FF2B5EF4-FFF2-40B4-BE49-F238E27FC236}">
+              <a16:creationId xmlns:a16="http://schemas.microsoft.com/office/drawing/2014/main" id="{EC2B8D8C-FB6C-B574-3A25-B32E54FF7C3A}"/>
+            </a:ext>
+          </a:extLst>
+        </p:cNvPr>
         <p:cNvGrpSpPr/>
         <p:nvPr/>
       </p:nvGrpSpPr>
@@ -4785,7 +5007,7 @@
           <p:cNvPr id="2" name="Title 1">
             <a:extLst>
               <a:ext uri="{FF2B5EF4-FFF2-40B4-BE49-F238E27FC236}">
-                <a16:creationId xmlns:a16="http://schemas.microsoft.com/office/drawing/2014/main" id="{2BCE957B-44B1-EC3A-B89B-D1D1854F4F93}"/>
+                <a16:creationId xmlns:a16="http://schemas.microsoft.com/office/drawing/2014/main" id="{904DF767-3ECD-DFD2-64AE-0E958BED0FCF}"/>
               </a:ext>
             </a:extLst>
           </p:cNvPr>
@@ -4793,7 +5015,7 @@
             <a:spLocks noGrp="1"/>
           </p:cNvSpPr>
           <p:nvPr>
-            <p:ph type="ctrTitle"/>
+            <p:ph type="title"/>
           </p:nvPr>
         </p:nvSpPr>
         <p:spPr/>
@@ -4803,17 +5025,17 @@
           <a:p>
             <a:r>
               <a:rPr lang="en-US" dirty="0"/>
-              <a:t>Thank You!</a:t>
-            </a:r>
-          </a:p>
-        </p:txBody>
-      </p:sp>
-      <p:sp>
-        <p:nvSpPr>
-          <p:cNvPr id="3" name="Subtitle 2">
+              <a:t>Experimental Results</a:t>
+            </a:r>
+          </a:p>
+        </p:txBody>
+      </p:sp>
+      <p:sp>
+        <p:nvSpPr>
+          <p:cNvPr id="3" name="Content Placeholder 2">
             <a:extLst>
               <a:ext uri="{FF2B5EF4-FFF2-40B4-BE49-F238E27FC236}">
-                <a16:creationId xmlns:a16="http://schemas.microsoft.com/office/drawing/2014/main" id="{B7C00953-9ABC-8367-CFE6-6DBA13411052}"/>
+                <a16:creationId xmlns:a16="http://schemas.microsoft.com/office/drawing/2014/main" id="{327214A1-CCA2-25F7-4091-7D6D423E3416}"/>
               </a:ext>
             </a:extLst>
           </p:cNvPr>
@@ -4821,17 +5043,57 @@
             <a:spLocks noGrp="1"/>
           </p:cNvSpPr>
           <p:nvPr>
-            <p:ph type="subTitle" idx="1"/>
-          </p:nvPr>
-        </p:nvSpPr>
-        <p:spPr/>
-        <p:txBody>
-          <a:bodyPr/>
-          <a:lstStyle/>
-          <a:p>
-            <a:r>
-              <a:rPr lang="en-US" dirty="0"/>
-              <a:t>John Williams – jwilli11@uccs.edu</a:t>
+            <p:ph sz="quarter" idx="13"/>
+          </p:nvPr>
+        </p:nvSpPr>
+        <p:spPr>
+          <a:xfrm>
+            <a:off x="609600" y="1545998"/>
+            <a:ext cx="10363826" cy="3424107"/>
+          </a:xfrm>
+        </p:spPr>
+        <p:txBody>
+          <a:bodyPr>
+            <a:normAutofit fontScale="92500"/>
+          </a:bodyPr>
+          <a:lstStyle/>
+          <a:p>
+            <a:r>
+              <a:rPr lang="en-US" dirty="0"/>
+              <a:t>Visual Studio 2022</a:t>
+            </a:r>
+          </a:p>
+          <a:p>
+            <a:pPr lvl="1"/>
+            <a:r>
+              <a:rPr lang="en-US" dirty="0"/>
+              <a:t>Capable of generating UML Class diagrams one file at a time</a:t>
+            </a:r>
+          </a:p>
+          <a:p>
+            <a:r>
+              <a:rPr lang="en-US" dirty="0"/>
+              <a:t>Enterprise Architect</a:t>
+            </a:r>
+          </a:p>
+          <a:p>
+            <a:pPr lvl="1"/>
+            <a:r>
+              <a:rPr lang="en-US" dirty="0"/>
+              <a:t>Capable of generating UML Class diagrams for an entire Visual Studio Solution or Project</a:t>
+            </a:r>
+          </a:p>
+          <a:p>
+            <a:r>
+              <a:rPr lang="en-US" dirty="0"/>
+              <a:t>MoDisco</a:t>
+            </a:r>
+          </a:p>
+          <a:p>
+            <a:pPr lvl="1"/>
+            <a:r>
+              <a:rPr lang="en-US" dirty="0"/>
+              <a:t>Capabilities not tested</a:t>
             </a:r>
           </a:p>
         </p:txBody>
@@ -4839,7 +5101,7 @@
     </p:spTree>
     <p:extLst>
       <p:ext uri="{BB962C8B-B14F-4D97-AF65-F5344CB8AC3E}">
-        <p14:creationId xmlns:p14="http://schemas.microsoft.com/office/powerpoint/2010/main" val="1602979760"/>
+        <p14:creationId xmlns:p14="http://schemas.microsoft.com/office/powerpoint/2010/main" val="937017179"/>
       </p:ext>
     </p:extLst>
   </p:cSld>
@@ -4866,7 +5128,285 @@
           <a:chExt cx="0" cy="0"/>
         </a:xfrm>
       </p:grpSpPr>
+      <p:sp>
+        <p:nvSpPr>
+          <p:cNvPr id="2" name="Title 1">
+            <a:extLst>
+              <a:ext uri="{FF2B5EF4-FFF2-40B4-BE49-F238E27FC236}">
+                <a16:creationId xmlns:a16="http://schemas.microsoft.com/office/drawing/2014/main" id="{700D3EF9-2D5D-CF6A-C657-99AA380D92D6}"/>
+              </a:ext>
+            </a:extLst>
+          </p:cNvPr>
+          <p:cNvSpPr>
+            <a:spLocks noGrp="1"/>
+          </p:cNvSpPr>
+          <p:nvPr>
+            <p:ph type="title"/>
+          </p:nvPr>
+        </p:nvSpPr>
+        <p:spPr/>
+        <p:txBody>
+          <a:bodyPr/>
+          <a:lstStyle/>
+          <a:p>
+            <a:r>
+              <a:rPr lang="en-US" dirty="0"/>
+              <a:t>Evaluation</a:t>
+            </a:r>
+          </a:p>
+        </p:txBody>
+      </p:sp>
+      <p:sp>
+        <p:nvSpPr>
+          <p:cNvPr id="3" name="Content Placeholder 2">
+            <a:extLst>
+              <a:ext uri="{FF2B5EF4-FFF2-40B4-BE49-F238E27FC236}">
+                <a16:creationId xmlns:a16="http://schemas.microsoft.com/office/drawing/2014/main" id="{33524BA1-61C5-77B8-73BD-01B7FFD96497}"/>
+              </a:ext>
+            </a:extLst>
+          </p:cNvPr>
+          <p:cNvSpPr>
+            <a:spLocks noGrp="1"/>
+          </p:cNvSpPr>
+          <p:nvPr>
+            <p:ph sz="quarter" idx="13"/>
+          </p:nvPr>
+        </p:nvSpPr>
+        <p:spPr>
+          <a:xfrm>
+            <a:off x="745823" y="1417638"/>
+            <a:ext cx="10363826" cy="4339350"/>
+          </a:xfrm>
+        </p:spPr>
+        <p:txBody>
+          <a:bodyPr/>
+          <a:lstStyle/>
+          <a:p>
+            <a:r>
+              <a:rPr lang="en-US" dirty="0"/>
+              <a:t>Enterprise Architect is very fast at performing model discovery of an entire Visual Studio Solution in one step.</a:t>
+            </a:r>
+          </a:p>
+          <a:p>
+            <a:r>
+              <a:rPr lang="en-US" dirty="0"/>
+              <a:t>Model discovery of ASP.NET applications typically took less than one minute using Enterprise Architect.</a:t>
+            </a:r>
+          </a:p>
+          <a:p>
+            <a:r>
+              <a:rPr lang="en-US" dirty="0"/>
+              <a:t>Model discovery of the same ASP.NET application using Visual Studio tool approximately fifteen minutes due to its one-at-a-time process. </a:t>
+            </a:r>
+          </a:p>
+        </p:txBody>
+      </p:sp>
     </p:spTree>
+    <p:extLst>
+      <p:ext uri="{BB962C8B-B14F-4D97-AF65-F5344CB8AC3E}">
+        <p14:creationId xmlns:p14="http://schemas.microsoft.com/office/powerpoint/2010/main" val="2077392551"/>
+      </p:ext>
+    </p:extLst>
+  </p:cSld>
+  <p:clrMapOvr>
+    <a:masterClrMapping/>
+  </p:clrMapOvr>
+</p:sld>
+</file>
+
+<file path=ppt/slides/slide18.xml><?xml version="1.0" encoding="utf-8"?>
+<p:sld xmlns:a="http://schemas.openxmlformats.org/drawingml/2006/main" xmlns:r="http://schemas.openxmlformats.org/officeDocument/2006/relationships" xmlns:p="http://schemas.openxmlformats.org/presentationml/2006/main">
+  <p:cSld>
+    <p:spTree>
+      <p:nvGrpSpPr>
+        <p:cNvPr id="1" name=""/>
+        <p:cNvGrpSpPr/>
+        <p:nvPr/>
+      </p:nvGrpSpPr>
+      <p:grpSpPr>
+        <a:xfrm>
+          <a:off x="0" y="0"/>
+          <a:ext cx="0" cy="0"/>
+          <a:chOff x="0" y="0"/>
+          <a:chExt cx="0" cy="0"/>
+        </a:xfrm>
+      </p:grpSpPr>
+      <p:sp>
+        <p:nvSpPr>
+          <p:cNvPr id="2" name="Title 1">
+            <a:extLst>
+              <a:ext uri="{FF2B5EF4-FFF2-40B4-BE49-F238E27FC236}">
+                <a16:creationId xmlns:a16="http://schemas.microsoft.com/office/drawing/2014/main" id="{814BF124-40CB-1DEC-45A9-7420B63203C2}"/>
+              </a:ext>
+            </a:extLst>
+          </p:cNvPr>
+          <p:cNvSpPr>
+            <a:spLocks noGrp="1"/>
+          </p:cNvSpPr>
+          <p:nvPr>
+            <p:ph type="title"/>
+          </p:nvPr>
+        </p:nvSpPr>
+        <p:spPr/>
+        <p:txBody>
+          <a:bodyPr/>
+          <a:lstStyle/>
+          <a:p>
+            <a:r>
+              <a:rPr lang="en-US" dirty="0"/>
+              <a:t>Summary</a:t>
+            </a:r>
+          </a:p>
+        </p:txBody>
+      </p:sp>
+      <p:sp>
+        <p:nvSpPr>
+          <p:cNvPr id="3" name="Content Placeholder 2">
+            <a:extLst>
+              <a:ext uri="{FF2B5EF4-FFF2-40B4-BE49-F238E27FC236}">
+                <a16:creationId xmlns:a16="http://schemas.microsoft.com/office/drawing/2014/main" id="{F4B01782-F4A4-2385-91BE-8D545833B73F}"/>
+              </a:ext>
+            </a:extLst>
+          </p:cNvPr>
+          <p:cNvSpPr>
+            <a:spLocks noGrp="1"/>
+          </p:cNvSpPr>
+          <p:nvPr>
+            <p:ph sz="quarter" idx="13"/>
+          </p:nvPr>
+        </p:nvSpPr>
+        <p:spPr>
+          <a:xfrm>
+            <a:off x="755153" y="1417638"/>
+            <a:ext cx="10363826" cy="3424107"/>
+          </a:xfrm>
+        </p:spPr>
+        <p:txBody>
+          <a:bodyPr/>
+          <a:lstStyle/>
+          <a:p>
+            <a:r>
+              <a:rPr lang="en-US" dirty="0"/>
+              <a:t>Model Discovery is a great way to increase the understanding of a legacy system that does not include UML documentation.</a:t>
+            </a:r>
+          </a:p>
+          <a:p>
+            <a:r>
+              <a:rPr lang="en-US" dirty="0"/>
+              <a:t>There are existing tools that help facilitate model discovery. Enterprise Architect does a great job at processing an entire Visual Studio Solution with one step.</a:t>
+            </a:r>
+          </a:p>
+        </p:txBody>
+      </p:sp>
+    </p:spTree>
+    <p:extLst>
+      <p:ext uri="{BB962C8B-B14F-4D97-AF65-F5344CB8AC3E}">
+        <p14:creationId xmlns:p14="http://schemas.microsoft.com/office/powerpoint/2010/main" val="3027190851"/>
+      </p:ext>
+    </p:extLst>
+  </p:cSld>
+  <p:clrMapOvr>
+    <a:masterClrMapping/>
+  </p:clrMapOvr>
+</p:sld>
+</file>
+
+<file path=ppt/slides/slide19.xml><?xml version="1.0" encoding="utf-8"?>
+<p:sld xmlns:a="http://schemas.openxmlformats.org/drawingml/2006/main" xmlns:r="http://schemas.openxmlformats.org/officeDocument/2006/relationships" xmlns:p="http://schemas.openxmlformats.org/presentationml/2006/main">
+  <p:cSld>
+    <p:spTree>
+      <p:nvGrpSpPr>
+        <p:cNvPr id="1" name="">
+          <a:extLst>
+            <a:ext uri="{FF2B5EF4-FFF2-40B4-BE49-F238E27FC236}">
+              <a16:creationId xmlns:a16="http://schemas.microsoft.com/office/drawing/2014/main" id="{A2D02FA2-C497-468B-8200-0B2A34E20513}"/>
+            </a:ext>
+          </a:extLst>
+        </p:cNvPr>
+        <p:cNvGrpSpPr/>
+        <p:nvPr/>
+      </p:nvGrpSpPr>
+      <p:grpSpPr>
+        <a:xfrm>
+          <a:off x="0" y="0"/>
+          <a:ext cx="0" cy="0"/>
+          <a:chOff x="0" y="0"/>
+          <a:chExt cx="0" cy="0"/>
+        </a:xfrm>
+      </p:grpSpPr>
+      <p:sp>
+        <p:nvSpPr>
+          <p:cNvPr id="2" name="Title 1">
+            <a:extLst>
+              <a:ext uri="{FF2B5EF4-FFF2-40B4-BE49-F238E27FC236}">
+                <a16:creationId xmlns:a16="http://schemas.microsoft.com/office/drawing/2014/main" id="{8E047501-8582-AB1A-56F0-2BB1C9EB088A}"/>
+              </a:ext>
+            </a:extLst>
+          </p:cNvPr>
+          <p:cNvSpPr>
+            <a:spLocks noGrp="1"/>
+          </p:cNvSpPr>
+          <p:nvPr>
+            <p:ph type="title"/>
+          </p:nvPr>
+        </p:nvSpPr>
+        <p:spPr/>
+        <p:txBody>
+          <a:bodyPr/>
+          <a:lstStyle/>
+          <a:p>
+            <a:r>
+              <a:rPr lang="en-US" dirty="0"/>
+              <a:t>Future Work</a:t>
+            </a:r>
+          </a:p>
+        </p:txBody>
+      </p:sp>
+      <p:sp>
+        <p:nvSpPr>
+          <p:cNvPr id="3" name="Content Placeholder 2">
+            <a:extLst>
+              <a:ext uri="{FF2B5EF4-FFF2-40B4-BE49-F238E27FC236}">
+                <a16:creationId xmlns:a16="http://schemas.microsoft.com/office/drawing/2014/main" id="{5C3FDEAA-707D-50D7-7131-6B8B70E260D6}"/>
+              </a:ext>
+            </a:extLst>
+          </p:cNvPr>
+          <p:cNvSpPr>
+            <a:spLocks noGrp="1"/>
+          </p:cNvSpPr>
+          <p:nvPr>
+            <p:ph sz="quarter" idx="13"/>
+          </p:nvPr>
+        </p:nvSpPr>
+        <p:spPr>
+          <a:xfrm>
+            <a:off x="755153" y="1417638"/>
+            <a:ext cx="10363826" cy="3424107"/>
+          </a:xfrm>
+        </p:spPr>
+        <p:txBody>
+          <a:bodyPr/>
+          <a:lstStyle/>
+          <a:p>
+            <a:r>
+              <a:rPr lang="en-US" dirty="0"/>
+              <a:t>Finding ways to extract other types of models, such as activity diagrams for methods and complex properties.</a:t>
+            </a:r>
+          </a:p>
+          <a:p>
+            <a:r>
+              <a:rPr lang="en-US" dirty="0"/>
+              <a:t>Using model discovery in forward engineering methodologies for reengineering legacy systems.</a:t>
+            </a:r>
+          </a:p>
+        </p:txBody>
+      </p:sp>
+    </p:spTree>
+    <p:extLst>
+      <p:ext uri="{BB962C8B-B14F-4D97-AF65-F5344CB8AC3E}">
+        <p14:creationId xmlns:p14="http://schemas.microsoft.com/office/powerpoint/2010/main" val="654341822"/>
+      </p:ext>
+    </p:extLst>
   </p:cSld>
   <p:clrMapOvr>
     <a:masterClrMapping/>
@@ -4943,31 +5483,13 @@
         </p:spPr>
         <p:txBody>
           <a:bodyPr>
-            <a:normAutofit fontScale="92500" lnSpcReduction="10000"/>
+            <a:normAutofit/>
           </a:bodyPr>
           <a:lstStyle/>
           <a:p>
             <a:r>
               <a:rPr lang="en-US" dirty="0"/>
-              <a:t>Project Overview</a:t>
-            </a:r>
-          </a:p>
-          <a:p>
-            <a:r>
-              <a:rPr lang="en-US" dirty="0"/>
-              <a:t>Software license</a:t>
-            </a:r>
-          </a:p>
-          <a:p>
-            <a:r>
-              <a:rPr lang="en-US" dirty="0"/>
-              <a:t>Architectural pattern</a:t>
-            </a:r>
-          </a:p>
-          <a:p>
-            <a:r>
-              <a:rPr lang="en-US" dirty="0"/>
-              <a:t>Work breakdown</a:t>
+              <a:t>Semester Project</a:t>
             </a:r>
           </a:p>
           <a:p>
@@ -4979,16 +5501,13 @@
           <a:p>
             <a:r>
               <a:rPr lang="en-US" dirty="0"/>
-              <a:t>Questions and Answers</a:t>
-            </a:r>
-          </a:p>
-          <a:p>
-            <a:pPr marL="0" indent="0">
-              <a:buNone/>
-            </a:pPr>
-            <a:r>
-              <a:rPr lang="en-US" dirty="0"/>
-              <a:t>	</a:t>
+              <a:t>Live Demo</a:t>
+            </a:r>
+          </a:p>
+          <a:p>
+            <a:r>
+              <a:rPr lang="en-US" dirty="0"/>
+              <a:t>Q&amp;A	</a:t>
             </a:r>
           </a:p>
         </p:txBody>
@@ -5278,6 +5797,241 @@
 </p:sld>
 </file>
 
+<file path=ppt/slides/slide20.xml><?xml version="1.0" encoding="utf-8"?>
+<p:sld xmlns:a="http://schemas.openxmlformats.org/drawingml/2006/main" xmlns:r="http://schemas.openxmlformats.org/officeDocument/2006/relationships" xmlns:p="http://schemas.openxmlformats.org/presentationml/2006/main">
+  <p:cSld>
+    <p:spTree>
+      <p:nvGrpSpPr>
+        <p:cNvPr id="1" name=""/>
+        <p:cNvGrpSpPr/>
+        <p:nvPr/>
+      </p:nvGrpSpPr>
+      <p:grpSpPr>
+        <a:xfrm>
+          <a:off x="0" y="0"/>
+          <a:ext cx="0" cy="0"/>
+          <a:chOff x="0" y="0"/>
+          <a:chExt cx="0" cy="0"/>
+        </a:xfrm>
+      </p:grpSpPr>
+      <p:sp>
+        <p:nvSpPr>
+          <p:cNvPr id="2" name="Title 1">
+            <a:extLst>
+              <a:ext uri="{FF2B5EF4-FFF2-40B4-BE49-F238E27FC236}">
+                <a16:creationId xmlns:a16="http://schemas.microsoft.com/office/drawing/2014/main" id="{1DFEC991-DA45-28EE-4BB4-237E5B9CD014}"/>
+              </a:ext>
+            </a:extLst>
+          </p:cNvPr>
+          <p:cNvSpPr>
+            <a:spLocks noGrp="1"/>
+          </p:cNvSpPr>
+          <p:nvPr>
+            <p:ph type="title"/>
+          </p:nvPr>
+        </p:nvSpPr>
+        <p:spPr/>
+        <p:txBody>
+          <a:bodyPr/>
+          <a:lstStyle/>
+          <a:p>
+            <a:r>
+              <a:rPr lang="en-US" dirty="0"/>
+              <a:t>Live Demo</a:t>
+            </a:r>
+          </a:p>
+        </p:txBody>
+      </p:sp>
+    </p:spTree>
+    <p:extLst>
+      <p:ext uri="{BB962C8B-B14F-4D97-AF65-F5344CB8AC3E}">
+        <p14:creationId xmlns:p14="http://schemas.microsoft.com/office/powerpoint/2010/main" val="1254702851"/>
+      </p:ext>
+    </p:extLst>
+  </p:cSld>
+  <p:clrMapOvr>
+    <a:masterClrMapping/>
+  </p:clrMapOvr>
+</p:sld>
+</file>
+
+<file path=ppt/slides/slide21.xml><?xml version="1.0" encoding="utf-8"?>
+<p:sld xmlns:a="http://schemas.openxmlformats.org/drawingml/2006/main" xmlns:r="http://schemas.openxmlformats.org/officeDocument/2006/relationships" xmlns:p="http://schemas.openxmlformats.org/presentationml/2006/main">
+  <p:cSld>
+    <p:spTree>
+      <p:nvGrpSpPr>
+        <p:cNvPr id="1" name="">
+          <a:extLst>
+            <a:ext uri="{FF2B5EF4-FFF2-40B4-BE49-F238E27FC236}">
+              <a16:creationId xmlns:a16="http://schemas.microsoft.com/office/drawing/2014/main" id="{0ED87EC6-7693-5972-FDE4-BCD888ACDDF0}"/>
+            </a:ext>
+          </a:extLst>
+        </p:cNvPr>
+        <p:cNvGrpSpPr/>
+        <p:nvPr/>
+      </p:nvGrpSpPr>
+      <p:grpSpPr>
+        <a:xfrm>
+          <a:off x="0" y="0"/>
+          <a:ext cx="0" cy="0"/>
+          <a:chOff x="0" y="0"/>
+          <a:chExt cx="0" cy="0"/>
+        </a:xfrm>
+      </p:grpSpPr>
+      <p:sp>
+        <p:nvSpPr>
+          <p:cNvPr id="2" name="Title 1">
+            <a:extLst>
+              <a:ext uri="{FF2B5EF4-FFF2-40B4-BE49-F238E27FC236}">
+                <a16:creationId xmlns:a16="http://schemas.microsoft.com/office/drawing/2014/main" id="{64E4BFAF-9C0D-EB70-5817-70D25466FF8E}"/>
+              </a:ext>
+            </a:extLst>
+          </p:cNvPr>
+          <p:cNvSpPr>
+            <a:spLocks noGrp="1"/>
+          </p:cNvSpPr>
+          <p:nvPr>
+            <p:ph type="title"/>
+          </p:nvPr>
+        </p:nvSpPr>
+        <p:spPr/>
+        <p:txBody>
+          <a:bodyPr>
+            <a:normAutofit/>
+          </a:bodyPr>
+          <a:lstStyle/>
+          <a:p>
+            <a:r>
+              <a:rPr lang="en-US" dirty="0"/>
+              <a:t>Questions and Answers</a:t>
+            </a:r>
+          </a:p>
+        </p:txBody>
+      </p:sp>
+    </p:spTree>
+    <p:extLst>
+      <p:ext uri="{BB962C8B-B14F-4D97-AF65-F5344CB8AC3E}">
+        <p14:creationId xmlns:p14="http://schemas.microsoft.com/office/powerpoint/2010/main" val="2021797083"/>
+      </p:ext>
+    </p:extLst>
+  </p:cSld>
+  <p:clrMapOvr>
+    <a:masterClrMapping/>
+  </p:clrMapOvr>
+</p:sld>
+</file>
+
+<file path=ppt/slides/slide22.xml><?xml version="1.0" encoding="utf-8"?>
+<p:sld xmlns:a="http://schemas.openxmlformats.org/drawingml/2006/main" xmlns:r="http://schemas.openxmlformats.org/officeDocument/2006/relationships" xmlns:p="http://schemas.openxmlformats.org/presentationml/2006/main">
+  <p:cSld>
+    <p:spTree>
+      <p:nvGrpSpPr>
+        <p:cNvPr id="1" name=""/>
+        <p:cNvGrpSpPr/>
+        <p:nvPr/>
+      </p:nvGrpSpPr>
+      <p:grpSpPr>
+        <a:xfrm>
+          <a:off x="0" y="0"/>
+          <a:ext cx="0" cy="0"/>
+          <a:chOff x="0" y="0"/>
+          <a:chExt cx="0" cy="0"/>
+        </a:xfrm>
+      </p:grpSpPr>
+      <p:sp>
+        <p:nvSpPr>
+          <p:cNvPr id="2" name="Title 1">
+            <a:extLst>
+              <a:ext uri="{FF2B5EF4-FFF2-40B4-BE49-F238E27FC236}">
+                <a16:creationId xmlns:a16="http://schemas.microsoft.com/office/drawing/2014/main" id="{2BCE957B-44B1-EC3A-B89B-D1D1854F4F93}"/>
+              </a:ext>
+            </a:extLst>
+          </p:cNvPr>
+          <p:cNvSpPr>
+            <a:spLocks noGrp="1"/>
+          </p:cNvSpPr>
+          <p:nvPr>
+            <p:ph type="ctrTitle"/>
+          </p:nvPr>
+        </p:nvSpPr>
+        <p:spPr/>
+        <p:txBody>
+          <a:bodyPr/>
+          <a:lstStyle/>
+          <a:p>
+            <a:r>
+              <a:rPr lang="en-US" dirty="0"/>
+              <a:t>Thank You!</a:t>
+            </a:r>
+          </a:p>
+        </p:txBody>
+      </p:sp>
+      <p:sp>
+        <p:nvSpPr>
+          <p:cNvPr id="3" name="Subtitle 2">
+            <a:extLst>
+              <a:ext uri="{FF2B5EF4-FFF2-40B4-BE49-F238E27FC236}">
+                <a16:creationId xmlns:a16="http://schemas.microsoft.com/office/drawing/2014/main" id="{B7C00953-9ABC-8367-CFE6-6DBA13411052}"/>
+              </a:ext>
+            </a:extLst>
+          </p:cNvPr>
+          <p:cNvSpPr>
+            <a:spLocks noGrp="1"/>
+          </p:cNvSpPr>
+          <p:nvPr>
+            <p:ph type="subTitle" idx="1"/>
+          </p:nvPr>
+        </p:nvSpPr>
+        <p:spPr/>
+        <p:txBody>
+          <a:bodyPr/>
+          <a:lstStyle/>
+          <a:p>
+            <a:r>
+              <a:rPr lang="en-US" dirty="0"/>
+              <a:t>John Williams – jwilli11@uccs.edu</a:t>
+            </a:r>
+          </a:p>
+        </p:txBody>
+      </p:sp>
+    </p:spTree>
+    <p:extLst>
+      <p:ext uri="{BB962C8B-B14F-4D97-AF65-F5344CB8AC3E}">
+        <p14:creationId xmlns:p14="http://schemas.microsoft.com/office/powerpoint/2010/main" val="1602979760"/>
+      </p:ext>
+    </p:extLst>
+  </p:cSld>
+  <p:clrMapOvr>
+    <a:masterClrMapping/>
+  </p:clrMapOvr>
+</p:sld>
+</file>
+
+<file path=ppt/slides/slide23.xml><?xml version="1.0" encoding="utf-8"?>
+<p:sld xmlns:a="http://schemas.openxmlformats.org/drawingml/2006/main" xmlns:r="http://schemas.openxmlformats.org/officeDocument/2006/relationships" xmlns:p="http://schemas.openxmlformats.org/presentationml/2006/main">
+  <p:cSld>
+    <p:spTree>
+      <p:nvGrpSpPr>
+        <p:cNvPr id="1" name=""/>
+        <p:cNvGrpSpPr/>
+        <p:nvPr/>
+      </p:nvGrpSpPr>
+      <p:grpSpPr>
+        <a:xfrm>
+          <a:off x="0" y="0"/>
+          <a:ext cx="0" cy="0"/>
+          <a:chOff x="0" y="0"/>
+          <a:chExt cx="0" cy="0"/>
+        </a:xfrm>
+      </p:grpSpPr>
+    </p:spTree>
+  </p:cSld>
+  <p:clrMapOvr>
+    <a:masterClrMapping/>
+  </p:clrMapOvr>
+</p:sld>
+</file>
+
 <file path=ppt/slides/slide3.xml><?xml version="1.0" encoding="utf-8"?>
 <p:sld xmlns:a="http://schemas.openxmlformats.org/drawingml/2006/main" xmlns:r="http://schemas.openxmlformats.org/officeDocument/2006/relationships" xmlns:p="http://schemas.openxmlformats.org/presentationml/2006/main">
   <p:cSld>
@@ -5323,7 +6077,7 @@
           <a:p>
             <a:r>
               <a:rPr lang="en-US" dirty="0"/>
-              <a:t>Project overview</a:t>
+              <a:t>Project Overview</a:t>
             </a:r>
           </a:p>
         </p:txBody>
@@ -5351,62 +6105,71 @@
           </a:xfrm>
         </p:spPr>
         <p:txBody>
-          <a:bodyPr/>
-          <a:lstStyle/>
-          <a:p>
-            <a:r>
-              <a:rPr lang="en-US" sz="2400" b="1" dirty="0"/>
-              <a:t>Open-source Project </a:t>
-            </a:r>
-            <a:r>
-              <a:rPr lang="en-US" sz="2400" dirty="0"/>
-              <a:t>understood by domain experts</a:t>
-            </a:r>
-            <a:endParaRPr lang="en-US" dirty="0"/>
-          </a:p>
-          <a:p>
-            <a:r>
-              <a:rPr lang="en-US" dirty="0"/>
-              <a:t>Purpose, who is it for? </a:t>
-            </a:r>
-          </a:p>
-          <a:p>
-            <a:pPr lvl="1">
-              <a:buFont typeface="Wingdings" pitchFamily="2" charset="2"/>
-              <a:buChar char="è"/>
-            </a:pPr>
-            <a:r>
-              <a:rPr lang="en-US" dirty="0"/>
-              <a:t>Software developers who need to control who can use their software</a:t>
-            </a:r>
-          </a:p>
-          <a:p>
-            <a:pPr lvl="1">
-              <a:buFont typeface="Wingdings" pitchFamily="2" charset="2"/>
-              <a:buChar char="è"/>
-            </a:pPr>
-            <a:r>
-              <a:rPr lang="en-US" dirty="0"/>
-              <a:t>Software users who want to use software products controlled by LAMs</a:t>
-            </a:r>
-          </a:p>
-          <a:p>
-            <a:pPr lvl="1">
-              <a:buFont typeface="Wingdings" pitchFamily="2" charset="2"/>
-              <a:buChar char="è"/>
-            </a:pPr>
-            <a:r>
-              <a:rPr lang="en-US" dirty="0"/>
-              <a:t>This is accomplished thru an online software subscription service</a:t>
-            </a:r>
-          </a:p>
-          <a:p>
-            <a:pPr marL="457200" lvl="1" indent="0">
-              <a:buNone/>
-            </a:pPr>
-            <a:r>
-              <a:rPr lang="en-US" dirty="0"/>
-              <a:t> </a:t>
+          <a:bodyPr>
+            <a:normAutofit fontScale="92500" lnSpcReduction="20000"/>
+          </a:bodyPr>
+          <a:lstStyle/>
+          <a:p>
+            <a:pPr lvl="1"/>
+            <a:r>
+              <a:rPr lang="en-US" dirty="0"/>
+              <a:t>License Asset Management Systems (LAMs)</a:t>
+            </a:r>
+          </a:p>
+          <a:p>
+            <a:pPr lvl="2"/>
+            <a:r>
+              <a:rPr lang="en-US" dirty="0"/>
+              <a:t>Allows users to purchase software license for specific applications.</a:t>
+            </a:r>
+          </a:p>
+          <a:p>
+            <a:pPr lvl="2"/>
+            <a:r>
+              <a:rPr lang="en-US" dirty="0"/>
+              <a:t>Allows developers to embed license requirements in their applications.</a:t>
+            </a:r>
+          </a:p>
+          <a:p>
+            <a:pPr lvl="1"/>
+            <a:r>
+              <a:rPr lang="en-US" dirty="0"/>
+              <a:t>The customer: The maintenance team of the License Asset Management System.</a:t>
+            </a:r>
+          </a:p>
+          <a:p>
+            <a:pPr lvl="1"/>
+            <a:r>
+              <a:rPr lang="en-US" dirty="0"/>
+              <a:t>The end user: Users of Software that is license controlled by the License Asset Management System.</a:t>
+            </a:r>
+          </a:p>
+          <a:p>
+            <a:pPr lvl="1"/>
+            <a:r>
+              <a:rPr lang="en-US" dirty="0"/>
+              <a:t>The problem being addressed: </a:t>
+            </a:r>
+          </a:p>
+          <a:p>
+            <a:pPr lvl="2"/>
+            <a:r>
+              <a:rPr lang="en-US" dirty="0"/>
+              <a:t>There is a lack of understanding of the systems structure.</a:t>
+            </a:r>
+          </a:p>
+          <a:p>
+            <a:pPr lvl="2"/>
+            <a:r>
+              <a:rPr lang="en-US" dirty="0"/>
+              <a:t>There is a lack of confidence that the system meets the requirements.</a:t>
+            </a:r>
+          </a:p>
+          <a:p>
+            <a:pPr lvl="1"/>
+            <a:r>
+              <a:rPr lang="en-US" dirty="0"/>
+              <a:t>The value being added: A better understanding of the systems structure and increase in confidence that the systems meets the requirements.</a:t>
             </a:r>
           </a:p>
         </p:txBody>
@@ -5480,665 +6243,6 @@
           <a:chExt cx="0" cy="0"/>
         </a:xfrm>
       </p:grpSpPr>
-      <p:pic>
-        <p:nvPicPr>
-          <p:cNvPr id="5" name="Picture 4">
-            <a:extLst>
-              <a:ext uri="{FF2B5EF4-FFF2-40B4-BE49-F238E27FC236}">
-                <a16:creationId xmlns:a16="http://schemas.microsoft.com/office/drawing/2014/main" id="{75D08E5E-0B32-19A5-8DE1-691760410004}"/>
-              </a:ext>
-            </a:extLst>
-          </p:cNvPr>
-          <p:cNvPicPr>
-            <a:picLocks noChangeAspect="1"/>
-          </p:cNvPicPr>
-          <p:nvPr/>
-        </p:nvPicPr>
-        <p:blipFill>
-          <a:blip r:embed="rId2"/>
-          <a:stretch>
-            <a:fillRect/>
-          </a:stretch>
-        </p:blipFill>
-        <p:spPr>
-          <a:xfrm>
-            <a:off x="1493195" y="212590"/>
-            <a:ext cx="9205609" cy="5973493"/>
-          </a:xfrm>
-          <a:prstGeom prst="rect">
-            <a:avLst/>
-          </a:prstGeom>
-        </p:spPr>
-      </p:pic>
-      <p:sp>
-        <p:nvSpPr>
-          <p:cNvPr id="6" name="TextBox 5">
-            <a:extLst>
-              <a:ext uri="{FF2B5EF4-FFF2-40B4-BE49-F238E27FC236}">
-                <a16:creationId xmlns:a16="http://schemas.microsoft.com/office/drawing/2014/main" id="{5374EDF9-B0FF-D535-A89B-11CF2BAB178C}"/>
-              </a:ext>
-            </a:extLst>
-          </p:cNvPr>
-          <p:cNvSpPr txBox="1"/>
-          <p:nvPr/>
-        </p:nvSpPr>
-        <p:spPr>
-          <a:xfrm>
-            <a:off x="4202348" y="3531140"/>
-            <a:ext cx="1233030" cy="276999"/>
-          </a:xfrm>
-          <a:prstGeom prst="rect">
-            <a:avLst/>
-          </a:prstGeom>
-          <a:noFill/>
-        </p:spPr>
-        <p:txBody>
-          <a:bodyPr wrap="none" rtlCol="0">
-            <a:spAutoFit/>
-          </a:bodyPr>
-          <a:lstStyle/>
-          <a:p>
-            <a:r>
-              <a:rPr lang="en-US" sz="1200" dirty="0"/>
-              <a:t>Future Release</a:t>
-            </a:r>
-          </a:p>
-        </p:txBody>
-      </p:sp>
-    </p:spTree>
-    <p:extLst>
-      <p:ext uri="{BB962C8B-B14F-4D97-AF65-F5344CB8AC3E}">
-        <p14:creationId xmlns:p14="http://schemas.microsoft.com/office/powerpoint/2010/main" val="239245858"/>
-      </p:ext>
-    </p:extLst>
-  </p:cSld>
-  <p:clrMapOvr>
-    <a:masterClrMapping/>
-  </p:clrMapOvr>
-</p:sld>
-</file>
-
-<file path=ppt/slides/slide5.xml><?xml version="1.0" encoding="utf-8"?>
-<p:sld xmlns:a="http://schemas.openxmlformats.org/drawingml/2006/main" xmlns:r="http://schemas.openxmlformats.org/officeDocument/2006/relationships" xmlns:p="http://schemas.openxmlformats.org/presentationml/2006/main">
-  <p:cSld>
-    <p:spTree>
-      <p:nvGrpSpPr>
-        <p:cNvPr id="1" name=""/>
-        <p:cNvGrpSpPr/>
-        <p:nvPr/>
-      </p:nvGrpSpPr>
-      <p:grpSpPr>
-        <a:xfrm>
-          <a:off x="0" y="0"/>
-          <a:ext cx="0" cy="0"/>
-          <a:chOff x="0" y="0"/>
-          <a:chExt cx="0" cy="0"/>
-        </a:xfrm>
-      </p:grpSpPr>
-      <p:sp>
-        <p:nvSpPr>
-          <p:cNvPr id="2" name="Title 1">
-            <a:extLst>
-              <a:ext uri="{FF2B5EF4-FFF2-40B4-BE49-F238E27FC236}">
-                <a16:creationId xmlns:a16="http://schemas.microsoft.com/office/drawing/2014/main" id="{1B97FB8D-77EC-10ED-DF38-0F27922C9925}"/>
-              </a:ext>
-            </a:extLst>
-          </p:cNvPr>
-          <p:cNvSpPr>
-            <a:spLocks noGrp="1"/>
-          </p:cNvSpPr>
-          <p:nvPr>
-            <p:ph type="title"/>
-          </p:nvPr>
-        </p:nvSpPr>
-        <p:spPr>
-          <a:xfrm>
-            <a:off x="786454" y="178679"/>
-            <a:ext cx="10364451" cy="944065"/>
-          </a:xfrm>
-        </p:spPr>
-        <p:txBody>
-          <a:bodyPr>
-            <a:normAutofit/>
-          </a:bodyPr>
-          <a:lstStyle/>
-          <a:p>
-            <a:r>
-              <a:rPr lang="en-US" dirty="0"/>
-              <a:t>Open-source Software License</a:t>
-            </a:r>
-          </a:p>
-        </p:txBody>
-      </p:sp>
-      <p:sp>
-        <p:nvSpPr>
-          <p:cNvPr id="3" name="Content Placeholder 2">
-            <a:extLst>
-              <a:ext uri="{FF2B5EF4-FFF2-40B4-BE49-F238E27FC236}">
-                <a16:creationId xmlns:a16="http://schemas.microsoft.com/office/drawing/2014/main" id="{62FCB5B8-2560-885B-CAE0-DB5AD9D2632C}"/>
-              </a:ext>
-            </a:extLst>
-          </p:cNvPr>
-          <p:cNvSpPr>
-            <a:spLocks noGrp="1"/>
-          </p:cNvSpPr>
-          <p:nvPr>
-            <p:ph idx="1"/>
-          </p:nvPr>
-        </p:nvSpPr>
-        <p:spPr>
-          <a:xfrm>
-            <a:off x="589684" y="972273"/>
-            <a:ext cx="10364452" cy="5405377"/>
-          </a:xfrm>
-        </p:spPr>
-        <p:txBody>
-          <a:bodyPr>
-            <a:normAutofit fontScale="77500" lnSpcReduction="20000"/>
-          </a:bodyPr>
-          <a:lstStyle/>
-          <a:p>
-            <a:pPr marL="0" marR="0">
-              <a:lnSpc>
-                <a:spcPct val="107000"/>
-              </a:lnSpc>
-              <a:spcAft>
-                <a:spcPts val="800"/>
-              </a:spcAft>
-            </a:pPr>
-            <a:r>
-              <a:rPr lang="en-US" sz="1800" kern="100" dirty="0">
-                <a:effectLst/>
-                <a:latin typeface="Aptos" panose="020B0004020202020204" pitchFamily="34" charset="0"/>
-                <a:ea typeface="Aptos" panose="020B0004020202020204" pitchFamily="34" charset="0"/>
-                <a:cs typeface="Times New Roman" panose="02020603050405020304" pitchFamily="18" charset="0"/>
-              </a:rPr>
-              <a:t>The GitHub repository contains a </a:t>
-            </a:r>
-            <a:r>
-              <a:rPr lang="en-US" sz="1800" kern="100" dirty="0" err="1">
-                <a:effectLst/>
-                <a:latin typeface="Aptos" panose="020B0004020202020204" pitchFamily="34" charset="0"/>
-                <a:ea typeface="Aptos" panose="020B0004020202020204" pitchFamily="34" charset="0"/>
-                <a:cs typeface="Times New Roman" panose="02020603050405020304" pitchFamily="18" charset="0"/>
-              </a:rPr>
-              <a:t>README.md</a:t>
-            </a:r>
-            <a:r>
-              <a:rPr lang="en-US" sz="1800" kern="100" dirty="0">
-                <a:effectLst/>
-                <a:latin typeface="Aptos" panose="020B0004020202020204" pitchFamily="34" charset="0"/>
-                <a:ea typeface="Aptos" panose="020B0004020202020204" pitchFamily="34" charset="0"/>
-                <a:cs typeface="Times New Roman" panose="02020603050405020304" pitchFamily="18" charset="0"/>
-              </a:rPr>
-              <a:t> file with important project information.</a:t>
-            </a:r>
-          </a:p>
-          <a:p>
-            <a:pPr marL="0" marR="0">
-              <a:lnSpc>
-                <a:spcPct val="107000"/>
-              </a:lnSpc>
-              <a:spcAft>
-                <a:spcPts val="800"/>
-              </a:spcAft>
-            </a:pPr>
-            <a:r>
-              <a:rPr lang="en-US" sz="1800" u="sng" kern="100" dirty="0">
-                <a:solidFill>
-                  <a:srgbClr val="467886"/>
-                </a:solidFill>
-                <a:effectLst/>
-                <a:latin typeface="Aptos" panose="020B0004020202020204" pitchFamily="34" charset="0"/>
-                <a:ea typeface="Aptos" panose="020B0004020202020204" pitchFamily="34" charset="0"/>
-                <a:cs typeface="Times New Roman" panose="02020603050405020304" pitchFamily="18" charset="0"/>
-                <a:hlinkClick r:id="rId2"/>
-              </a:rPr>
-              <a:t>https://github.com/colby13king/cs5320-code/blob/master/README.md</a:t>
-            </a:r>
-            <a:endParaRPr lang="en-US" sz="1800" kern="100" dirty="0">
-              <a:effectLst/>
-              <a:latin typeface="Aptos" panose="020B0004020202020204" pitchFamily="34" charset="0"/>
-              <a:ea typeface="Aptos" panose="020B0004020202020204" pitchFamily="34" charset="0"/>
-              <a:cs typeface="Times New Roman" panose="02020603050405020304" pitchFamily="18" charset="0"/>
-            </a:endParaRPr>
-          </a:p>
-          <a:p>
-            <a:pPr marL="0" marR="0">
-              <a:lnSpc>
-                <a:spcPct val="107000"/>
-              </a:lnSpc>
-              <a:spcAft>
-                <a:spcPts val="800"/>
-              </a:spcAft>
-            </a:pPr>
-            <a:r>
-              <a:rPr lang="en-US" sz="1800" kern="100" dirty="0">
-                <a:effectLst/>
-                <a:latin typeface="Aptos" panose="020B0004020202020204" pitchFamily="34" charset="0"/>
-                <a:ea typeface="Aptos" panose="020B0004020202020204" pitchFamily="34" charset="0"/>
-                <a:cs typeface="Times New Roman" panose="02020603050405020304" pitchFamily="18" charset="0"/>
-              </a:rPr>
-              <a:t>It is also included as part of this package.</a:t>
-            </a:r>
-          </a:p>
-          <a:p>
-            <a:pPr marL="0" marR="0" indent="0">
-              <a:spcAft>
-                <a:spcPts val="1800"/>
-              </a:spcAft>
-              <a:buNone/>
-            </a:pPr>
-            <a:r>
-              <a:rPr lang="en-US" sz="1800" dirty="0">
-                <a:solidFill>
-                  <a:srgbClr val="000000"/>
-                </a:solidFill>
-                <a:effectLst/>
-                <a:latin typeface="Arial" panose="020B0604020202020204" pitchFamily="34" charset="0"/>
-                <a:ea typeface="Times New Roman" panose="02020603050405020304" pitchFamily="18" charset="0"/>
-              </a:rPr>
-              <a:t>Copyright 2024-2025 Johnny C. King and John L Williams Jr</a:t>
-            </a:r>
-          </a:p>
-          <a:p>
-            <a:pPr marL="0" marR="0" indent="0">
-              <a:spcAft>
-                <a:spcPts val="1800"/>
-              </a:spcAft>
-              <a:buNone/>
-            </a:pPr>
-            <a:r>
-              <a:rPr lang="en-US" sz="1800" dirty="0">
-                <a:solidFill>
-                  <a:srgbClr val="000000"/>
-                </a:solidFill>
-                <a:effectLst/>
-                <a:latin typeface="Libre Franklin" pitchFamily="2" charset="77"/>
-                <a:ea typeface="Times New Roman" panose="02020603050405020304" pitchFamily="18" charset="0"/>
-              </a:rPr>
-              <a:t>Permission is hereby granted, free of charge, to any person obtaining a copy of this software and associated documentation files (the “Software”), to deal in the Software without restriction, including without limitation the rights to use, copy, modify, merge, publish, distribute, sublicense, and/or sell copies of the Software, and to permit persons to whom the Software is furnished to do so, subject to the following conditions:</a:t>
-            </a:r>
-            <a:endParaRPr lang="en-US" sz="1800" dirty="0">
-              <a:effectLst/>
-              <a:latin typeface="Times New Roman" panose="02020603050405020304" pitchFamily="18" charset="0"/>
-              <a:ea typeface="Times New Roman" panose="02020603050405020304" pitchFamily="18" charset="0"/>
-            </a:endParaRPr>
-          </a:p>
-          <a:p>
-            <a:pPr marL="0" marR="0" indent="0">
-              <a:spcAft>
-                <a:spcPts val="1800"/>
-              </a:spcAft>
-              <a:buNone/>
-            </a:pPr>
-            <a:r>
-              <a:rPr lang="en-US" sz="1800" dirty="0">
-                <a:solidFill>
-                  <a:srgbClr val="000000"/>
-                </a:solidFill>
-                <a:effectLst/>
-                <a:latin typeface="Libre Franklin" pitchFamily="2" charset="77"/>
-                <a:ea typeface="Times New Roman" panose="02020603050405020304" pitchFamily="18" charset="0"/>
-              </a:rPr>
-              <a:t>The above copyright notice and this permission notice shall be included in all copies or substantial portions of the Software.</a:t>
-            </a:r>
-            <a:endParaRPr lang="en-US" sz="1800" dirty="0">
-              <a:effectLst/>
-              <a:latin typeface="Times New Roman" panose="02020603050405020304" pitchFamily="18" charset="0"/>
-              <a:ea typeface="Times New Roman" panose="02020603050405020304" pitchFamily="18" charset="0"/>
-            </a:endParaRPr>
-          </a:p>
-          <a:p>
-            <a:pPr marL="0" marR="0" indent="0">
-              <a:spcAft>
-                <a:spcPts val="1800"/>
-              </a:spcAft>
-              <a:buNone/>
-            </a:pPr>
-            <a:r>
-              <a:rPr lang="en-US" sz="1800" dirty="0">
-                <a:solidFill>
-                  <a:srgbClr val="000000"/>
-                </a:solidFill>
-                <a:latin typeface="Libre Franklin" pitchFamily="2" charset="77"/>
-                <a:ea typeface="Times New Roman" panose="02020603050405020304" pitchFamily="18" charset="0"/>
-              </a:rPr>
-              <a:t>T</a:t>
-            </a:r>
-            <a:r>
-              <a:rPr lang="en-US" sz="1800" dirty="0">
-                <a:solidFill>
-                  <a:srgbClr val="000000"/>
-                </a:solidFill>
-                <a:effectLst/>
-                <a:latin typeface="Libre Franklin" pitchFamily="2" charset="77"/>
-                <a:ea typeface="Times New Roman" panose="02020603050405020304" pitchFamily="18" charset="0"/>
-              </a:rPr>
-              <a:t>HE SOFTWARE IS PROVIDED “AS IS”, WITHOUT WARRANTY OF ANY KIND, EXPRESS OR IMPLIED, INCLUDING BUT NOT LIMITED TO THE WARRANTIES OF MERCHANTABILITY, FITNESS FOR A PARTICULAR PURPOSE AND NONINFRINGEMENT. IN NO EVENT SHALL THE AUTHORS OR COPYRIGHT HOLDERS BE LIABLE FOR ANY CLAIM, DAMAGES OR OTHER LIABILITY, WHETHER IN AN ACTION OF CONTRACT, TORT OR OTHERWISE, ARISING FROM, OUT OF OR IN CONNECTION WITH THE SOFTWARE OR THE USE OR OTHER DEALINGS IN THE SOFTWARE.</a:t>
-            </a:r>
-            <a:endParaRPr lang="en-US" sz="1800" dirty="0">
-              <a:effectLst/>
-              <a:latin typeface="Times New Roman" panose="02020603050405020304" pitchFamily="18" charset="0"/>
-              <a:ea typeface="Times New Roman" panose="02020603050405020304" pitchFamily="18" charset="0"/>
-            </a:endParaRPr>
-          </a:p>
-          <a:p>
-            <a:pPr marL="0" marR="0" indent="0">
-              <a:spcAft>
-                <a:spcPts val="1800"/>
-              </a:spcAft>
-              <a:buNone/>
-            </a:pPr>
-            <a:r>
-              <a:rPr lang="en-US" sz="1800" dirty="0">
-                <a:solidFill>
-                  <a:srgbClr val="000000"/>
-                </a:solidFill>
-                <a:effectLst/>
-                <a:latin typeface="Libre Franklin" pitchFamily="2" charset="77"/>
-                <a:ea typeface="Times New Roman" panose="02020603050405020304" pitchFamily="18" charset="0"/>
-              </a:rPr>
-              <a:t>This license is also controlled by the Manning Publisher License, who provided a great deal of guidance and source material in the creation of the application. Please read the details in the link provided below.</a:t>
-            </a:r>
-            <a:endParaRPr lang="en-US" sz="1800" dirty="0">
-              <a:effectLst/>
-              <a:latin typeface="Times New Roman" panose="02020603050405020304" pitchFamily="18" charset="0"/>
-              <a:ea typeface="Times New Roman" panose="02020603050405020304" pitchFamily="18" charset="0"/>
-            </a:endParaRPr>
-          </a:p>
-          <a:p>
-            <a:pPr marL="0" marR="0" indent="0">
-              <a:spcAft>
-                <a:spcPts val="1800"/>
-              </a:spcAft>
-              <a:buNone/>
-            </a:pPr>
-            <a:r>
-              <a:rPr lang="en-US" sz="1800" u="sng" dirty="0">
-                <a:solidFill>
-                  <a:srgbClr val="000000"/>
-                </a:solidFill>
-                <a:effectLst/>
-                <a:latin typeface="Libre Franklin" pitchFamily="2" charset="77"/>
-                <a:ea typeface="Times New Roman" panose="02020603050405020304" pitchFamily="18" charset="0"/>
-                <a:hlinkClick r:id="rId3"/>
-              </a:rPr>
-              <a:t>https://www.manning.com/ebook-license</a:t>
-            </a:r>
-            <a:endParaRPr lang="en-US" sz="1800" dirty="0">
-              <a:effectLst/>
-              <a:latin typeface="Times New Roman" panose="02020603050405020304" pitchFamily="18" charset="0"/>
-              <a:ea typeface="Times New Roman" panose="02020603050405020304" pitchFamily="18" charset="0"/>
-            </a:endParaRPr>
-          </a:p>
-          <a:p>
-            <a:endParaRPr lang="en-US" dirty="0"/>
-          </a:p>
-        </p:txBody>
-      </p:sp>
-      <p:sp>
-        <p:nvSpPr>
-          <p:cNvPr id="4" name="TextBox 3">
-            <a:extLst>
-              <a:ext uri="{FF2B5EF4-FFF2-40B4-BE49-F238E27FC236}">
-                <a16:creationId xmlns:a16="http://schemas.microsoft.com/office/drawing/2014/main" id="{C466BEC3-D302-F2B7-F8E3-B51714C4B227}"/>
-              </a:ext>
-            </a:extLst>
-          </p:cNvPr>
-          <p:cNvSpPr txBox="1"/>
-          <p:nvPr/>
-        </p:nvSpPr>
-        <p:spPr>
-          <a:xfrm>
-            <a:off x="11359376" y="297366"/>
-            <a:ext cx="300082" cy="646331"/>
-          </a:xfrm>
-          <a:prstGeom prst="rect">
-            <a:avLst/>
-          </a:prstGeom>
-          <a:noFill/>
-        </p:spPr>
-        <p:txBody>
-          <a:bodyPr wrap="none" rtlCol="0">
-            <a:spAutoFit/>
-          </a:bodyPr>
-          <a:lstStyle/>
-          <a:p>
-            <a:r>
-              <a:rPr lang="en-US" dirty="0">
-                <a:highlight>
-                  <a:srgbClr val="00FF00"/>
-                </a:highlight>
-              </a:rPr>
-              <a:t>_</a:t>
-            </a:r>
-          </a:p>
-          <a:p>
-            <a:endParaRPr lang="en-US" dirty="0"/>
-          </a:p>
-        </p:txBody>
-      </p:sp>
-    </p:spTree>
-    <p:extLst>
-      <p:ext uri="{BB962C8B-B14F-4D97-AF65-F5344CB8AC3E}">
-        <p14:creationId xmlns:p14="http://schemas.microsoft.com/office/powerpoint/2010/main" val="3073130659"/>
-      </p:ext>
-    </p:extLst>
-  </p:cSld>
-  <p:clrMapOvr>
-    <a:masterClrMapping/>
-  </p:clrMapOvr>
-</p:sld>
-</file>
-
-<file path=ppt/slides/slide6.xml><?xml version="1.0" encoding="utf-8"?>
-<p:sld xmlns:a="http://schemas.openxmlformats.org/drawingml/2006/main" xmlns:r="http://schemas.openxmlformats.org/officeDocument/2006/relationships" xmlns:p="http://schemas.openxmlformats.org/presentationml/2006/main">
-  <p:cSld>
-    <p:spTree>
-      <p:nvGrpSpPr>
-        <p:cNvPr id="1" name=""/>
-        <p:cNvGrpSpPr/>
-        <p:nvPr/>
-      </p:nvGrpSpPr>
-      <p:grpSpPr>
-        <a:xfrm>
-          <a:off x="0" y="0"/>
-          <a:ext cx="0" cy="0"/>
-          <a:chOff x="0" y="0"/>
-          <a:chExt cx="0" cy="0"/>
-        </a:xfrm>
-      </p:grpSpPr>
-      <p:sp>
-        <p:nvSpPr>
-          <p:cNvPr id="2" name="Title 1">
-            <a:extLst>
-              <a:ext uri="{FF2B5EF4-FFF2-40B4-BE49-F238E27FC236}">
-                <a16:creationId xmlns:a16="http://schemas.microsoft.com/office/drawing/2014/main" id="{D3D0CF5B-E8F3-EFFA-F511-41713F7FD617}"/>
-              </a:ext>
-            </a:extLst>
-          </p:cNvPr>
-          <p:cNvSpPr>
-            <a:spLocks noGrp="1"/>
-          </p:cNvSpPr>
-          <p:nvPr>
-            <p:ph type="title"/>
-          </p:nvPr>
-        </p:nvSpPr>
-        <p:spPr/>
-        <p:txBody>
-          <a:bodyPr/>
-          <a:lstStyle/>
-          <a:p>
-            <a:r>
-              <a:rPr lang="en-US" dirty="0"/>
-              <a:t>Multi-tier Client Server Architectural Pattern</a:t>
-            </a:r>
-          </a:p>
-        </p:txBody>
-      </p:sp>
-      <p:sp>
-        <p:nvSpPr>
-          <p:cNvPr id="3" name="Content Placeholder 2">
-            <a:extLst>
-              <a:ext uri="{FF2B5EF4-FFF2-40B4-BE49-F238E27FC236}">
-                <a16:creationId xmlns:a16="http://schemas.microsoft.com/office/drawing/2014/main" id="{C0DEA48A-4AC0-B1CA-FB0C-EA3594D40239}"/>
-              </a:ext>
-            </a:extLst>
-          </p:cNvPr>
-          <p:cNvSpPr>
-            <a:spLocks noGrp="1"/>
-          </p:cNvSpPr>
-          <p:nvPr>
-            <p:ph idx="1"/>
-          </p:nvPr>
-        </p:nvSpPr>
-        <p:spPr>
-          <a:xfrm>
-            <a:off x="865136" y="1831939"/>
-            <a:ext cx="4257665" cy="4125147"/>
-          </a:xfrm>
-        </p:spPr>
-        <p:txBody>
-          <a:bodyPr>
-            <a:normAutofit fontScale="92500" lnSpcReduction="20000"/>
-          </a:bodyPr>
-          <a:lstStyle/>
-          <a:p>
-            <a:pPr marL="342900" indent="-342900">
-              <a:buFontTx/>
-              <a:buChar char="-"/>
-            </a:pPr>
-            <a:r>
-              <a:rPr lang="en-US" dirty="0"/>
-              <a:t>Good for large volume of transactions</a:t>
-            </a:r>
-          </a:p>
-          <a:p>
-            <a:pPr marL="342900" indent="-342900">
-              <a:buFontTx/>
-              <a:buChar char="-"/>
-            </a:pPr>
-            <a:r>
-              <a:rPr lang="en-US" dirty="0"/>
-              <a:t>Able to scale as more clients sign up for the service it will be better for larger scale</a:t>
-            </a:r>
-          </a:p>
-          <a:p>
-            <a:pPr marL="342900" indent="-342900">
-              <a:buFontTx/>
-              <a:buChar char="-"/>
-            </a:pPr>
-            <a:r>
-              <a:rPr lang="en-US" dirty="0"/>
-              <a:t>Good for applications where data is volatile</a:t>
-            </a:r>
-          </a:p>
-          <a:p>
-            <a:endParaRPr lang="en-US" dirty="0"/>
-          </a:p>
-        </p:txBody>
-      </p:sp>
-      <p:pic>
-        <p:nvPicPr>
-          <p:cNvPr id="5" name="Content Placeholder 7" descr="A diagram of a web server&#10;&#10;Description automatically generated">
-            <a:extLst>
-              <a:ext uri="{FF2B5EF4-FFF2-40B4-BE49-F238E27FC236}">
-                <a16:creationId xmlns:a16="http://schemas.microsoft.com/office/drawing/2014/main" id="{96CAF9FE-622A-FBEF-CA61-20147D31D129}"/>
-              </a:ext>
-            </a:extLst>
-          </p:cNvPr>
-          <p:cNvPicPr>
-            <a:picLocks noChangeAspect="1"/>
-          </p:cNvPicPr>
-          <p:nvPr/>
-        </p:nvPicPr>
-        <p:blipFill>
-          <a:blip r:embed="rId2"/>
-          <a:stretch>
-            <a:fillRect/>
-          </a:stretch>
-        </p:blipFill>
-        <p:spPr>
-          <a:xfrm>
-            <a:off x="5132689" y="1593280"/>
-            <a:ext cx="6449711" cy="3902075"/>
-          </a:xfrm>
-          <a:prstGeom prst="rect">
-            <a:avLst/>
-          </a:prstGeom>
-          <a:noFill/>
-        </p:spPr>
-      </p:pic>
-      <p:sp>
-        <p:nvSpPr>
-          <p:cNvPr id="6" name="TextBox 5">
-            <a:extLst>
-              <a:ext uri="{FF2B5EF4-FFF2-40B4-BE49-F238E27FC236}">
-                <a16:creationId xmlns:a16="http://schemas.microsoft.com/office/drawing/2014/main" id="{E2770FA6-0920-360A-A878-20A46697C656}"/>
-              </a:ext>
-            </a:extLst>
-          </p:cNvPr>
-          <p:cNvSpPr txBox="1"/>
-          <p:nvPr/>
-        </p:nvSpPr>
-        <p:spPr>
-          <a:xfrm>
-            <a:off x="11693055" y="185352"/>
-            <a:ext cx="300082" cy="369332"/>
-          </a:xfrm>
-          <a:prstGeom prst="rect">
-            <a:avLst/>
-          </a:prstGeom>
-          <a:noFill/>
-        </p:spPr>
-        <p:txBody>
-          <a:bodyPr wrap="none" rtlCol="0">
-            <a:spAutoFit/>
-          </a:bodyPr>
-          <a:lstStyle/>
-          <a:p>
-            <a:r>
-              <a:rPr lang="en-US" dirty="0">
-                <a:highlight>
-                  <a:srgbClr val="00FF00"/>
-                </a:highlight>
-              </a:rPr>
-              <a:t>_</a:t>
-            </a:r>
-          </a:p>
-        </p:txBody>
-      </p:sp>
-    </p:spTree>
-    <p:extLst>
-      <p:ext uri="{BB962C8B-B14F-4D97-AF65-F5344CB8AC3E}">
-        <p14:creationId xmlns:p14="http://schemas.microsoft.com/office/powerpoint/2010/main" val="3757137156"/>
-      </p:ext>
-    </p:extLst>
-  </p:cSld>
-  <p:clrMapOvr>
-    <a:masterClrMapping/>
-  </p:clrMapOvr>
-</p:sld>
-</file>
-
-<file path=ppt/slides/slide7.xml><?xml version="1.0" encoding="utf-8"?>
-<p:sld xmlns:a="http://schemas.openxmlformats.org/drawingml/2006/main" xmlns:r="http://schemas.openxmlformats.org/officeDocument/2006/relationships" xmlns:p="http://schemas.openxmlformats.org/presentationml/2006/main">
-  <p:cSld>
-    <p:spTree>
-      <p:nvGrpSpPr>
-        <p:cNvPr id="1" name=""/>
-        <p:cNvGrpSpPr/>
-        <p:nvPr/>
-      </p:nvGrpSpPr>
-      <p:grpSpPr>
-        <a:xfrm>
-          <a:off x="0" y="0"/>
-          <a:ext cx="0" cy="0"/>
-          <a:chOff x="0" y="0"/>
-          <a:chExt cx="0" cy="0"/>
-        </a:xfrm>
-      </p:grpSpPr>
       <p:sp>
         <p:nvSpPr>
           <p:cNvPr id="2" name="Title 1">
@@ -6187,7 +6291,7 @@
           <p:nvPr>
             <p:extLst>
               <p:ext uri="{D42A27DB-BD31-4B8C-83A1-F6EECF244321}">
-                <p14:modId xmlns:p14="http://schemas.microsoft.com/office/powerpoint/2010/main" val="4154495460"/>
+                <p14:modId xmlns:p14="http://schemas.microsoft.com/office/powerpoint/2010/main" val="3025551571"/>
               </p:ext>
             </p:extLst>
           </p:nvPr>
@@ -6347,7 +6451,7 @@
                           <a:ea typeface="Aptos" panose="020B0004020202020204" pitchFamily="34" charset="0"/>
                           <a:cs typeface="Times New Roman" panose="02020603050405020304" pitchFamily="18" charset="0"/>
                         </a:rPr>
-                        <a:t>Work Breakdown</a:t>
+                        <a:t>Owner</a:t>
                       </a:r>
                     </a:p>
                   </a:txBody>
@@ -6461,7 +6565,7 @@
                           <a:ea typeface="Aptos" panose="020B0004020202020204" pitchFamily="34" charset="0"/>
                           <a:cs typeface="Times New Roman" panose="02020603050405020304" pitchFamily="18" charset="0"/>
                         </a:rPr>
-                        <a:t>In Progress</a:t>
+                        <a:t>Completed</a:t>
                       </a:r>
                     </a:p>
                   </a:txBody>
@@ -6604,7 +6708,7 @@
                           <a:ea typeface="Aptos" panose="020B0004020202020204" pitchFamily="34" charset="0"/>
                           <a:cs typeface="Times New Roman" panose="02020603050405020304" pitchFamily="18" charset="0"/>
                         </a:rPr>
-                        <a:t>In Progress</a:t>
+                        <a:t>Completed</a:t>
                       </a:r>
                     </a:p>
                   </a:txBody>
@@ -6756,7 +6860,7 @@
                           <a:ea typeface="Aptos" panose="020B0004020202020204" pitchFamily="34" charset="0"/>
                           <a:cs typeface="Times New Roman" panose="02020603050405020304" pitchFamily="18" charset="0"/>
                         </a:rPr>
-                        <a:t>Not started</a:t>
+                        <a:t>Completed</a:t>
                       </a:r>
                     </a:p>
                   </a:txBody>
@@ -6808,7 +6912,7 @@
                           <a:ea typeface="Aptos" panose="020B0004020202020204" pitchFamily="34" charset="0"/>
                           <a:cs typeface="Times New Roman" panose="02020603050405020304" pitchFamily="18" charset="0"/>
                         </a:rPr>
-                        <a:t>3/24/25</a:t>
+                        <a:t>4/14/25</a:t>
                       </a:r>
                     </a:p>
                   </a:txBody>
@@ -6908,7 +7012,7 @@
                           <a:ea typeface="Aptos" panose="020B0004020202020204" pitchFamily="34" charset="0"/>
                           <a:cs typeface="Times New Roman" panose="02020603050405020304" pitchFamily="18" charset="0"/>
                         </a:rPr>
-                        <a:t>Not started</a:t>
+                        <a:t>In Progress</a:t>
                       </a:r>
                     </a:p>
                   </a:txBody>
@@ -7060,7 +7164,7 @@
                           <a:ea typeface="Aptos" panose="020B0004020202020204" pitchFamily="34" charset="0"/>
                           <a:cs typeface="Times New Roman" panose="02020603050405020304" pitchFamily="18" charset="0"/>
                         </a:rPr>
-                        <a:t>Not started</a:t>
+                        <a:t>In Progress</a:t>
                       </a:r>
                     </a:p>
                   </a:txBody>
@@ -7240,6 +7344,666 @@
 </p:sld>
 </file>
 
+<file path=ppt/slides/slide5.xml><?xml version="1.0" encoding="utf-8"?>
+<p:sld xmlns:a="http://schemas.openxmlformats.org/drawingml/2006/main" xmlns:r="http://schemas.openxmlformats.org/officeDocument/2006/relationships" xmlns:p="http://schemas.openxmlformats.org/presentationml/2006/main">
+  <p:cSld>
+    <p:spTree>
+      <p:nvGrpSpPr>
+        <p:cNvPr id="1" name=""/>
+        <p:cNvGrpSpPr/>
+        <p:nvPr/>
+      </p:nvGrpSpPr>
+      <p:grpSpPr>
+        <a:xfrm>
+          <a:off x="0" y="0"/>
+          <a:ext cx="0" cy="0"/>
+          <a:chOff x="0" y="0"/>
+          <a:chExt cx="0" cy="0"/>
+        </a:xfrm>
+      </p:grpSpPr>
+      <p:sp>
+        <p:nvSpPr>
+          <p:cNvPr id="2" name="Title 1">
+            <a:extLst>
+              <a:ext uri="{FF2B5EF4-FFF2-40B4-BE49-F238E27FC236}">
+                <a16:creationId xmlns:a16="http://schemas.microsoft.com/office/drawing/2014/main" id="{1B97FB8D-77EC-10ED-DF38-0F27922C9925}"/>
+              </a:ext>
+            </a:extLst>
+          </p:cNvPr>
+          <p:cNvSpPr>
+            <a:spLocks noGrp="1"/>
+          </p:cNvSpPr>
+          <p:nvPr>
+            <p:ph type="title"/>
+          </p:nvPr>
+        </p:nvSpPr>
+        <p:spPr>
+          <a:xfrm>
+            <a:off x="786454" y="178679"/>
+            <a:ext cx="10364451" cy="944065"/>
+          </a:xfrm>
+        </p:spPr>
+        <p:txBody>
+          <a:bodyPr>
+            <a:normAutofit/>
+          </a:bodyPr>
+          <a:lstStyle/>
+          <a:p>
+            <a:r>
+              <a:rPr lang="en-US" dirty="0"/>
+              <a:t>Open-source Software License</a:t>
+            </a:r>
+          </a:p>
+        </p:txBody>
+      </p:sp>
+      <p:sp>
+        <p:nvSpPr>
+          <p:cNvPr id="3" name="Content Placeholder 2">
+            <a:extLst>
+              <a:ext uri="{FF2B5EF4-FFF2-40B4-BE49-F238E27FC236}">
+                <a16:creationId xmlns:a16="http://schemas.microsoft.com/office/drawing/2014/main" id="{62FCB5B8-2560-885B-CAE0-DB5AD9D2632C}"/>
+              </a:ext>
+            </a:extLst>
+          </p:cNvPr>
+          <p:cNvSpPr>
+            <a:spLocks noGrp="1"/>
+          </p:cNvSpPr>
+          <p:nvPr>
+            <p:ph idx="1"/>
+          </p:nvPr>
+        </p:nvSpPr>
+        <p:spPr>
+          <a:xfrm>
+            <a:off x="589684" y="972274"/>
+            <a:ext cx="10364452" cy="5073964"/>
+          </a:xfrm>
+        </p:spPr>
+        <p:txBody>
+          <a:bodyPr>
+            <a:normAutofit fontScale="77500" lnSpcReduction="20000"/>
+          </a:bodyPr>
+          <a:lstStyle/>
+          <a:p>
+            <a:pPr marL="0" marR="0">
+              <a:lnSpc>
+                <a:spcPct val="107000"/>
+              </a:lnSpc>
+              <a:spcAft>
+                <a:spcPts val="800"/>
+              </a:spcAft>
+            </a:pPr>
+            <a:r>
+              <a:rPr lang="en-US" sz="1800" kern="100" dirty="0">
+                <a:effectLst/>
+                <a:latin typeface="Aptos" panose="020B0004020202020204" pitchFamily="34" charset="0"/>
+                <a:ea typeface="Aptos" panose="020B0004020202020204" pitchFamily="34" charset="0"/>
+                <a:cs typeface="Times New Roman" panose="02020603050405020304" pitchFamily="18" charset="0"/>
+              </a:rPr>
+              <a:t>The GitHub repository contains a README.md file with important project information.</a:t>
+            </a:r>
+          </a:p>
+          <a:p>
+            <a:pPr marL="0" marR="0">
+              <a:lnSpc>
+                <a:spcPct val="107000"/>
+              </a:lnSpc>
+              <a:spcAft>
+                <a:spcPts val="800"/>
+              </a:spcAft>
+            </a:pPr>
+            <a:r>
+              <a:rPr lang="en-US" sz="1800" u="sng" kern="100" dirty="0">
+                <a:solidFill>
+                  <a:srgbClr val="467886"/>
+                </a:solidFill>
+                <a:effectLst/>
+                <a:latin typeface="Aptos" panose="020B0004020202020204" pitchFamily="34" charset="0"/>
+                <a:ea typeface="Aptos" panose="020B0004020202020204" pitchFamily="34" charset="0"/>
+                <a:cs typeface="Times New Roman" panose="02020603050405020304" pitchFamily="18" charset="0"/>
+                <a:hlinkClick r:id="rId2"/>
+              </a:rPr>
+              <a:t>Project README</a:t>
+            </a:r>
+            <a:endParaRPr lang="en-US" sz="1800" kern="100" dirty="0">
+              <a:effectLst/>
+              <a:latin typeface="Aptos" panose="020B0004020202020204" pitchFamily="34" charset="0"/>
+              <a:ea typeface="Aptos" panose="020B0004020202020204" pitchFamily="34" charset="0"/>
+              <a:cs typeface="Times New Roman" panose="02020603050405020304" pitchFamily="18" charset="0"/>
+            </a:endParaRPr>
+          </a:p>
+          <a:p>
+            <a:pPr marL="0" marR="0">
+              <a:lnSpc>
+                <a:spcPct val="107000"/>
+              </a:lnSpc>
+              <a:spcAft>
+                <a:spcPts val="800"/>
+              </a:spcAft>
+            </a:pPr>
+            <a:r>
+              <a:rPr lang="en-US" sz="1800" kern="100" dirty="0">
+                <a:effectLst/>
+                <a:latin typeface="Aptos" panose="020B0004020202020204" pitchFamily="34" charset="0"/>
+                <a:ea typeface="Aptos" panose="020B0004020202020204" pitchFamily="34" charset="0"/>
+                <a:cs typeface="Times New Roman" panose="02020603050405020304" pitchFamily="18" charset="0"/>
+              </a:rPr>
+              <a:t>It is also included as part of this package.</a:t>
+            </a:r>
+          </a:p>
+          <a:p>
+            <a:pPr marL="0" marR="0" indent="0">
+              <a:spcAft>
+                <a:spcPts val="1800"/>
+              </a:spcAft>
+              <a:buNone/>
+            </a:pPr>
+            <a:r>
+              <a:rPr lang="en-US" sz="1800" dirty="0">
+                <a:solidFill>
+                  <a:srgbClr val="000000"/>
+                </a:solidFill>
+                <a:effectLst/>
+                <a:latin typeface="Arial" panose="020B0604020202020204" pitchFamily="34" charset="0"/>
+                <a:ea typeface="Times New Roman" panose="02020603050405020304" pitchFamily="18" charset="0"/>
+              </a:rPr>
+              <a:t>Copyright 2024-2025 Johnny C. King and John L Williams Jr</a:t>
+            </a:r>
+          </a:p>
+          <a:p>
+            <a:pPr marL="0" marR="0" indent="0">
+              <a:spcAft>
+                <a:spcPts val="1800"/>
+              </a:spcAft>
+              <a:buNone/>
+            </a:pPr>
+            <a:r>
+              <a:rPr lang="en-US" sz="1800" dirty="0">
+                <a:solidFill>
+                  <a:srgbClr val="000000"/>
+                </a:solidFill>
+                <a:effectLst/>
+                <a:latin typeface="Libre Franklin" pitchFamily="2" charset="77"/>
+                <a:ea typeface="Times New Roman" panose="02020603050405020304" pitchFamily="18" charset="0"/>
+              </a:rPr>
+              <a:t>Permission is hereby granted, free of charge, to any person obtaining a copy of this software and associated documentation files (the “Software”), to deal in the Software without restriction, including without limitation the rights to use, copy, modify, merge, publish, distribute, sublicense, and/or sell copies of the Software, and to permit persons to whom the Software is furnished to do so, subject to the following conditions:</a:t>
+            </a:r>
+            <a:endParaRPr lang="en-US" sz="1800" dirty="0">
+              <a:effectLst/>
+              <a:latin typeface="Times New Roman" panose="02020603050405020304" pitchFamily="18" charset="0"/>
+              <a:ea typeface="Times New Roman" panose="02020603050405020304" pitchFamily="18" charset="0"/>
+            </a:endParaRPr>
+          </a:p>
+          <a:p>
+            <a:pPr marL="0" marR="0" indent="0">
+              <a:spcAft>
+                <a:spcPts val="1800"/>
+              </a:spcAft>
+              <a:buNone/>
+            </a:pPr>
+            <a:r>
+              <a:rPr lang="en-US" sz="1800" dirty="0">
+                <a:solidFill>
+                  <a:srgbClr val="000000"/>
+                </a:solidFill>
+                <a:effectLst/>
+                <a:latin typeface="Libre Franklin" pitchFamily="2" charset="77"/>
+                <a:ea typeface="Times New Roman" panose="02020603050405020304" pitchFamily="18" charset="0"/>
+              </a:rPr>
+              <a:t>The above copyright notice and this permission notice shall be included in all copies or substantial portions of the Software.</a:t>
+            </a:r>
+            <a:endParaRPr lang="en-US" sz="1800" dirty="0">
+              <a:effectLst/>
+              <a:latin typeface="Times New Roman" panose="02020603050405020304" pitchFamily="18" charset="0"/>
+              <a:ea typeface="Times New Roman" panose="02020603050405020304" pitchFamily="18" charset="0"/>
+            </a:endParaRPr>
+          </a:p>
+          <a:p>
+            <a:pPr marL="0" marR="0" indent="0">
+              <a:spcAft>
+                <a:spcPts val="1800"/>
+              </a:spcAft>
+              <a:buNone/>
+            </a:pPr>
+            <a:r>
+              <a:rPr lang="en-US" sz="1800" dirty="0">
+                <a:solidFill>
+                  <a:srgbClr val="000000"/>
+                </a:solidFill>
+                <a:latin typeface="Libre Franklin" pitchFamily="2" charset="77"/>
+                <a:ea typeface="Times New Roman" panose="02020603050405020304" pitchFamily="18" charset="0"/>
+              </a:rPr>
+              <a:t>T</a:t>
+            </a:r>
+            <a:r>
+              <a:rPr lang="en-US" sz="1800" dirty="0">
+                <a:solidFill>
+                  <a:srgbClr val="000000"/>
+                </a:solidFill>
+                <a:effectLst/>
+                <a:latin typeface="Libre Franklin" pitchFamily="2" charset="77"/>
+                <a:ea typeface="Times New Roman" panose="02020603050405020304" pitchFamily="18" charset="0"/>
+              </a:rPr>
+              <a:t>HE SOFTWARE IS PROVIDED “AS IS”, WITHOUT WARRANTY OF ANY KIND, EXPRESS OR IMPLIED, INCLUDING BUT NOT LIMITED TO THE WARRANTIES OF MERCHANTABILITY, FITNESS FOR A PARTICULAR PURPOSE AND NONINFRINGEMENT. IN NO EVENT SHALL THE AUTHORS OR COPYRIGHT HOLDERS BE LIABLE FOR ANY CLAIM, DAMAGES OR OTHER LIABILITY, WHETHER IN AN ACTION OF CONTRACT, TORT OR OTHERWISE, ARISING FROM, OUT OF OR IN CONNECTION WITH THE SOFTWARE OR THE USE OR OTHER DEALINGS IN THE SOFTWARE.</a:t>
+            </a:r>
+            <a:endParaRPr lang="en-US" sz="1800" dirty="0">
+              <a:effectLst/>
+              <a:latin typeface="Times New Roman" panose="02020603050405020304" pitchFamily="18" charset="0"/>
+              <a:ea typeface="Times New Roman" panose="02020603050405020304" pitchFamily="18" charset="0"/>
+            </a:endParaRPr>
+          </a:p>
+          <a:p>
+            <a:pPr marL="0" marR="0" indent="0">
+              <a:spcAft>
+                <a:spcPts val="1800"/>
+              </a:spcAft>
+              <a:buNone/>
+            </a:pPr>
+            <a:r>
+              <a:rPr lang="en-US" sz="1800" dirty="0">
+                <a:solidFill>
+                  <a:srgbClr val="000000"/>
+                </a:solidFill>
+                <a:effectLst/>
+                <a:latin typeface="Libre Franklin" pitchFamily="2" charset="77"/>
+                <a:ea typeface="Times New Roman" panose="02020603050405020304" pitchFamily="18" charset="0"/>
+              </a:rPr>
+              <a:t>This license is also controlled by the Manning Publisher License, who provided a great deal of guidance and source material in the creation of the application. Please read the details in the link provided below.</a:t>
+            </a:r>
+            <a:endParaRPr lang="en-US" sz="1800" dirty="0">
+              <a:effectLst/>
+              <a:latin typeface="Times New Roman" panose="02020603050405020304" pitchFamily="18" charset="0"/>
+              <a:ea typeface="Times New Roman" panose="02020603050405020304" pitchFamily="18" charset="0"/>
+            </a:endParaRPr>
+          </a:p>
+          <a:p>
+            <a:pPr marL="0" marR="0" indent="0">
+              <a:spcAft>
+                <a:spcPts val="1800"/>
+              </a:spcAft>
+              <a:buNone/>
+            </a:pPr>
+            <a:r>
+              <a:rPr lang="en-US" sz="1800" u="sng" dirty="0">
+                <a:solidFill>
+                  <a:srgbClr val="000000"/>
+                </a:solidFill>
+                <a:effectLst/>
+                <a:latin typeface="Libre Franklin" pitchFamily="2" charset="77"/>
+                <a:ea typeface="Times New Roman" panose="02020603050405020304" pitchFamily="18" charset="0"/>
+                <a:hlinkClick r:id="rId3"/>
+              </a:rPr>
+              <a:t>Manning Publisher License</a:t>
+            </a:r>
+            <a:endParaRPr lang="en-US" sz="1800" dirty="0">
+              <a:effectLst/>
+              <a:latin typeface="Times New Roman" panose="02020603050405020304" pitchFamily="18" charset="0"/>
+              <a:ea typeface="Times New Roman" panose="02020603050405020304" pitchFamily="18" charset="0"/>
+            </a:endParaRPr>
+          </a:p>
+          <a:p>
+            <a:endParaRPr lang="en-US" dirty="0"/>
+          </a:p>
+        </p:txBody>
+      </p:sp>
+      <p:sp>
+        <p:nvSpPr>
+          <p:cNvPr id="4" name="TextBox 3">
+            <a:extLst>
+              <a:ext uri="{FF2B5EF4-FFF2-40B4-BE49-F238E27FC236}">
+                <a16:creationId xmlns:a16="http://schemas.microsoft.com/office/drawing/2014/main" id="{C466BEC3-D302-F2B7-F8E3-B51714C4B227}"/>
+              </a:ext>
+            </a:extLst>
+          </p:cNvPr>
+          <p:cNvSpPr txBox="1"/>
+          <p:nvPr/>
+        </p:nvSpPr>
+        <p:spPr>
+          <a:xfrm>
+            <a:off x="11359376" y="297366"/>
+            <a:ext cx="300082" cy="646331"/>
+          </a:xfrm>
+          <a:prstGeom prst="rect">
+            <a:avLst/>
+          </a:prstGeom>
+          <a:noFill/>
+        </p:spPr>
+        <p:txBody>
+          <a:bodyPr wrap="none" rtlCol="0">
+            <a:spAutoFit/>
+          </a:bodyPr>
+          <a:lstStyle/>
+          <a:p>
+            <a:r>
+              <a:rPr lang="en-US" dirty="0">
+                <a:highlight>
+                  <a:srgbClr val="00FF00"/>
+                </a:highlight>
+              </a:rPr>
+              <a:t>_</a:t>
+            </a:r>
+          </a:p>
+          <a:p>
+            <a:endParaRPr lang="en-US" dirty="0"/>
+          </a:p>
+        </p:txBody>
+      </p:sp>
+    </p:spTree>
+    <p:extLst>
+      <p:ext uri="{BB962C8B-B14F-4D97-AF65-F5344CB8AC3E}">
+        <p14:creationId xmlns:p14="http://schemas.microsoft.com/office/powerpoint/2010/main" val="3073130659"/>
+      </p:ext>
+    </p:extLst>
+  </p:cSld>
+  <p:clrMapOvr>
+    <a:masterClrMapping/>
+  </p:clrMapOvr>
+</p:sld>
+</file>
+
+<file path=ppt/slides/slide6.xml><?xml version="1.0" encoding="utf-8"?>
+<p:sld xmlns:a="http://schemas.openxmlformats.org/drawingml/2006/main" xmlns:r="http://schemas.openxmlformats.org/officeDocument/2006/relationships" xmlns:p="http://schemas.openxmlformats.org/presentationml/2006/main">
+  <p:cSld>
+    <p:spTree>
+      <p:nvGrpSpPr>
+        <p:cNvPr id="1" name="">
+          <a:extLst>
+            <a:ext uri="{FF2B5EF4-FFF2-40B4-BE49-F238E27FC236}">
+              <a16:creationId xmlns:a16="http://schemas.microsoft.com/office/drawing/2014/main" id="{C7582B8E-F144-9734-59F9-3810E1C4C54B}"/>
+            </a:ext>
+          </a:extLst>
+        </p:cNvPr>
+        <p:cNvGrpSpPr/>
+        <p:nvPr/>
+      </p:nvGrpSpPr>
+      <p:grpSpPr>
+        <a:xfrm>
+          <a:off x="0" y="0"/>
+          <a:ext cx="0" cy="0"/>
+          <a:chOff x="0" y="0"/>
+          <a:chExt cx="0" cy="0"/>
+        </a:xfrm>
+      </p:grpSpPr>
+      <p:sp>
+        <p:nvSpPr>
+          <p:cNvPr id="2" name="Title 1">
+            <a:extLst>
+              <a:ext uri="{FF2B5EF4-FFF2-40B4-BE49-F238E27FC236}">
+                <a16:creationId xmlns:a16="http://schemas.microsoft.com/office/drawing/2014/main" id="{BF0A33A8-785E-6C36-8550-2D9CC1C34A48}"/>
+              </a:ext>
+            </a:extLst>
+          </p:cNvPr>
+          <p:cNvSpPr>
+            <a:spLocks noGrp="1"/>
+          </p:cNvSpPr>
+          <p:nvPr>
+            <p:ph type="title"/>
+          </p:nvPr>
+        </p:nvSpPr>
+        <p:spPr>
+          <a:xfrm>
+            <a:off x="786454" y="178680"/>
+            <a:ext cx="10364452" cy="765018"/>
+          </a:xfrm>
+        </p:spPr>
+        <p:txBody>
+          <a:bodyPr>
+            <a:normAutofit/>
+          </a:bodyPr>
+          <a:lstStyle/>
+          <a:p>
+            <a:r>
+              <a:rPr lang="en-US" dirty="0"/>
+              <a:t>Open-source Project GitHub Repository</a:t>
+            </a:r>
+          </a:p>
+        </p:txBody>
+      </p:sp>
+      <p:sp>
+        <p:nvSpPr>
+          <p:cNvPr id="3" name="Content Placeholder 2">
+            <a:extLst>
+              <a:ext uri="{FF2B5EF4-FFF2-40B4-BE49-F238E27FC236}">
+                <a16:creationId xmlns:a16="http://schemas.microsoft.com/office/drawing/2014/main" id="{173226AF-282B-3A6F-849B-B4D89D570160}"/>
+              </a:ext>
+            </a:extLst>
+          </p:cNvPr>
+          <p:cNvSpPr>
+            <a:spLocks noGrp="1"/>
+          </p:cNvSpPr>
+          <p:nvPr>
+            <p:ph idx="1"/>
+          </p:nvPr>
+        </p:nvSpPr>
+        <p:spPr>
+          <a:xfrm>
+            <a:off x="589684" y="972274"/>
+            <a:ext cx="10364452" cy="5073964"/>
+          </a:xfrm>
+        </p:spPr>
+        <p:txBody>
+          <a:bodyPr>
+            <a:normAutofit/>
+          </a:bodyPr>
+          <a:lstStyle/>
+          <a:p>
+            <a:pPr marL="0" marR="0">
+              <a:lnSpc>
+                <a:spcPct val="107000"/>
+              </a:lnSpc>
+              <a:spcAft>
+                <a:spcPts val="800"/>
+              </a:spcAft>
+            </a:pPr>
+            <a:r>
+              <a:rPr lang="en-US" sz="1800" u="sng" kern="100" dirty="0">
+                <a:solidFill>
+                  <a:srgbClr val="467886"/>
+                </a:solidFill>
+                <a:effectLst/>
+                <a:latin typeface="Aptos" panose="020B0004020202020204" pitchFamily="34" charset="0"/>
+                <a:ea typeface="Aptos" panose="020B0004020202020204" pitchFamily="34" charset="0"/>
+                <a:cs typeface="Times New Roman" panose="02020603050405020304" pitchFamily="18" charset="0"/>
+                <a:hlinkClick r:id="rId2"/>
+              </a:rPr>
+              <a:t>Project GitHub Link</a:t>
+            </a:r>
+            <a:endParaRPr lang="en-US" sz="1800" kern="100" dirty="0">
+              <a:effectLst/>
+              <a:latin typeface="Aptos" panose="020B0004020202020204" pitchFamily="34" charset="0"/>
+              <a:ea typeface="Aptos" panose="020B0004020202020204" pitchFamily="34" charset="0"/>
+              <a:cs typeface="Times New Roman" panose="02020603050405020304" pitchFamily="18" charset="0"/>
+            </a:endParaRPr>
+          </a:p>
+          <a:p>
+            <a:endParaRPr lang="en-US" dirty="0"/>
+          </a:p>
+        </p:txBody>
+      </p:sp>
+      <p:sp>
+        <p:nvSpPr>
+          <p:cNvPr id="4" name="TextBox 3">
+            <a:extLst>
+              <a:ext uri="{FF2B5EF4-FFF2-40B4-BE49-F238E27FC236}">
+                <a16:creationId xmlns:a16="http://schemas.microsoft.com/office/drawing/2014/main" id="{1D7FEC8E-5E6D-CD0D-E140-0EF928FB6BAB}"/>
+              </a:ext>
+            </a:extLst>
+          </p:cNvPr>
+          <p:cNvSpPr txBox="1"/>
+          <p:nvPr/>
+        </p:nvSpPr>
+        <p:spPr>
+          <a:xfrm>
+            <a:off x="11359376" y="297366"/>
+            <a:ext cx="300082" cy="646331"/>
+          </a:xfrm>
+          <a:prstGeom prst="rect">
+            <a:avLst/>
+          </a:prstGeom>
+          <a:noFill/>
+        </p:spPr>
+        <p:txBody>
+          <a:bodyPr wrap="none" rtlCol="0">
+            <a:spAutoFit/>
+          </a:bodyPr>
+          <a:lstStyle/>
+          <a:p>
+            <a:r>
+              <a:rPr lang="en-US" dirty="0">
+                <a:highlight>
+                  <a:srgbClr val="00FF00"/>
+                </a:highlight>
+              </a:rPr>
+              <a:t>_</a:t>
+            </a:r>
+          </a:p>
+          <a:p>
+            <a:endParaRPr lang="en-US" dirty="0"/>
+          </a:p>
+        </p:txBody>
+      </p:sp>
+    </p:spTree>
+    <p:extLst>
+      <p:ext uri="{BB962C8B-B14F-4D97-AF65-F5344CB8AC3E}">
+        <p14:creationId xmlns:p14="http://schemas.microsoft.com/office/powerpoint/2010/main" val="2851531317"/>
+      </p:ext>
+    </p:extLst>
+  </p:cSld>
+  <p:clrMapOvr>
+    <a:masterClrMapping/>
+  </p:clrMapOvr>
+</p:sld>
+</file>
+
+<file path=ppt/slides/slide7.xml><?xml version="1.0" encoding="utf-8"?>
+<p:sld xmlns:a="http://schemas.openxmlformats.org/drawingml/2006/main" xmlns:r="http://schemas.openxmlformats.org/officeDocument/2006/relationships" xmlns:p="http://schemas.openxmlformats.org/presentationml/2006/main">
+  <p:cSld>
+    <p:spTree>
+      <p:nvGrpSpPr>
+        <p:cNvPr id="1" name=""/>
+        <p:cNvGrpSpPr/>
+        <p:nvPr/>
+      </p:nvGrpSpPr>
+      <p:grpSpPr>
+        <a:xfrm>
+          <a:off x="0" y="0"/>
+          <a:ext cx="0" cy="0"/>
+          <a:chOff x="0" y="0"/>
+          <a:chExt cx="0" cy="0"/>
+        </a:xfrm>
+      </p:grpSpPr>
+      <p:pic>
+        <p:nvPicPr>
+          <p:cNvPr id="5" name="Picture 4">
+            <a:extLst>
+              <a:ext uri="{FF2B5EF4-FFF2-40B4-BE49-F238E27FC236}">
+                <a16:creationId xmlns:a16="http://schemas.microsoft.com/office/drawing/2014/main" id="{75D08E5E-0B32-19A5-8DE1-691760410004}"/>
+              </a:ext>
+            </a:extLst>
+          </p:cNvPr>
+          <p:cNvPicPr>
+            <a:picLocks noChangeAspect="1"/>
+          </p:cNvPicPr>
+          <p:nvPr/>
+        </p:nvPicPr>
+        <p:blipFill>
+          <a:blip r:embed="rId2"/>
+          <a:stretch>
+            <a:fillRect/>
+          </a:stretch>
+        </p:blipFill>
+        <p:spPr>
+          <a:xfrm>
+            <a:off x="1493195" y="212590"/>
+            <a:ext cx="9205609" cy="5973493"/>
+          </a:xfrm>
+          <a:prstGeom prst="rect">
+            <a:avLst/>
+          </a:prstGeom>
+        </p:spPr>
+      </p:pic>
+      <p:sp>
+        <p:nvSpPr>
+          <p:cNvPr id="6" name="TextBox 5">
+            <a:extLst>
+              <a:ext uri="{FF2B5EF4-FFF2-40B4-BE49-F238E27FC236}">
+                <a16:creationId xmlns:a16="http://schemas.microsoft.com/office/drawing/2014/main" id="{5374EDF9-B0FF-D535-A89B-11CF2BAB178C}"/>
+              </a:ext>
+            </a:extLst>
+          </p:cNvPr>
+          <p:cNvSpPr txBox="1"/>
+          <p:nvPr/>
+        </p:nvSpPr>
+        <p:spPr>
+          <a:xfrm>
+            <a:off x="4202348" y="3531140"/>
+            <a:ext cx="1233030" cy="276999"/>
+          </a:xfrm>
+          <a:prstGeom prst="rect">
+            <a:avLst/>
+          </a:prstGeom>
+          <a:noFill/>
+        </p:spPr>
+        <p:txBody>
+          <a:bodyPr wrap="none" rtlCol="0">
+            <a:spAutoFit/>
+          </a:bodyPr>
+          <a:lstStyle/>
+          <a:p>
+            <a:r>
+              <a:rPr lang="en-US" sz="1200" dirty="0"/>
+              <a:t>Future Release</a:t>
+            </a:r>
+          </a:p>
+        </p:txBody>
+      </p:sp>
+      <p:sp>
+        <p:nvSpPr>
+          <p:cNvPr id="2" name="TextBox 1">
+            <a:extLst>
+              <a:ext uri="{FF2B5EF4-FFF2-40B4-BE49-F238E27FC236}">
+                <a16:creationId xmlns:a16="http://schemas.microsoft.com/office/drawing/2014/main" id="{4FDEB10E-1196-75AA-5D5A-9B9188FF7F4C}"/>
+              </a:ext>
+            </a:extLst>
+          </p:cNvPr>
+          <p:cNvSpPr txBox="1"/>
+          <p:nvPr/>
+        </p:nvSpPr>
+        <p:spPr>
+          <a:xfrm>
+            <a:off x="205570" y="212590"/>
+            <a:ext cx="4698787" cy="369332"/>
+          </a:xfrm>
+          <a:prstGeom prst="rect">
+            <a:avLst/>
+          </a:prstGeom>
+          <a:noFill/>
+        </p:spPr>
+        <p:txBody>
+          <a:bodyPr wrap="none" rtlCol="0">
+            <a:spAutoFit/>
+          </a:bodyPr>
+          <a:lstStyle/>
+          <a:p>
+            <a:r>
+              <a:rPr lang="en-US" dirty="0"/>
+              <a:t>LAMs – License Asset Management System</a:t>
+            </a:r>
+          </a:p>
+        </p:txBody>
+      </p:sp>
+    </p:spTree>
+    <p:extLst>
+      <p:ext uri="{BB962C8B-B14F-4D97-AF65-F5344CB8AC3E}">
+        <p14:creationId xmlns:p14="http://schemas.microsoft.com/office/powerpoint/2010/main" val="239245858"/>
+      </p:ext>
+    </p:extLst>
+  </p:cSld>
+  <p:clrMapOvr>
+    <a:masterClrMapping/>
+  </p:clrMapOvr>
+</p:sld>
+</file>
+
 <file path=ppt/slides/slide8.xml><?xml version="1.0" encoding="utf-8"?>
 <p:sld xmlns:a="http://schemas.openxmlformats.org/drawingml/2006/main" xmlns:r="http://schemas.openxmlformats.org/officeDocument/2006/relationships" xmlns:p="http://schemas.openxmlformats.org/presentationml/2006/main">
   <p:cSld>
@@ -7262,7 +8026,7 @@
           <p:cNvPr id="2" name="Title 1">
             <a:extLst>
               <a:ext uri="{FF2B5EF4-FFF2-40B4-BE49-F238E27FC236}">
-                <a16:creationId xmlns:a16="http://schemas.microsoft.com/office/drawing/2014/main" id="{BB845A7C-7CE3-9A85-8828-6313C940935C}"/>
+                <a16:creationId xmlns:a16="http://schemas.microsoft.com/office/drawing/2014/main" id="{D3D0CF5B-E8F3-EFFA-F511-41713F7FD617}"/>
               </a:ext>
             </a:extLst>
           </p:cNvPr>
@@ -7280,7 +8044,7 @@
           <a:p>
             <a:r>
               <a:rPr lang="en-US" dirty="0"/>
-              <a:t>Types of Work</a:t>
+              <a:t>Multi-tier Client Server Architectural Pattern</a:t>
             </a:r>
           </a:p>
         </p:txBody>
@@ -7290,7 +8054,7 @@
           <p:cNvPr id="3" name="Content Placeholder 2">
             <a:extLst>
               <a:ext uri="{FF2B5EF4-FFF2-40B4-BE49-F238E27FC236}">
-                <a16:creationId xmlns:a16="http://schemas.microsoft.com/office/drawing/2014/main" id="{1C4CB6FF-AA13-B639-5135-83D64C434BBE}"/>
+                <a16:creationId xmlns:a16="http://schemas.microsoft.com/office/drawing/2014/main" id="{C0DEA48A-4AC0-B1CA-FB0C-EA3594D40239}"/>
               </a:ext>
             </a:extLst>
           </p:cNvPr>
@@ -7301,49 +8065,118 @@
             <p:ph idx="1"/>
           </p:nvPr>
         </p:nvSpPr>
-        <p:spPr/>
-        <p:txBody>
-          <a:bodyPr/>
-          <a:lstStyle/>
-          <a:p>
-            <a:r>
-              <a:rPr lang="en-US" dirty="0"/>
-              <a:t>Enhancements</a:t>
-            </a:r>
-          </a:p>
-          <a:p>
-            <a:pPr lvl="1"/>
-            <a:r>
-              <a:rPr lang="en-US" dirty="0"/>
-              <a:t>Refactor </a:t>
-            </a:r>
-            <a:r>
-              <a:rPr lang="en-US" dirty="0" err="1"/>
-              <a:t>Blazor</a:t>
-            </a:r>
-            <a:r>
-              <a:rPr lang="en-US" dirty="0"/>
-              <a:t> implementation</a:t>
-            </a:r>
-          </a:p>
-          <a:p>
-            <a:r>
-              <a:rPr lang="en-US" dirty="0"/>
-              <a:t>Preventative</a:t>
-            </a:r>
-          </a:p>
-          <a:p>
-            <a:pPr lvl="1"/>
-            <a:r>
-              <a:rPr lang="en-US" dirty="0"/>
-              <a:t>Add Unit Test</a:t>
-            </a:r>
-          </a:p>
-          <a:p>
-            <a:pPr lvl="1"/>
-            <a:r>
-              <a:rPr lang="en-US" dirty="0"/>
-              <a:t>Add UML Diagrams</a:t>
+        <p:spPr>
+          <a:xfrm>
+            <a:off x="865136" y="1831939"/>
+            <a:ext cx="4257665" cy="4125147"/>
+          </a:xfrm>
+        </p:spPr>
+        <p:txBody>
+          <a:bodyPr>
+            <a:normAutofit fontScale="92500" lnSpcReduction="20000"/>
+          </a:bodyPr>
+          <a:lstStyle/>
+          <a:p>
+            <a:pPr marL="342900" indent="-342900">
+              <a:buFontTx/>
+              <a:buChar char="-"/>
+            </a:pPr>
+            <a:r>
+              <a:rPr lang="en-US" dirty="0"/>
+              <a:t>Good for large volume of transactions</a:t>
+            </a:r>
+          </a:p>
+          <a:p>
+            <a:pPr marL="342900" indent="-342900">
+              <a:buFontTx/>
+              <a:buChar char="-"/>
+            </a:pPr>
+            <a:r>
+              <a:rPr lang="en-US" dirty="0"/>
+              <a:t>Able to scale as more clients sign up for the service it will be better for larger scale</a:t>
+            </a:r>
+          </a:p>
+          <a:p>
+            <a:pPr marL="342900" indent="-342900">
+              <a:buFontTx/>
+              <a:buChar char="-"/>
+            </a:pPr>
+            <a:r>
+              <a:rPr lang="en-US" dirty="0"/>
+              <a:t>Good for applications where data is volatile</a:t>
+            </a:r>
+          </a:p>
+          <a:p>
+            <a:endParaRPr lang="en-US" dirty="0"/>
+          </a:p>
+        </p:txBody>
+      </p:sp>
+      <p:pic>
+        <p:nvPicPr>
+          <p:cNvPr id="5" name="Content Placeholder 7" descr="A diagram of a web server&#10;&#10;Description automatically generated">
+            <a:extLst>
+              <a:ext uri="{FF2B5EF4-FFF2-40B4-BE49-F238E27FC236}">
+                <a16:creationId xmlns:a16="http://schemas.microsoft.com/office/drawing/2014/main" id="{96CAF9FE-622A-FBEF-CA61-20147D31D129}"/>
+              </a:ext>
+            </a:extLst>
+          </p:cNvPr>
+          <p:cNvPicPr>
+            <a:picLocks noChangeAspect="1"/>
+          </p:cNvPicPr>
+          <p:nvPr/>
+        </p:nvPicPr>
+        <p:blipFill>
+          <a:blip r:embed="rId2"/>
+          <a:stretch>
+            <a:fillRect/>
+          </a:stretch>
+        </p:blipFill>
+        <p:spPr>
+          <a:xfrm>
+            <a:off x="5132689" y="1593280"/>
+            <a:ext cx="6449711" cy="3902075"/>
+          </a:xfrm>
+          <a:prstGeom prst="rect">
+            <a:avLst/>
+          </a:prstGeom>
+          <a:noFill/>
+        </p:spPr>
+      </p:pic>
+      <p:sp>
+        <p:nvSpPr>
+          <p:cNvPr id="6" name="TextBox 5">
+            <a:extLst>
+              <a:ext uri="{FF2B5EF4-FFF2-40B4-BE49-F238E27FC236}">
+                <a16:creationId xmlns:a16="http://schemas.microsoft.com/office/drawing/2014/main" id="{E2770FA6-0920-360A-A878-20A46697C656}"/>
+              </a:ext>
+            </a:extLst>
+          </p:cNvPr>
+          <p:cNvSpPr txBox="1"/>
+          <p:nvPr/>
+        </p:nvSpPr>
+        <p:spPr>
+          <a:xfrm>
+            <a:off x="11693055" y="185352"/>
+            <a:ext cx="300082" cy="369332"/>
+          </a:xfrm>
+          <a:prstGeom prst="rect">
+            <a:avLst/>
+          </a:prstGeom>
+          <a:noFill/>
+        </p:spPr>
+        <p:txBody>
+          <a:bodyPr wrap="none" rtlCol="0">
+            <a:spAutoFit/>
+          </a:bodyPr>
+          <a:lstStyle/>
+          <a:p>
+            <a:r>
+              <a:rPr lang="en-US" dirty="0">
+                <a:highlight>
+                  <a:srgbClr val="00FF00"/>
+                </a:highlight>
+              </a:rPr>
+              <a:t>_</a:t>
             </a:r>
           </a:p>
         </p:txBody>
@@ -7351,7 +8184,7 @@
     </p:spTree>
     <p:extLst>
       <p:ext uri="{BB962C8B-B14F-4D97-AF65-F5344CB8AC3E}">
-        <p14:creationId xmlns:p14="http://schemas.microsoft.com/office/powerpoint/2010/main" val="1587089751"/>
+        <p14:creationId xmlns:p14="http://schemas.microsoft.com/office/powerpoint/2010/main" val="3757137156"/>
       </p:ext>
     </p:extLst>
   </p:cSld>
@@ -7383,7 +8216,7 @@
           <p:cNvPr id="2" name="Title 1">
             <a:extLst>
               <a:ext uri="{FF2B5EF4-FFF2-40B4-BE49-F238E27FC236}">
-                <a16:creationId xmlns:a16="http://schemas.microsoft.com/office/drawing/2014/main" id="{F9C866DC-BD86-061B-9D2C-A7F5E57F918D}"/>
+                <a16:creationId xmlns:a16="http://schemas.microsoft.com/office/drawing/2014/main" id="{BB845A7C-7CE3-9A85-8828-6313C940935C}"/>
               </a:ext>
             </a:extLst>
           </p:cNvPr>
@@ -7391,7 +8224,7 @@
             <a:spLocks noGrp="1"/>
           </p:cNvSpPr>
           <p:nvPr>
-            <p:ph type="ctrTitle"/>
+            <p:ph type="title"/>
           </p:nvPr>
         </p:nvSpPr>
         <p:spPr/>
@@ -7401,17 +8234,17 @@
           <a:p>
             <a:r>
               <a:rPr lang="en-US" dirty="0"/>
-              <a:t>Research</a:t>
-            </a:r>
-          </a:p>
-        </p:txBody>
-      </p:sp>
-      <p:sp>
-        <p:nvSpPr>
-          <p:cNvPr id="3" name="Subtitle 2">
+              <a:t>Types of Work</a:t>
+            </a:r>
+          </a:p>
+        </p:txBody>
+      </p:sp>
+      <p:sp>
+        <p:nvSpPr>
+          <p:cNvPr id="3" name="Content Placeholder 2">
             <a:extLst>
               <a:ext uri="{FF2B5EF4-FFF2-40B4-BE49-F238E27FC236}">
-                <a16:creationId xmlns:a16="http://schemas.microsoft.com/office/drawing/2014/main" id="{9186E197-0B72-490E-0960-FB18FB6745BB}"/>
+                <a16:creationId xmlns:a16="http://schemas.microsoft.com/office/drawing/2014/main" id="{1C4CB6FF-AA13-B639-5135-83D64C434BBE}"/>
               </a:ext>
             </a:extLst>
           </p:cNvPr>
@@ -7419,7 +8252,7 @@
             <a:spLocks noGrp="1"/>
           </p:cNvSpPr>
           <p:nvPr>
-            <p:ph type="subTitle" idx="1"/>
+            <p:ph idx="1"/>
           </p:nvPr>
         </p:nvSpPr>
         <p:spPr/>
@@ -7429,7 +8262,42 @@
           <a:p>
             <a:r>
               <a:rPr lang="en-US" dirty="0"/>
-              <a:t>Using tools for model discovery and maintenance</a:t>
+              <a:t>Enhancements</a:t>
+            </a:r>
+          </a:p>
+          <a:p>
+            <a:pPr lvl="1"/>
+            <a:r>
+              <a:rPr lang="en-US" dirty="0"/>
+              <a:t>Refactor </a:t>
+            </a:r>
+            <a:r>
+              <a:rPr lang="en-US" dirty="0" err="1"/>
+              <a:t>Blazor</a:t>
+            </a:r>
+            <a:r>
+              <a:rPr lang="en-US" dirty="0"/>
+              <a:t> implementation</a:t>
+            </a:r>
+          </a:p>
+          <a:p>
+            <a:r>
+              <a:rPr lang="en-US" dirty="0"/>
+              <a:t>Perfective</a:t>
+            </a:r>
+          </a:p>
+          <a:p>
+            <a:pPr lvl="1"/>
+            <a:r>
+              <a:rPr lang="en-US" dirty="0"/>
+              <a:t>Add Unit Test</a:t>
+            </a:r>
+          </a:p>
+          <a:p>
+            <a:pPr lvl="1"/>
+            <a:r>
+              <a:rPr lang="en-US" dirty="0"/>
+              <a:t>Add UML Diagrams</a:t>
             </a:r>
           </a:p>
         </p:txBody>
@@ -7437,7 +8305,7 @@
     </p:spTree>
     <p:extLst>
       <p:ext uri="{BB962C8B-B14F-4D97-AF65-F5344CB8AC3E}">
-        <p14:creationId xmlns:p14="http://schemas.microsoft.com/office/powerpoint/2010/main" val="2038501767"/>
+        <p14:creationId xmlns:p14="http://schemas.microsoft.com/office/powerpoint/2010/main" val="1587089751"/>
       </p:ext>
     </p:extLst>
   </p:cSld>

</xml_diff>